<commit_message>
presentazione progetto parte 2
</commit_message>
<xml_diff>
--- a/Air Connect - Presentazione.pptx
+++ b/Air Connect - Presentazione.pptx
@@ -3,8 +3,8 @@
 <p:presentation xmlns:a="http://schemas.openxmlformats.org/drawingml/2006/main" xmlns:p="http://schemas.openxmlformats.org/presentationml/2006/main" xmlns:r="http://schemas.openxmlformats.org/officeDocument/2006/relationships" xmlns:p14="http://schemas.microsoft.com/office/powerpoint/2010/main" xmlns:p15="http://schemas.microsoft.com/office/powerpoint/2012/main" xmlns:mc="http://schemas.openxmlformats.org/markup-compatibility/2006">
   <p:sldMasterIdLst>
     <p:sldMasterId id="2147483648" r:id="rId2"/>
-    <p:sldMasterId id="2147483650" r:id="rId3"/>
-    <p:sldMasterId id="2147483652" r:id="rId4"/>
+    <p:sldMasterId id="2147483651" r:id="rId3"/>
+    <p:sldMasterId id="2147483653" r:id="rId4"/>
   </p:sldMasterIdLst>
   <p:sldIdLst>
     <p:sldId id="256" r:id="rId5"/>
@@ -17,6 +17,8 @@
     <p:sldId id="263" r:id="rId12"/>
     <p:sldId id="264" r:id="rId13"/>
     <p:sldId id="265" r:id="rId14"/>
+    <p:sldId id="266" r:id="rId15"/>
+    <p:sldId id="267" r:id="rId16"/>
   </p:sldIdLst>
   <p:sldSz cx="9144000" cy="6858000"/>
   <p:notesSz cx="7559675" cy="10691813"/>
@@ -53,7 +55,7 @@
         <p:spPr>
           <a:xfrm>
             <a:off x="990720" y="1392840"/>
-            <a:ext cx="7314120" cy="1433520"/>
+            <a:ext cx="7313760" cy="1433160"/>
           </a:xfrm>
           <a:prstGeom prst="rect">
             <a:avLst/>
@@ -94,7 +96,7 @@
         <p:spPr>
           <a:xfrm>
             <a:off x="990720" y="2514240"/>
-            <a:ext cx="7314120" cy="4266000"/>
+            <a:ext cx="7313760" cy="4265640"/>
           </a:xfrm>
           <a:prstGeom prst="rect">
             <a:avLst/>
@@ -131,6 +133,110 @@
 </file>
 
 <file path=ppt/slideLayouts/slideLayout2.xml><?xml version="1.0" encoding="utf-8"?>
+<p:sldLayout xmlns:a="http://schemas.openxmlformats.org/drawingml/2006/main" xmlns:p="http://schemas.openxmlformats.org/presentationml/2006/main" xmlns:r="http://schemas.openxmlformats.org/officeDocument/2006/relationships" xmlns:p14="http://schemas.microsoft.com/office/powerpoint/2010/main" xmlns:p15="http://schemas.microsoft.com/office/powerpoint/2012/main" xmlns:mc="http://schemas.openxmlformats.org/markup-compatibility/2006" type="title" preserve="1">
+  <p:cSld name="Predefinito">
+    <p:spTree>
+      <p:nvGrpSpPr>
+        <p:cNvPr id="1" name=""/>
+        <p:cNvGrpSpPr/>
+        <p:nvPr/>
+      </p:nvGrpSpPr>
+      <p:grpSpPr>
+        <a:xfrm>
+          <a:off x="0" y="0"/>
+          <a:ext cx="0" cy="0"/>
+          <a:chOff x="0" y="0"/>
+          <a:chExt cx="0" cy="0"/>
+        </a:xfrm>
+      </p:grpSpPr>
+      <p:sp>
+        <p:nvSpPr>
+          <p:cNvPr id="4" name="PlaceHolder 1"/>
+          <p:cNvSpPr>
+            <a:spLocks noGrp="1"/>
+          </p:cNvSpPr>
+          <p:nvPr>
+            <p:ph type="title"/>
+          </p:nvPr>
+        </p:nvSpPr>
+        <p:spPr>
+          <a:xfrm>
+            <a:off x="990720" y="1392840"/>
+            <a:ext cx="7313760" cy="1433160"/>
+          </a:xfrm>
+          <a:prstGeom prst="rect">
+            <a:avLst/>
+          </a:prstGeom>
+          <a:noFill/>
+          <a:ln w="0">
+            <a:noFill/>
+          </a:ln>
+        </p:spPr>
+        <p:txBody>
+          <a:bodyPr lIns="0" rIns="0" tIns="0" bIns="0" anchor="ctr">
+            <a:noAutofit/>
+          </a:bodyPr>
+          <a:p>
+            <a:pPr indent="0" algn="ctr">
+              <a:buNone/>
+            </a:pPr>
+            <a:endParaRPr b="0" lang="it-IT" sz="4400" strike="noStrike" u="none">
+              <a:solidFill>
+                <a:srgbClr val="000000"/>
+              </a:solidFill>
+              <a:uFillTx/>
+              <a:latin typeface="Arial"/>
+            </a:endParaRPr>
+          </a:p>
+        </p:txBody>
+      </p:sp>
+      <p:sp>
+        <p:nvSpPr>
+          <p:cNvPr id="5" name="PlaceHolder 2"/>
+          <p:cNvSpPr>
+            <a:spLocks noGrp="1"/>
+          </p:cNvSpPr>
+          <p:nvPr>
+            <p:ph type="subTitle"/>
+          </p:nvPr>
+        </p:nvSpPr>
+        <p:spPr>
+          <a:xfrm>
+            <a:off x="990720" y="2514240"/>
+            <a:ext cx="7313760" cy="4265640"/>
+          </a:xfrm>
+          <a:prstGeom prst="rect">
+            <a:avLst/>
+          </a:prstGeom>
+          <a:noFill/>
+          <a:ln w="0">
+            <a:noFill/>
+          </a:ln>
+        </p:spPr>
+        <p:txBody>
+          <a:bodyPr lIns="0" rIns="0" tIns="0" bIns="0" anchor="ctr">
+            <a:noAutofit/>
+          </a:bodyPr>
+          <a:p>
+            <a:pPr indent="0" algn="ctr">
+              <a:buNone/>
+            </a:pPr>
+            <a:endParaRPr b="0" lang="it-IT" sz="3200" strike="noStrike" u="none">
+              <a:solidFill>
+                <a:srgbClr val="000000"/>
+              </a:solidFill>
+              <a:uFillTx/>
+              <a:latin typeface="Arial"/>
+            </a:endParaRPr>
+          </a:p>
+        </p:txBody>
+      </p:sp>
+    </p:spTree>
+  </p:cSld>
+</p:sldLayout>
+</file>
+
+<file path=ppt/slideLayouts/slideLayout3.xml><?xml version="1.0" encoding="utf-8"?>
 <p:sldLayout xmlns:a="http://schemas.openxmlformats.org/drawingml/2006/main" xmlns:p="http://schemas.openxmlformats.org/presentationml/2006/main" xmlns:r="http://schemas.openxmlformats.org/officeDocument/2006/relationships" xmlns:p14="http://schemas.microsoft.com/office/powerpoint/2010/main" xmlns:p15="http://schemas.microsoft.com/office/powerpoint/2012/main" xmlns:mc="http://schemas.openxmlformats.org/markup-compatibility/2006" type="title" preserve="1">
   <p:cSld name="Predefinito 1">
     <p:spTree>
@@ -149,7 +255,7 @@
       </p:grpSpPr>
       <p:sp>
         <p:nvSpPr>
-          <p:cNvPr id="5" name="PlaceHolder 1"/>
+          <p:cNvPr id="7" name="PlaceHolder 1"/>
           <p:cNvSpPr>
             <a:spLocks noGrp="1"/>
           </p:cNvSpPr>
@@ -160,7 +266,7 @@
         <p:spPr>
           <a:xfrm>
             <a:off x="990720" y="1392840"/>
-            <a:ext cx="7314120" cy="1433520"/>
+            <a:ext cx="7313760" cy="1433160"/>
           </a:xfrm>
           <a:prstGeom prst="rect">
             <a:avLst/>
@@ -190,7 +296,7 @@
       </p:sp>
       <p:sp>
         <p:nvSpPr>
-          <p:cNvPr id="6" name="PlaceHolder 2"/>
+          <p:cNvPr id="8" name="PlaceHolder 2"/>
           <p:cNvSpPr>
             <a:spLocks noGrp="1"/>
           </p:cNvSpPr>
@@ -201,7 +307,7 @@
         <p:spPr>
           <a:xfrm>
             <a:off x="990720" y="2514240"/>
-            <a:ext cx="7314120" cy="4266000"/>
+            <a:ext cx="7313760" cy="4265640"/>
           </a:xfrm>
           <a:prstGeom prst="rect">
             <a:avLst/>
@@ -234,7 +340,7 @@
 </p:sldLayout>
 </file>
 
-<file path=ppt/slideLayouts/slideLayout3.xml><?xml version="1.0" encoding="utf-8"?>
+<file path=ppt/slideLayouts/slideLayout4.xml><?xml version="1.0" encoding="utf-8"?>
 <p:sldLayout xmlns:a="http://schemas.openxmlformats.org/drawingml/2006/main" xmlns:p="http://schemas.openxmlformats.org/presentationml/2006/main" xmlns:r="http://schemas.openxmlformats.org/officeDocument/2006/relationships" xmlns:p14="http://schemas.microsoft.com/office/powerpoint/2010/main" xmlns:p15="http://schemas.microsoft.com/office/powerpoint/2012/main" xmlns:mc="http://schemas.openxmlformats.org/markup-compatibility/2006" type="title" preserve="1">
   <p:cSld name="Titolo1">
     <p:spTree>
@@ -253,7 +359,7 @@
       </p:grpSpPr>
       <p:sp>
         <p:nvSpPr>
-          <p:cNvPr id="9" name="PlaceHolder 1"/>
+          <p:cNvPr id="11" name="PlaceHolder 1"/>
           <p:cNvSpPr>
             <a:spLocks noGrp="1"/>
           </p:cNvSpPr>
@@ -264,7 +370,7 @@
         <p:spPr>
           <a:xfrm>
             <a:off x="990720" y="1392840"/>
-            <a:ext cx="7314120" cy="1433520"/>
+            <a:ext cx="7313760" cy="1433160"/>
           </a:xfrm>
           <a:prstGeom prst="rect">
             <a:avLst/>
@@ -294,7 +400,7 @@
       </p:sp>
       <p:sp>
         <p:nvSpPr>
-          <p:cNvPr id="10" name="PlaceHolder 2"/>
+          <p:cNvPr id="12" name="PlaceHolder 2"/>
           <p:cNvSpPr>
             <a:spLocks noGrp="1"/>
           </p:cNvSpPr>
@@ -305,7 +411,7 @@
         <p:spPr>
           <a:xfrm>
             <a:off x="990720" y="2514240"/>
-            <a:ext cx="7314120" cy="4266000"/>
+            <a:ext cx="7313760" cy="4265640"/>
           </a:xfrm>
           <a:prstGeom prst="rect">
             <a:avLst/>
@@ -376,7 +482,7 @@
         <p:spPr>
           <a:xfrm>
             <a:off x="990720" y="1392840"/>
-            <a:ext cx="7314120" cy="1433520"/>
+            <a:ext cx="7313760" cy="1433160"/>
           </a:xfrm>
           <a:prstGeom prst="rect">
             <a:avLst/>
@@ -427,7 +533,7 @@
         <p:spPr>
           <a:xfrm>
             <a:off x="990720" y="2514240"/>
-            <a:ext cx="7314120" cy="4266000"/>
+            <a:ext cx="7313760" cy="4265640"/>
           </a:xfrm>
           <a:prstGeom prst="rect">
             <a:avLst/>
@@ -658,6 +764,7 @@
   <p:clrMap bg1="lt1" tx1="dk1" bg2="lt2" tx2="dk2" accent1="accent1" accent2="accent2" accent3="accent3" accent4="accent4" accent5="accent5" accent6="accent6" hlink="hlink" folHlink="folHlink"/>
   <p:sldLayoutIdLst>
     <p:sldLayoutId id="2147483649" r:id="rId3"/>
+    <p:sldLayoutId id="2147483650" r:id="rId4"/>
   </p:sldLayoutIdLst>
 </p:sldMaster>
 </file>
@@ -689,7 +796,7 @@
       </p:grpSpPr>
       <p:sp>
         <p:nvSpPr>
-          <p:cNvPr id="4" name="PlaceHolder 1"/>
+          <p:cNvPr id="6" name="PlaceHolder 1"/>
           <p:cNvSpPr>
             <a:spLocks noGrp="1"/>
           </p:cNvSpPr>
@@ -700,7 +807,7 @@
         <p:spPr>
           <a:xfrm>
             <a:off x="990720" y="1392840"/>
-            <a:ext cx="7314120" cy="1433520"/>
+            <a:ext cx="7313760" cy="1433160"/>
           </a:xfrm>
           <a:prstGeom prst="rect">
             <a:avLst/>
@@ -742,7 +849,7 @@
   </p:cSld>
   <p:clrMap bg1="lt1" tx1="dk1" bg2="lt2" tx2="dk2" accent1="accent1" accent2="accent2" accent3="accent3" accent4="accent4" accent5="accent5" accent6="accent6" hlink="hlink" folHlink="folHlink"/>
   <p:sldLayoutIdLst>
-    <p:sldLayoutId id="2147483651" r:id="rId3"/>
+    <p:sldLayoutId id="2147483652" r:id="rId3"/>
   </p:sldLayoutIdLst>
 </p:sldMaster>
 </file>
@@ -774,7 +881,7 @@
       </p:grpSpPr>
       <p:sp>
         <p:nvSpPr>
-          <p:cNvPr id="7" name="PlaceHolder 1"/>
+          <p:cNvPr id="9" name="PlaceHolder 1"/>
           <p:cNvSpPr>
             <a:spLocks noGrp="1"/>
           </p:cNvSpPr>
@@ -785,7 +892,7 @@
         <p:spPr>
           <a:xfrm>
             <a:off x="990720" y="1392840"/>
-            <a:ext cx="7314120" cy="1433520"/>
+            <a:ext cx="7313760" cy="1433160"/>
           </a:xfrm>
           <a:prstGeom prst="rect">
             <a:avLst/>
@@ -825,7 +932,7 @@
       </p:sp>
       <p:sp>
         <p:nvSpPr>
-          <p:cNvPr id="8" name="PlaceHolder 2"/>
+          <p:cNvPr id="10" name="PlaceHolder 2"/>
           <p:cNvSpPr>
             <a:spLocks noGrp="1"/>
           </p:cNvSpPr>
@@ -1066,7 +1173,7 @@
   </p:cSld>
   <p:clrMap bg1="lt1" tx1="dk1" bg2="lt2" tx2="dk2" accent1="accent1" accent2="accent2" accent3="accent3" accent4="accent4" accent5="accent5" accent6="accent6" hlink="hlink" folHlink="folHlink"/>
   <p:sldLayoutIdLst>
-    <p:sldLayoutId id="2147483653" r:id="rId3"/>
+    <p:sldLayoutId id="2147483654" r:id="rId3"/>
   </p:sldLayoutIdLst>
 </p:sldMaster>
 </file>
@@ -1098,7 +1205,7 @@
       </p:grpSpPr>
       <p:sp>
         <p:nvSpPr>
-          <p:cNvPr id="11" name="PlaceHolder 1"/>
+          <p:cNvPr id="13" name="PlaceHolder 1"/>
           <p:cNvSpPr>
             <a:spLocks noGrp="1"/>
           </p:cNvSpPr>
@@ -1109,7 +1216,7 @@
         <p:spPr>
           <a:xfrm>
             <a:off x="1980000" y="180000"/>
-            <a:ext cx="4858920" cy="684720"/>
+            <a:ext cx="4858560" cy="684360"/>
           </a:xfrm>
           <a:prstGeom prst="rect">
             <a:avLst/>
@@ -1155,7 +1262,7 @@
       </p:sp>
       <p:sp>
         <p:nvSpPr>
-          <p:cNvPr id="12" name="PlaceHolder 2"/>
+          <p:cNvPr id="14" name="PlaceHolder 2"/>
           <p:cNvSpPr>
             <a:spLocks noGrp="1"/>
           </p:cNvSpPr>
@@ -1166,7 +1273,7 @@
         <p:spPr>
           <a:xfrm>
             <a:off x="180000" y="4860000"/>
-            <a:ext cx="7166880" cy="538920"/>
+            <a:ext cx="7166520" cy="538560"/>
           </a:xfrm>
           <a:prstGeom prst="rect">
             <a:avLst/>
@@ -1298,7 +1405,7 @@
       </p:sp>
       <p:sp>
         <p:nvSpPr>
-          <p:cNvPr id="13" name="PlaceHolder 3"/>
+          <p:cNvPr id="15" name="PlaceHolder 3"/>
           <p:cNvSpPr>
             <a:spLocks noGrp="1"/>
           </p:cNvSpPr>
@@ -1309,7 +1416,7 @@
         <p:spPr>
           <a:xfrm>
             <a:off x="1980000" y="754200"/>
-            <a:ext cx="8098920" cy="684720"/>
+            <a:ext cx="8098560" cy="684360"/>
           </a:xfrm>
           <a:prstGeom prst="rect">
             <a:avLst/>
@@ -1355,7 +1462,7 @@
       </p:sp>
       <p:pic>
         <p:nvPicPr>
-          <p:cNvPr id="14" name="" descr=""/>
+          <p:cNvPr id="16" name="" descr=""/>
           <p:cNvPicPr/>
           <p:nvPr/>
         </p:nvPicPr>
@@ -1366,7 +1473,7 @@
         <p:spPr>
           <a:xfrm>
             <a:off x="180000" y="3705480"/>
-            <a:ext cx="4825800" cy="1513440"/>
+            <a:ext cx="4825440" cy="1513080"/>
           </a:xfrm>
           <a:prstGeom prst="rect">
             <a:avLst/>
@@ -1417,7 +1524,7 @@
       </p:grpSpPr>
       <p:sp>
         <p:nvSpPr>
-          <p:cNvPr id="36" name="PlaceHolder 1"/>
+          <p:cNvPr id="38" name="PlaceHolder 1"/>
           <p:cNvSpPr>
             <a:spLocks noGrp="1"/>
           </p:cNvSpPr>
@@ -1428,7 +1535,7 @@
         <p:spPr>
           <a:xfrm>
             <a:off x="1973160" y="225000"/>
-            <a:ext cx="6933240" cy="714960"/>
+            <a:ext cx="6932880" cy="714600"/>
           </a:xfrm>
           <a:prstGeom prst="rect">
             <a:avLst/>
@@ -1474,7 +1581,7 @@
       </p:sp>
       <p:sp>
         <p:nvSpPr>
-          <p:cNvPr id="37" name="PlaceHolder 2"/>
+          <p:cNvPr id="39" name="PlaceHolder 2"/>
           <p:cNvSpPr>
             <a:spLocks noGrp="1"/>
           </p:cNvSpPr>
@@ -1485,7 +1592,7 @@
         <p:spPr>
           <a:xfrm>
             <a:off x="1980000" y="1440000"/>
-            <a:ext cx="6933240" cy="4499280"/>
+            <a:ext cx="6932880" cy="4498920"/>
           </a:xfrm>
           <a:prstGeom prst="rect">
             <a:avLst/>
@@ -1996,14 +2103,14 @@
       </p:sp>
       <p:sp>
         <p:nvSpPr>
-          <p:cNvPr id="38" name="PlaceHolder 18"/>
+          <p:cNvPr id="40" name="PlaceHolder 18"/>
           <p:cNvSpPr/>
           <p:nvPr/>
         </p:nvSpPr>
         <p:spPr>
           <a:xfrm>
             <a:off x="1973160" y="900000"/>
-            <a:ext cx="6933240" cy="359280"/>
+            <a:ext cx="6932880" cy="358920"/>
           </a:xfrm>
           <a:prstGeom prst="rect">
             <a:avLst/>
@@ -2094,7 +2201,7 @@
       </p:sp>
       <p:pic>
         <p:nvPicPr>
-          <p:cNvPr id="39" name="" descr=""/>
+          <p:cNvPr id="41" name="" descr=""/>
           <p:cNvPicPr/>
           <p:nvPr/>
         </p:nvPicPr>
@@ -2105,7 +2212,7 @@
         <p:spPr>
           <a:xfrm>
             <a:off x="1980360" y="5711760"/>
-            <a:ext cx="7019280" cy="767880"/>
+            <a:ext cx="7018920" cy="767520"/>
           </a:xfrm>
           <a:prstGeom prst="rect">
             <a:avLst/>
@@ -2116,6 +2223,2198 @@
           </a:ln>
         </p:spPr>
       </p:pic>
+    </p:spTree>
+  </p:cSld>
+  <mc:AlternateContent>
+    <mc:Choice Requires="p14">
+      <p:transition spd="slow" p14:dur="2000"/>
+    </mc:Choice>
+    <mc:Fallback>
+      <p:transition spd="slow"/>
+    </mc:Fallback>
+  </mc:AlternateContent>
+</p:sld>
+</file>
+
+<file path=ppt/slides/slide11.xml><?xml version="1.0" encoding="utf-8"?>
+<p:sld xmlns:a="http://schemas.openxmlformats.org/drawingml/2006/main" xmlns:p="http://schemas.openxmlformats.org/presentationml/2006/main" xmlns:r="http://schemas.openxmlformats.org/officeDocument/2006/relationships" xmlns:p14="http://schemas.microsoft.com/office/powerpoint/2010/main" xmlns:p15="http://schemas.microsoft.com/office/powerpoint/2012/main" xmlns:mc="http://schemas.openxmlformats.org/markup-compatibility/2006">
+  <p:cSld>
+    <p:bg>
+      <p:bgPr>
+        <a:blipFill rotWithShape="0">
+          <a:blip r:embed="rId1"/>
+          <a:stretch/>
+        </a:blipFill>
+      </p:bgPr>
+    </p:bg>
+    <p:spTree>
+      <p:nvGrpSpPr>
+        <p:cNvPr id="1" name=""/>
+        <p:cNvGrpSpPr/>
+        <p:nvPr/>
+      </p:nvGrpSpPr>
+      <p:grpSpPr>
+        <a:xfrm>
+          <a:off x="0" y="0"/>
+          <a:ext cx="0" cy="0"/>
+          <a:chOff x="0" y="0"/>
+          <a:chExt cx="0" cy="0"/>
+        </a:xfrm>
+      </p:grpSpPr>
+      <p:sp>
+        <p:nvSpPr>
+          <p:cNvPr id="42" name="PlaceHolder 1"/>
+          <p:cNvSpPr>
+            <a:spLocks noGrp="1"/>
+          </p:cNvSpPr>
+          <p:nvPr>
+            <p:ph type="title"/>
+          </p:nvPr>
+        </p:nvSpPr>
+        <p:spPr>
+          <a:xfrm>
+            <a:off x="1973160" y="225000"/>
+            <a:ext cx="6932880" cy="714600"/>
+          </a:xfrm>
+          <a:prstGeom prst="rect">
+            <a:avLst/>
+          </a:prstGeom>
+          <a:noFill/>
+          <a:ln w="0">
+            <a:noFill/>
+          </a:ln>
+        </p:spPr>
+        <p:txBody>
+          <a:bodyPr lIns="90000" rIns="90000" tIns="46800" bIns="46800" anchor="ctr">
+            <a:noAutofit/>
+          </a:bodyPr>
+          <a:p>
+            <a:pPr indent="0">
+              <a:lnSpc>
+                <a:spcPct val="100000"/>
+              </a:lnSpc>
+              <a:spcBef>
+                <a:spcPts val="1191"/>
+              </a:spcBef>
+              <a:spcAft>
+                <a:spcPts val="992"/>
+              </a:spcAft>
+              <a:buNone/>
+              <a:tabLst>
+                <a:tab algn="l" pos="0"/>
+              </a:tabLst>
+            </a:pPr>
+            <a:r>
+              <a:rPr b="0" lang="it-IT" sz="2600" strike="noStrike" u="none">
+                <a:solidFill>
+                  <a:srgbClr val="4d4d4d"/>
+                </a:solidFill>
+                <a:uFillTx/>
+                <a:latin typeface="Microsoft Sans Serif"/>
+              </a:rPr>
+              <a:t>5. Struttura delle Directory Backend (Node.js) </a:t>
+            </a:r>
+            <a:endParaRPr b="0" lang="it-IT" sz="2600" strike="noStrike" u="none">
+              <a:solidFill>
+                <a:srgbClr val="000000"/>
+              </a:solidFill>
+              <a:uFillTx/>
+              <a:latin typeface="Arial"/>
+            </a:endParaRPr>
+          </a:p>
+        </p:txBody>
+      </p:sp>
+      <p:sp>
+        <p:nvSpPr>
+          <p:cNvPr id="43" name="PlaceHolder 5"/>
+          <p:cNvSpPr txBox="1"/>
+          <p:nvPr/>
+        </p:nvSpPr>
+        <p:spPr>
+          <a:xfrm>
+            <a:off x="1973160" y="939960"/>
+            <a:ext cx="6932880" cy="5360040"/>
+          </a:xfrm>
+          <a:prstGeom prst="rect">
+            <a:avLst/>
+          </a:prstGeom>
+          <a:noFill/>
+          <a:ln w="0">
+            <a:noFill/>
+          </a:ln>
+        </p:spPr>
+        <p:txBody>
+          <a:bodyPr lIns="90000" rIns="90000" tIns="46800" bIns="46800" anchor="t">
+            <a:noAutofit/>
+          </a:bodyPr>
+          <a:p>
+            <a:pPr>
+              <a:lnSpc>
+                <a:spcPct val="100000"/>
+              </a:lnSpc>
+              <a:spcBef>
+                <a:spcPts val="340"/>
+              </a:spcBef>
+              <a:spcAft>
+                <a:spcPts val="283"/>
+              </a:spcAft>
+              <a:tabLst>
+                <a:tab algn="l" pos="0"/>
+              </a:tabLst>
+            </a:pPr>
+            <a:r>
+              <a:rPr b="0" lang="it-IT" sz="1500" strike="noStrike" u="none">
+                <a:solidFill>
+                  <a:srgbClr val="4d4d4d"/>
+                </a:solidFill>
+                <a:uFillTx/>
+                <a:latin typeface="Verdana"/>
+              </a:rPr>
+              <a:t> 📂 </a:t>
+            </a:r>
+            <a:r>
+              <a:rPr b="0" lang="it-IT" sz="1500" strike="noStrike" u="none">
+                <a:solidFill>
+                  <a:srgbClr val="4d4d4d"/>
+                </a:solidFill>
+                <a:uFillTx/>
+                <a:latin typeface="Verdana"/>
+              </a:rPr>
+              <a:t>backend</a:t>
+            </a:r>
+            <a:endParaRPr b="0" lang="it-IT" sz="1500" strike="noStrike" u="none">
+              <a:solidFill>
+                <a:srgbClr val="000000"/>
+              </a:solidFill>
+              <a:uFillTx/>
+              <a:latin typeface="Verdana"/>
+              <a:ea typeface="Microsoft YaHei"/>
+            </a:endParaRPr>
+          </a:p>
+          <a:p>
+            <a:pPr>
+              <a:lnSpc>
+                <a:spcPct val="100000"/>
+              </a:lnSpc>
+              <a:spcBef>
+                <a:spcPts val="340"/>
+              </a:spcBef>
+              <a:spcAft>
+                <a:spcPts val="283"/>
+              </a:spcAft>
+              <a:tabLst>
+                <a:tab algn="l" pos="0"/>
+              </a:tabLst>
+            </a:pPr>
+            <a:r>
+              <a:rPr b="0" lang="it-IT" sz="1500" strike="noStrike" u="none">
+                <a:solidFill>
+                  <a:srgbClr val="4d4d4d"/>
+                </a:solidFill>
+                <a:uFillTx/>
+                <a:latin typeface="Verdana"/>
+                <a:ea typeface="Microsoft YaHei"/>
+              </a:rPr>
+              <a:t>├──</a:t>
+            </a:r>
+            <a:r>
+              <a:rPr b="0" lang="it-IT" sz="1500" strike="noStrike" u="none">
+                <a:solidFill>
+                  <a:srgbClr val="000000"/>
+                </a:solidFill>
+                <a:uFillTx/>
+                <a:latin typeface="Verdana"/>
+                <a:ea typeface="Microsoft YaHei"/>
+              </a:rPr>
+              <a:t> 📂 </a:t>
+            </a:r>
+            <a:r>
+              <a:rPr b="0" lang="it-IT" sz="1500" strike="noStrike" u="none">
+                <a:solidFill>
+                  <a:srgbClr val="000000"/>
+                </a:solidFill>
+                <a:uFillTx/>
+                <a:latin typeface="Verdana"/>
+                <a:ea typeface="Microsoft YaHei"/>
+              </a:rPr>
+              <a:t>config</a:t>
+            </a:r>
+            <a:endParaRPr b="0" lang="it-IT" sz="1500" strike="noStrike" u="none">
+              <a:solidFill>
+                <a:srgbClr val="000000"/>
+              </a:solidFill>
+              <a:uFillTx/>
+              <a:latin typeface="Verdana"/>
+              <a:ea typeface="Microsoft YaHei"/>
+            </a:endParaRPr>
+          </a:p>
+          <a:p>
+            <a:pPr>
+              <a:lnSpc>
+                <a:spcPct val="100000"/>
+              </a:lnSpc>
+              <a:spcBef>
+                <a:spcPts val="340"/>
+              </a:spcBef>
+              <a:spcAft>
+                <a:spcPts val="283"/>
+              </a:spcAft>
+              <a:tabLst>
+                <a:tab algn="l" pos="0"/>
+              </a:tabLst>
+            </a:pPr>
+            <a:r>
+              <a:rPr b="0" lang="it-IT" sz="1500" strike="noStrike" u="none">
+                <a:solidFill>
+                  <a:srgbClr val="4d4d4d"/>
+                </a:solidFill>
+                <a:uFillTx/>
+                <a:latin typeface="Verdana"/>
+              </a:rPr>
+              <a:t>│    </a:t>
+            </a:r>
+            <a:r>
+              <a:rPr b="0" lang="it-IT" sz="1500" strike="noStrike" u="none">
+                <a:solidFill>
+                  <a:srgbClr val="4d4d4d"/>
+                </a:solidFill>
+                <a:uFillTx/>
+                <a:latin typeface="Verdana"/>
+              </a:rPr>
+              <a:t>|── 📄 index.js  → </a:t>
+            </a:r>
+            <a:r>
+              <a:rPr b="1" lang="it-IT" sz="1500" strike="noStrike" u="none">
+                <a:solidFill>
+                  <a:srgbClr val="4d4d4d"/>
+                </a:solidFill>
+                <a:uFillTx/>
+                <a:latin typeface="Verdana"/>
+              </a:rPr>
+              <a:t>Configurazione database</a:t>
+            </a:r>
+            <a:endParaRPr b="0" lang="it-IT" sz="1500" strike="noStrike" u="none">
+              <a:solidFill>
+                <a:srgbClr val="000000"/>
+              </a:solidFill>
+              <a:uFillTx/>
+              <a:latin typeface="Verdana"/>
+              <a:ea typeface="Microsoft YaHei"/>
+            </a:endParaRPr>
+          </a:p>
+          <a:p>
+            <a:pPr>
+              <a:lnSpc>
+                <a:spcPct val="100000"/>
+              </a:lnSpc>
+              <a:spcBef>
+                <a:spcPts val="340"/>
+              </a:spcBef>
+              <a:spcAft>
+                <a:spcPts val="283"/>
+              </a:spcAft>
+              <a:tabLst>
+                <a:tab algn="l" pos="0"/>
+              </a:tabLst>
+            </a:pPr>
+            <a:r>
+              <a:rPr b="0" lang="it-IT" sz="1500" strike="noStrike" u="none">
+                <a:solidFill>
+                  <a:srgbClr val="4d4d4d"/>
+                </a:solidFill>
+                <a:uFillTx/>
+                <a:latin typeface="Verdana"/>
+              </a:rPr>
+              <a:t>├── 📂 </a:t>
+            </a:r>
+            <a:r>
+              <a:rPr b="0" lang="it-IT" sz="1500" strike="noStrike" u="none">
+                <a:solidFill>
+                  <a:srgbClr val="4d4d4d"/>
+                </a:solidFill>
+                <a:uFillTx/>
+                <a:latin typeface="Verdana"/>
+              </a:rPr>
+              <a:t>middleware</a:t>
+            </a:r>
+            <a:endParaRPr b="0" lang="it-IT" sz="1500" strike="noStrike" u="none">
+              <a:solidFill>
+                <a:srgbClr val="000000"/>
+              </a:solidFill>
+              <a:uFillTx/>
+              <a:latin typeface="Verdana"/>
+              <a:ea typeface="Microsoft YaHei"/>
+            </a:endParaRPr>
+          </a:p>
+          <a:p>
+            <a:pPr>
+              <a:lnSpc>
+                <a:spcPct val="100000"/>
+              </a:lnSpc>
+              <a:spcBef>
+                <a:spcPts val="340"/>
+              </a:spcBef>
+              <a:spcAft>
+                <a:spcPts val="283"/>
+              </a:spcAft>
+              <a:tabLst>
+                <a:tab algn="l" pos="0"/>
+              </a:tabLst>
+            </a:pPr>
+            <a:r>
+              <a:rPr b="0" lang="it-IT" sz="1500" strike="noStrike" u="none">
+                <a:solidFill>
+                  <a:srgbClr val="4d4d4d"/>
+                </a:solidFill>
+                <a:uFillTx/>
+                <a:latin typeface="Verdana"/>
+              </a:rPr>
+              <a:t>│    </a:t>
+            </a:r>
+            <a:r>
+              <a:rPr b="0" lang="it-IT" sz="1500" strike="noStrike" u="none">
+                <a:solidFill>
+                  <a:srgbClr val="4d4d4d"/>
+                </a:solidFill>
+                <a:uFillTx/>
+                <a:latin typeface="Verdana"/>
+              </a:rPr>
+              <a:t>|── 📄 authMiddleware.js  → </a:t>
+            </a:r>
+            <a:r>
+              <a:rPr b="1" lang="it-IT" sz="1500" strike="noStrike" u="none">
+                <a:solidFill>
+                  <a:srgbClr val="4d4d4d"/>
+                </a:solidFill>
+                <a:uFillTx/>
+                <a:latin typeface="Verdana"/>
+              </a:rPr>
+              <a:t>Middleware per sicurezza</a:t>
+            </a:r>
+            <a:endParaRPr b="0" lang="it-IT" sz="1500" strike="noStrike" u="none">
+              <a:solidFill>
+                <a:srgbClr val="000000"/>
+              </a:solidFill>
+              <a:uFillTx/>
+              <a:latin typeface="Verdana"/>
+              <a:ea typeface="Microsoft YaHei"/>
+            </a:endParaRPr>
+          </a:p>
+          <a:p>
+            <a:pPr>
+              <a:lnSpc>
+                <a:spcPct val="100000"/>
+              </a:lnSpc>
+              <a:spcBef>
+                <a:spcPts val="340"/>
+              </a:spcBef>
+              <a:spcAft>
+                <a:spcPts val="283"/>
+              </a:spcAft>
+              <a:tabLst>
+                <a:tab algn="l" pos="0"/>
+              </a:tabLst>
+            </a:pPr>
+            <a:r>
+              <a:rPr b="0" lang="it-IT" sz="1500" strike="noStrike" u="none">
+                <a:solidFill>
+                  <a:srgbClr val="4d4d4d"/>
+                </a:solidFill>
+                <a:uFillTx/>
+                <a:latin typeface="Verdana"/>
+              </a:rPr>
+              <a:t>├── 📂 </a:t>
+            </a:r>
+            <a:r>
+              <a:rPr b="0" lang="it-IT" sz="1500" strike="noStrike" u="none">
+                <a:solidFill>
+                  <a:srgbClr val="4d4d4d"/>
+                </a:solidFill>
+                <a:uFillTx/>
+                <a:latin typeface="Verdana"/>
+              </a:rPr>
+              <a:t>models  → </a:t>
+            </a:r>
+            <a:r>
+              <a:rPr b="1" lang="it-IT" sz="1500" strike="noStrike" u="none">
+                <a:solidFill>
+                  <a:srgbClr val="4d4d4d"/>
+                </a:solidFill>
+                <a:uFillTx/>
+                <a:latin typeface="Verdana"/>
+              </a:rPr>
+              <a:t>Definizione delle tabelle</a:t>
+            </a:r>
+            <a:endParaRPr b="0" lang="it-IT" sz="1500" strike="noStrike" u="none">
+              <a:solidFill>
+                <a:srgbClr val="000000"/>
+              </a:solidFill>
+              <a:uFillTx/>
+              <a:latin typeface="Verdana"/>
+              <a:ea typeface="Microsoft YaHei"/>
+            </a:endParaRPr>
+          </a:p>
+          <a:p>
+            <a:pPr>
+              <a:lnSpc>
+                <a:spcPct val="100000"/>
+              </a:lnSpc>
+              <a:spcBef>
+                <a:spcPts val="340"/>
+              </a:spcBef>
+              <a:spcAft>
+                <a:spcPts val="283"/>
+              </a:spcAft>
+              <a:tabLst>
+                <a:tab algn="l" pos="0"/>
+              </a:tabLst>
+            </a:pPr>
+            <a:r>
+              <a:rPr b="0" lang="it-IT" sz="1500" strike="noStrike" u="none">
+                <a:solidFill>
+                  <a:srgbClr val="4d4d4d"/>
+                </a:solidFill>
+                <a:uFillTx/>
+                <a:latin typeface="Verdana"/>
+              </a:rPr>
+              <a:t>│   ├── 📄 </a:t>
+            </a:r>
+            <a:r>
+              <a:rPr b="0" lang="it-IT" sz="1500" strike="noStrike" u="none">
+                <a:solidFill>
+                  <a:srgbClr val="4d4d4d"/>
+                </a:solidFill>
+                <a:uFillTx/>
+                <a:latin typeface="Verdana"/>
+              </a:rPr>
+              <a:t>userModel.js  → </a:t>
+            </a:r>
+            <a:r>
+              <a:rPr b="1" lang="it-IT" sz="1500" strike="noStrike" u="none">
+                <a:solidFill>
+                  <a:srgbClr val="4d4d4d"/>
+                </a:solidFill>
+                <a:uFillTx/>
+                <a:latin typeface="Verdana"/>
+              </a:rPr>
+              <a:t>Utenti e ruoli</a:t>
+            </a:r>
+            <a:endParaRPr b="0" lang="it-IT" sz="1500" strike="noStrike" u="none">
+              <a:solidFill>
+                <a:srgbClr val="000000"/>
+              </a:solidFill>
+              <a:uFillTx/>
+              <a:latin typeface="Verdana"/>
+              <a:ea typeface="Microsoft YaHei"/>
+            </a:endParaRPr>
+          </a:p>
+          <a:p>
+            <a:pPr>
+              <a:lnSpc>
+                <a:spcPct val="100000"/>
+              </a:lnSpc>
+              <a:spcBef>
+                <a:spcPts val="340"/>
+              </a:spcBef>
+              <a:spcAft>
+                <a:spcPts val="283"/>
+              </a:spcAft>
+              <a:tabLst>
+                <a:tab algn="l" pos="0"/>
+              </a:tabLst>
+            </a:pPr>
+            <a:r>
+              <a:rPr b="0" lang="it-IT" sz="1500" strike="noStrike" u="none">
+                <a:solidFill>
+                  <a:srgbClr val="4d4d4d"/>
+                </a:solidFill>
+                <a:uFillTx/>
+                <a:latin typeface="Verdana"/>
+              </a:rPr>
+              <a:t>│   ├── 📄 </a:t>
+            </a:r>
+            <a:r>
+              <a:rPr b="0" lang="it-IT" sz="1500" strike="noStrike" u="none">
+                <a:solidFill>
+                  <a:srgbClr val="4d4d4d"/>
+                </a:solidFill>
+                <a:uFillTx/>
+                <a:latin typeface="Verdana"/>
+              </a:rPr>
+              <a:t>flightModel.js  → </a:t>
+            </a:r>
+            <a:r>
+              <a:rPr b="1" lang="it-IT" sz="1500" strike="noStrike" u="none">
+                <a:solidFill>
+                  <a:srgbClr val="4d4d4d"/>
+                </a:solidFill>
+                <a:uFillTx/>
+                <a:latin typeface="Verdana"/>
+              </a:rPr>
+              <a:t>Voli</a:t>
+            </a:r>
+            <a:endParaRPr b="0" lang="it-IT" sz="1500" strike="noStrike" u="none">
+              <a:solidFill>
+                <a:srgbClr val="000000"/>
+              </a:solidFill>
+              <a:uFillTx/>
+              <a:latin typeface="Verdana"/>
+              <a:ea typeface="Microsoft YaHei"/>
+            </a:endParaRPr>
+          </a:p>
+          <a:p>
+            <a:pPr>
+              <a:lnSpc>
+                <a:spcPct val="100000"/>
+              </a:lnSpc>
+              <a:spcBef>
+                <a:spcPts val="340"/>
+              </a:spcBef>
+              <a:spcAft>
+                <a:spcPts val="283"/>
+              </a:spcAft>
+              <a:tabLst>
+                <a:tab algn="l" pos="0"/>
+              </a:tabLst>
+            </a:pPr>
+            <a:r>
+              <a:rPr b="0" lang="it-IT" sz="1500" strike="noStrike" u="none">
+                <a:solidFill>
+                  <a:srgbClr val="4d4d4d"/>
+                </a:solidFill>
+                <a:uFillTx/>
+                <a:latin typeface="Verdana"/>
+              </a:rPr>
+              <a:t>│   ├── 📄 </a:t>
+            </a:r>
+            <a:r>
+              <a:rPr b="0" lang="it-IT" sz="1500" strike="noStrike" u="none">
+                <a:solidFill>
+                  <a:srgbClr val="4d4d4d"/>
+                </a:solidFill>
+                <a:uFillTx/>
+                <a:latin typeface="Verdana"/>
+              </a:rPr>
+              <a:t>ticketModel.js  → </a:t>
+            </a:r>
+            <a:r>
+              <a:rPr b="1" lang="it-IT" sz="1500" strike="noStrike" u="none">
+                <a:solidFill>
+                  <a:srgbClr val="4d4d4d"/>
+                </a:solidFill>
+                <a:uFillTx/>
+                <a:latin typeface="Verdana"/>
+              </a:rPr>
+              <a:t>Biglietti</a:t>
+            </a:r>
+            <a:endParaRPr b="0" lang="it-IT" sz="1500" strike="noStrike" u="none">
+              <a:solidFill>
+                <a:srgbClr val="000000"/>
+              </a:solidFill>
+              <a:uFillTx/>
+              <a:latin typeface="Verdana"/>
+              <a:ea typeface="Microsoft YaHei"/>
+            </a:endParaRPr>
+          </a:p>
+          <a:p>
+            <a:pPr>
+              <a:lnSpc>
+                <a:spcPct val="100000"/>
+              </a:lnSpc>
+              <a:spcBef>
+                <a:spcPts val="340"/>
+              </a:spcBef>
+              <a:spcAft>
+                <a:spcPts val="283"/>
+              </a:spcAft>
+              <a:tabLst>
+                <a:tab algn="l" pos="0"/>
+              </a:tabLst>
+            </a:pPr>
+            <a:r>
+              <a:rPr b="0" lang="it-IT" sz="1500" strike="noStrike" u="none">
+                <a:solidFill>
+                  <a:srgbClr val="4d4d4d"/>
+                </a:solidFill>
+                <a:uFillTx/>
+                <a:latin typeface="Verdana"/>
+              </a:rPr>
+              <a:t>│   ├── 📄 </a:t>
+            </a:r>
+            <a:r>
+              <a:rPr b="0" lang="it-IT" sz="1500" strike="noStrike" u="none">
+                <a:solidFill>
+                  <a:srgbClr val="4d4d4d"/>
+                </a:solidFill>
+                <a:uFillTx/>
+                <a:latin typeface="Verdana"/>
+              </a:rPr>
+              <a:t>historyModel.js  → </a:t>
+            </a:r>
+            <a:r>
+              <a:rPr b="1" lang="it-IT" sz="1500" strike="noStrike" u="none">
+                <a:solidFill>
+                  <a:srgbClr val="4d4d4d"/>
+                </a:solidFill>
+                <a:uFillTx/>
+                <a:latin typeface="Verdana"/>
+              </a:rPr>
+              <a:t>Storico operazioni</a:t>
+            </a:r>
+            <a:endParaRPr b="0" lang="it-IT" sz="1500" strike="noStrike" u="none">
+              <a:solidFill>
+                <a:srgbClr val="000000"/>
+              </a:solidFill>
+              <a:uFillTx/>
+              <a:latin typeface="Verdana"/>
+              <a:ea typeface="Microsoft YaHei"/>
+            </a:endParaRPr>
+          </a:p>
+          <a:p>
+            <a:pPr>
+              <a:lnSpc>
+                <a:spcPct val="100000"/>
+              </a:lnSpc>
+              <a:spcBef>
+                <a:spcPts val="340"/>
+              </a:spcBef>
+              <a:spcAft>
+                <a:spcPts val="283"/>
+              </a:spcAft>
+              <a:tabLst>
+                <a:tab algn="l" pos="0"/>
+              </a:tabLst>
+            </a:pPr>
+            <a:r>
+              <a:rPr b="0" lang="it-IT" sz="1500" strike="noStrike" u="none">
+                <a:solidFill>
+                  <a:srgbClr val="4d4d4d"/>
+                </a:solidFill>
+                <a:uFillTx/>
+                <a:latin typeface="Verdana"/>
+              </a:rPr>
+              <a:t>├── 📂 </a:t>
+            </a:r>
+            <a:r>
+              <a:rPr b="0" lang="it-IT" sz="1500" strike="noStrike" u="none">
+                <a:solidFill>
+                  <a:srgbClr val="4d4d4d"/>
+                </a:solidFill>
+                <a:uFillTx/>
+                <a:latin typeface="Verdana"/>
+              </a:rPr>
+              <a:t>routes  →</a:t>
+            </a:r>
+            <a:r>
+              <a:rPr b="1" lang="it-IT" sz="1500" strike="noStrike" u="none">
+                <a:solidFill>
+                  <a:srgbClr val="4d4d4d"/>
+                </a:solidFill>
+                <a:uFillTx/>
+                <a:latin typeface="Verdana"/>
+              </a:rPr>
+              <a:t> API REST per ogni funzionalità</a:t>
+            </a:r>
+            <a:endParaRPr b="0" lang="it-IT" sz="1500" strike="noStrike" u="none">
+              <a:solidFill>
+                <a:srgbClr val="000000"/>
+              </a:solidFill>
+              <a:uFillTx/>
+              <a:latin typeface="Verdana"/>
+              <a:ea typeface="Microsoft YaHei"/>
+            </a:endParaRPr>
+          </a:p>
+          <a:p>
+            <a:pPr>
+              <a:lnSpc>
+                <a:spcPct val="100000"/>
+              </a:lnSpc>
+              <a:spcBef>
+                <a:spcPts val="340"/>
+              </a:spcBef>
+              <a:spcAft>
+                <a:spcPts val="283"/>
+              </a:spcAft>
+              <a:tabLst>
+                <a:tab algn="l" pos="0"/>
+              </a:tabLst>
+            </a:pPr>
+            <a:r>
+              <a:rPr b="0" lang="it-IT" sz="1500" strike="noStrike" u="none">
+                <a:solidFill>
+                  <a:srgbClr val="4d4d4d"/>
+                </a:solidFill>
+                <a:uFillTx/>
+                <a:latin typeface="Verdana"/>
+              </a:rPr>
+              <a:t>│   ├── 📄 </a:t>
+            </a:r>
+            <a:r>
+              <a:rPr b="0" lang="it-IT" sz="1500" strike="noStrike" u="none">
+                <a:solidFill>
+                  <a:srgbClr val="4d4d4d"/>
+                </a:solidFill>
+                <a:uFillTx/>
+                <a:latin typeface="Verdana"/>
+              </a:rPr>
+              <a:t>authRoute.js  → </a:t>
+            </a:r>
+            <a:r>
+              <a:rPr b="1" lang="it-IT" sz="1500" strike="noStrike" u="none">
+                <a:solidFill>
+                  <a:srgbClr val="4d4d4d"/>
+                </a:solidFill>
+                <a:uFillTx/>
+                <a:latin typeface="Verdana"/>
+              </a:rPr>
+              <a:t>Login, registrazione</a:t>
+            </a:r>
+            <a:endParaRPr b="0" lang="it-IT" sz="1500" strike="noStrike" u="none">
+              <a:solidFill>
+                <a:srgbClr val="000000"/>
+              </a:solidFill>
+              <a:uFillTx/>
+              <a:latin typeface="Verdana"/>
+              <a:ea typeface="Microsoft YaHei"/>
+            </a:endParaRPr>
+          </a:p>
+          <a:p>
+            <a:pPr>
+              <a:lnSpc>
+                <a:spcPct val="100000"/>
+              </a:lnSpc>
+              <a:spcBef>
+                <a:spcPts val="340"/>
+              </a:spcBef>
+              <a:spcAft>
+                <a:spcPts val="283"/>
+              </a:spcAft>
+              <a:tabLst>
+                <a:tab algn="l" pos="0"/>
+              </a:tabLst>
+            </a:pPr>
+            <a:r>
+              <a:rPr b="0" lang="it-IT" sz="1500" strike="noStrike" u="none">
+                <a:solidFill>
+                  <a:srgbClr val="4d4d4d"/>
+                </a:solidFill>
+                <a:uFillTx/>
+                <a:latin typeface="Verdana"/>
+              </a:rPr>
+              <a:t>│   ├── 📄 </a:t>
+            </a:r>
+            <a:r>
+              <a:rPr b="0" lang="it-IT" sz="1500" strike="noStrike" u="none">
+                <a:solidFill>
+                  <a:srgbClr val="4d4d4d"/>
+                </a:solidFill>
+                <a:uFillTx/>
+                <a:latin typeface="Verdana"/>
+              </a:rPr>
+              <a:t>flightRoute.js  → </a:t>
+            </a:r>
+            <a:r>
+              <a:rPr b="1" lang="it-IT" sz="1500" strike="noStrike" u="none">
+                <a:solidFill>
+                  <a:srgbClr val="4d4d4d"/>
+                </a:solidFill>
+                <a:uFillTx/>
+                <a:latin typeface="Verdana"/>
+              </a:rPr>
+              <a:t>Gestione voli</a:t>
+            </a:r>
+            <a:endParaRPr b="0" lang="it-IT" sz="1500" strike="noStrike" u="none">
+              <a:solidFill>
+                <a:srgbClr val="000000"/>
+              </a:solidFill>
+              <a:uFillTx/>
+              <a:latin typeface="Verdana"/>
+              <a:ea typeface="Microsoft YaHei"/>
+            </a:endParaRPr>
+          </a:p>
+          <a:p>
+            <a:pPr>
+              <a:lnSpc>
+                <a:spcPct val="100000"/>
+              </a:lnSpc>
+              <a:spcBef>
+                <a:spcPts val="340"/>
+              </a:spcBef>
+              <a:spcAft>
+                <a:spcPts val="283"/>
+              </a:spcAft>
+              <a:tabLst>
+                <a:tab algn="l" pos="0"/>
+              </a:tabLst>
+            </a:pPr>
+            <a:r>
+              <a:rPr b="0" lang="it-IT" sz="1500" strike="noStrike" u="none">
+                <a:solidFill>
+                  <a:srgbClr val="4d4d4d"/>
+                </a:solidFill>
+                <a:uFillTx/>
+                <a:latin typeface="Verdana"/>
+              </a:rPr>
+              <a:t>│   ├── 📄 </a:t>
+            </a:r>
+            <a:r>
+              <a:rPr b="0" lang="it-IT" sz="1500" strike="noStrike" u="none">
+                <a:solidFill>
+                  <a:srgbClr val="4d4d4d"/>
+                </a:solidFill>
+                <a:uFillTx/>
+                <a:latin typeface="Verdana"/>
+              </a:rPr>
+              <a:t>ticketRoute.js  → </a:t>
+            </a:r>
+            <a:r>
+              <a:rPr b="1" lang="it-IT" sz="1500" strike="noStrike" u="none">
+                <a:solidFill>
+                  <a:srgbClr val="4d4d4d"/>
+                </a:solidFill>
+                <a:uFillTx/>
+                <a:latin typeface="Verdana"/>
+              </a:rPr>
+              <a:t>Acquisto/cancellazione biglietti</a:t>
+            </a:r>
+            <a:endParaRPr b="0" lang="it-IT" sz="1500" strike="noStrike" u="none">
+              <a:solidFill>
+                <a:srgbClr val="000000"/>
+              </a:solidFill>
+              <a:uFillTx/>
+              <a:latin typeface="Verdana"/>
+              <a:ea typeface="Microsoft YaHei"/>
+            </a:endParaRPr>
+          </a:p>
+          <a:p>
+            <a:pPr>
+              <a:lnSpc>
+                <a:spcPct val="100000"/>
+              </a:lnSpc>
+              <a:spcBef>
+                <a:spcPts val="340"/>
+              </a:spcBef>
+              <a:spcAft>
+                <a:spcPts val="283"/>
+              </a:spcAft>
+              <a:tabLst>
+                <a:tab algn="l" pos="0"/>
+              </a:tabLst>
+            </a:pPr>
+            <a:r>
+              <a:rPr b="0" lang="it-IT" sz="1500" strike="noStrike" u="none">
+                <a:solidFill>
+                  <a:srgbClr val="4d4d4d"/>
+                </a:solidFill>
+                <a:uFillTx/>
+                <a:latin typeface="Verdana"/>
+              </a:rPr>
+              <a:t>│   ├── 📄 </a:t>
+            </a:r>
+            <a:r>
+              <a:rPr b="0" lang="it-IT" sz="1500" strike="noStrike" u="none">
+                <a:solidFill>
+                  <a:srgbClr val="4d4d4d"/>
+                </a:solidFill>
+                <a:uFillTx/>
+                <a:latin typeface="Verdana"/>
+              </a:rPr>
+              <a:t>historyRoute.js  → </a:t>
+            </a:r>
+            <a:r>
+              <a:rPr b="1" lang="it-IT" sz="1500" strike="noStrike" u="none">
+                <a:solidFill>
+                  <a:srgbClr val="4d4d4d"/>
+                </a:solidFill>
+                <a:uFillTx/>
+                <a:latin typeface="Verdana"/>
+              </a:rPr>
+              <a:t>Storico transazioni</a:t>
+            </a:r>
+            <a:endParaRPr b="0" lang="it-IT" sz="1500" strike="noStrike" u="none">
+              <a:solidFill>
+                <a:srgbClr val="000000"/>
+              </a:solidFill>
+              <a:uFillTx/>
+              <a:latin typeface="Verdana"/>
+              <a:ea typeface="Microsoft YaHei"/>
+            </a:endParaRPr>
+          </a:p>
+          <a:p>
+            <a:pPr>
+              <a:lnSpc>
+                <a:spcPct val="100000"/>
+              </a:lnSpc>
+              <a:spcBef>
+                <a:spcPts val="340"/>
+              </a:spcBef>
+              <a:spcAft>
+                <a:spcPts val="283"/>
+              </a:spcAft>
+              <a:tabLst>
+                <a:tab algn="l" pos="0"/>
+              </a:tabLst>
+            </a:pPr>
+            <a:r>
+              <a:rPr b="0" lang="it-IT" sz="1500" strike="noStrike" u="none">
+                <a:solidFill>
+                  <a:srgbClr val="4d4d4d"/>
+                </a:solidFill>
+                <a:uFillTx/>
+                <a:latin typeface="Verdana"/>
+              </a:rPr>
+              <a:t>│   ├── 📄 </a:t>
+            </a:r>
+            <a:r>
+              <a:rPr b="0" lang="it-IT" sz="1500" strike="noStrike" u="none">
+                <a:solidFill>
+                  <a:srgbClr val="4d4d4d"/>
+                </a:solidFill>
+                <a:uFillTx/>
+                <a:latin typeface="Verdana"/>
+              </a:rPr>
+              <a:t>userRoleRoute.js  → </a:t>
+            </a:r>
+            <a:r>
+              <a:rPr b="1" lang="it-IT" sz="1500" strike="noStrike" u="none">
+                <a:solidFill>
+                  <a:srgbClr val="4d4d4d"/>
+                </a:solidFill>
+                <a:uFillTx/>
+                <a:latin typeface="Verdana"/>
+              </a:rPr>
+              <a:t>Gestione ruoli</a:t>
+            </a:r>
+            <a:endParaRPr b="0" lang="it-IT" sz="1500" strike="noStrike" u="none">
+              <a:solidFill>
+                <a:srgbClr val="000000"/>
+              </a:solidFill>
+              <a:uFillTx/>
+              <a:latin typeface="Verdana"/>
+              <a:ea typeface="Microsoft YaHei"/>
+            </a:endParaRPr>
+          </a:p>
+          <a:p>
+            <a:pPr>
+              <a:lnSpc>
+                <a:spcPct val="100000"/>
+              </a:lnSpc>
+              <a:spcBef>
+                <a:spcPts val="340"/>
+              </a:spcBef>
+              <a:spcAft>
+                <a:spcPts val="283"/>
+              </a:spcAft>
+              <a:tabLst>
+                <a:tab algn="l" pos="0"/>
+              </a:tabLst>
+            </a:pPr>
+            <a:r>
+              <a:rPr b="0" lang="it-IT" sz="1500" strike="noStrike" u="none">
+                <a:solidFill>
+                  <a:srgbClr val="4d4d4d"/>
+                </a:solidFill>
+                <a:uFillTx/>
+                <a:latin typeface="Verdana"/>
+              </a:rPr>
+              <a:t>├── 📄 </a:t>
+            </a:r>
+            <a:r>
+              <a:rPr b="0" lang="it-IT" sz="1500" strike="noStrike" u="none">
+                <a:solidFill>
+                  <a:srgbClr val="4d4d4d"/>
+                </a:solidFill>
+                <a:uFillTx/>
+                <a:latin typeface="Verdana"/>
+              </a:rPr>
+              <a:t>app.js  → </a:t>
+            </a:r>
+            <a:r>
+              <a:rPr b="1" lang="it-IT" sz="1500" strike="noStrike" u="none">
+                <a:solidFill>
+                  <a:srgbClr val="4d4d4d"/>
+                </a:solidFill>
+                <a:uFillTx/>
+                <a:latin typeface="Verdana"/>
+              </a:rPr>
+              <a:t>Inizializzazione server Express</a:t>
+            </a:r>
+            <a:endParaRPr b="0" lang="it-IT" sz="1500" strike="noStrike" u="none">
+              <a:solidFill>
+                <a:srgbClr val="000000"/>
+              </a:solidFill>
+              <a:uFillTx/>
+              <a:latin typeface="Verdana"/>
+              <a:ea typeface="Microsoft YaHei"/>
+            </a:endParaRPr>
+          </a:p>
+        </p:txBody>
+      </p:sp>
+    </p:spTree>
+  </p:cSld>
+  <mc:AlternateContent>
+    <mc:Choice Requires="p14">
+      <p:transition spd="slow" p14:dur="2000"/>
+    </mc:Choice>
+    <mc:Fallback>
+      <p:transition spd="slow"/>
+    </mc:Fallback>
+  </mc:AlternateContent>
+</p:sld>
+</file>
+
+<file path=ppt/slides/slide12.xml><?xml version="1.0" encoding="utf-8"?>
+<p:sld xmlns:a="http://schemas.openxmlformats.org/drawingml/2006/main" xmlns:p="http://schemas.openxmlformats.org/presentationml/2006/main" xmlns:r="http://schemas.openxmlformats.org/officeDocument/2006/relationships" xmlns:p14="http://schemas.microsoft.com/office/powerpoint/2010/main" xmlns:p15="http://schemas.microsoft.com/office/powerpoint/2012/main" xmlns:mc="http://schemas.openxmlformats.org/markup-compatibility/2006">
+  <p:cSld>
+    <p:bg>
+      <p:bgPr>
+        <a:blipFill rotWithShape="0">
+          <a:blip r:embed="rId1"/>
+          <a:stretch/>
+        </a:blipFill>
+      </p:bgPr>
+    </p:bg>
+    <p:spTree>
+      <p:nvGrpSpPr>
+        <p:cNvPr id="1" name=""/>
+        <p:cNvGrpSpPr/>
+        <p:nvPr/>
+      </p:nvGrpSpPr>
+      <p:grpSpPr>
+        <a:xfrm>
+          <a:off x="0" y="0"/>
+          <a:ext cx="0" cy="0"/>
+          <a:chOff x="0" y="0"/>
+          <a:chExt cx="0" cy="0"/>
+        </a:xfrm>
+      </p:grpSpPr>
+      <p:sp>
+        <p:nvSpPr>
+          <p:cNvPr id="44" name="PlaceHolder 1"/>
+          <p:cNvSpPr>
+            <a:spLocks noGrp="1"/>
+          </p:cNvSpPr>
+          <p:nvPr>
+            <p:ph type="title"/>
+          </p:nvPr>
+        </p:nvSpPr>
+        <p:spPr>
+          <a:xfrm>
+            <a:off x="1973160" y="225000"/>
+            <a:ext cx="6932880" cy="714600"/>
+          </a:xfrm>
+          <a:prstGeom prst="rect">
+            <a:avLst/>
+          </a:prstGeom>
+          <a:noFill/>
+          <a:ln w="0">
+            <a:noFill/>
+          </a:ln>
+        </p:spPr>
+        <p:txBody>
+          <a:bodyPr lIns="90000" rIns="90000" tIns="46800" bIns="46800" anchor="ctr">
+            <a:noAutofit/>
+          </a:bodyPr>
+          <a:p>
+            <a:pPr indent="0">
+              <a:lnSpc>
+                <a:spcPct val="100000"/>
+              </a:lnSpc>
+              <a:spcBef>
+                <a:spcPts val="1191"/>
+              </a:spcBef>
+              <a:spcAft>
+                <a:spcPts val="992"/>
+              </a:spcAft>
+              <a:buNone/>
+              <a:tabLst>
+                <a:tab algn="l" pos="0"/>
+              </a:tabLst>
+            </a:pPr>
+            <a:r>
+              <a:rPr b="0" lang="it-IT" sz="2600" strike="noStrike" u="none">
+                <a:solidFill>
+                  <a:srgbClr val="4d4d4d"/>
+                </a:solidFill>
+                <a:uFillTx/>
+                <a:latin typeface="Microsoft Sans Serif"/>
+              </a:rPr>
+              <a:t>6. Struttura delle Directory Frontend (React.js) </a:t>
+            </a:r>
+            <a:endParaRPr b="0" lang="it-IT" sz="2600" strike="noStrike" u="none">
+              <a:solidFill>
+                <a:srgbClr val="000000"/>
+              </a:solidFill>
+              <a:uFillTx/>
+              <a:latin typeface="Arial"/>
+            </a:endParaRPr>
+          </a:p>
+        </p:txBody>
+      </p:sp>
+      <p:sp>
+        <p:nvSpPr>
+          <p:cNvPr id="45" name="PlaceHolder 8"/>
+          <p:cNvSpPr txBox="1"/>
+          <p:nvPr/>
+        </p:nvSpPr>
+        <p:spPr>
+          <a:xfrm>
+            <a:off x="1973160" y="939960"/>
+            <a:ext cx="6932880" cy="5720040"/>
+          </a:xfrm>
+          <a:prstGeom prst="rect">
+            <a:avLst/>
+          </a:prstGeom>
+          <a:noFill/>
+          <a:ln w="0">
+            <a:noFill/>
+          </a:ln>
+        </p:spPr>
+        <p:txBody>
+          <a:bodyPr lIns="90000" rIns="90000" tIns="46800" bIns="46800" anchor="t">
+            <a:noAutofit/>
+          </a:bodyPr>
+          <a:p>
+            <a:pPr>
+              <a:lnSpc>
+                <a:spcPct val="100000"/>
+              </a:lnSpc>
+              <a:spcBef>
+                <a:spcPts val="340"/>
+              </a:spcBef>
+              <a:spcAft>
+                <a:spcPts val="283"/>
+              </a:spcAft>
+              <a:tabLst>
+                <a:tab algn="l" pos="0"/>
+              </a:tabLst>
+            </a:pPr>
+            <a:r>
+              <a:rPr b="0" lang="it-IT" sz="1500" strike="noStrike" u="none">
+                <a:solidFill>
+                  <a:srgbClr val="000000"/>
+                </a:solidFill>
+                <a:uFillTx/>
+                <a:latin typeface="Verdana"/>
+                <a:ea typeface="Microsoft YaHei"/>
+              </a:rPr>
+              <a:t>📂</a:t>
+            </a:r>
+            <a:r>
+              <a:rPr b="0" lang="it-IT" sz="1500" strike="noStrike" u="none">
+                <a:solidFill>
+                  <a:srgbClr val="000000"/>
+                </a:solidFill>
+                <a:uFillTx/>
+                <a:latin typeface="Verdana"/>
+                <a:ea typeface="Microsoft YaHei"/>
+              </a:rPr>
+              <a:t>frontend</a:t>
+            </a:r>
+            <a:endParaRPr b="0" lang="it-IT" sz="1500" strike="noStrike" u="none">
+              <a:solidFill>
+                <a:srgbClr val="000000"/>
+              </a:solidFill>
+              <a:uFillTx/>
+              <a:latin typeface="Verdana"/>
+              <a:ea typeface="Microsoft YaHei"/>
+            </a:endParaRPr>
+          </a:p>
+          <a:p>
+            <a:pPr>
+              <a:lnSpc>
+                <a:spcPct val="100000"/>
+              </a:lnSpc>
+              <a:spcBef>
+                <a:spcPts val="340"/>
+              </a:spcBef>
+              <a:spcAft>
+                <a:spcPts val="283"/>
+              </a:spcAft>
+              <a:tabLst>
+                <a:tab algn="l" pos="0"/>
+              </a:tabLst>
+            </a:pPr>
+            <a:r>
+              <a:rPr b="0" lang="it-IT" sz="1500" strike="noStrike" u="none">
+                <a:solidFill>
+                  <a:srgbClr val="000000"/>
+                </a:solidFill>
+                <a:uFillTx/>
+                <a:latin typeface="Verdana"/>
+                <a:ea typeface="Microsoft YaHei"/>
+              </a:rPr>
+              <a:t>├── 📂 </a:t>
+            </a:r>
+            <a:r>
+              <a:rPr b="0" lang="it-IT" sz="1500" strike="noStrike" u="none">
+                <a:solidFill>
+                  <a:srgbClr val="000000"/>
+                </a:solidFill>
+                <a:uFillTx/>
+                <a:latin typeface="Verdana"/>
+                <a:ea typeface="Microsoft YaHei"/>
+              </a:rPr>
+              <a:t>pages  → </a:t>
+            </a:r>
+            <a:r>
+              <a:rPr b="1" lang="it-IT" sz="1500" strike="noStrike" u="none">
+                <a:solidFill>
+                  <a:srgbClr val="000000"/>
+                </a:solidFill>
+                <a:uFillTx/>
+                <a:latin typeface="Verdana"/>
+                <a:ea typeface="Microsoft YaHei"/>
+              </a:rPr>
+              <a:t>Pagine principali dell’applicazione</a:t>
+            </a:r>
+            <a:endParaRPr b="0" lang="it-IT" sz="1500" strike="noStrike" u="none">
+              <a:solidFill>
+                <a:srgbClr val="000000"/>
+              </a:solidFill>
+              <a:uFillTx/>
+              <a:latin typeface="Verdana"/>
+              <a:ea typeface="Microsoft YaHei"/>
+            </a:endParaRPr>
+          </a:p>
+          <a:p>
+            <a:pPr>
+              <a:lnSpc>
+                <a:spcPct val="100000"/>
+              </a:lnSpc>
+              <a:spcBef>
+                <a:spcPts val="340"/>
+              </a:spcBef>
+              <a:spcAft>
+                <a:spcPts val="283"/>
+              </a:spcAft>
+              <a:tabLst>
+                <a:tab algn="l" pos="0"/>
+              </a:tabLst>
+            </a:pPr>
+            <a:r>
+              <a:rPr b="0" lang="it-IT" sz="1500" strike="noStrike" u="none">
+                <a:solidFill>
+                  <a:srgbClr val="000000"/>
+                </a:solidFill>
+                <a:uFillTx/>
+                <a:latin typeface="Verdana"/>
+                <a:ea typeface="Microsoft YaHei"/>
+              </a:rPr>
+              <a:t>│   ├── 📄 </a:t>
+            </a:r>
+            <a:r>
+              <a:rPr b="0" lang="it-IT" sz="1500" strike="noStrike" u="none">
+                <a:solidFill>
+                  <a:srgbClr val="000000"/>
+                </a:solidFill>
+                <a:uFillTx/>
+                <a:latin typeface="Verdana"/>
+                <a:ea typeface="Microsoft YaHei"/>
+              </a:rPr>
+              <a:t>HomePage.js  → </a:t>
+            </a:r>
+            <a:r>
+              <a:rPr b="1" lang="it-IT" sz="1500" strike="noStrike" u="none">
+                <a:solidFill>
+                  <a:srgbClr val="000000"/>
+                </a:solidFill>
+                <a:uFillTx/>
+                <a:latin typeface="Verdana"/>
+                <a:ea typeface="Microsoft YaHei"/>
+              </a:rPr>
+              <a:t>Pagina principale</a:t>
+            </a:r>
+            <a:endParaRPr b="0" lang="it-IT" sz="1500" strike="noStrike" u="none">
+              <a:solidFill>
+                <a:srgbClr val="000000"/>
+              </a:solidFill>
+              <a:uFillTx/>
+              <a:latin typeface="Verdana"/>
+              <a:ea typeface="Microsoft YaHei"/>
+            </a:endParaRPr>
+          </a:p>
+          <a:p>
+            <a:pPr>
+              <a:lnSpc>
+                <a:spcPct val="100000"/>
+              </a:lnSpc>
+              <a:spcBef>
+                <a:spcPts val="340"/>
+              </a:spcBef>
+              <a:spcAft>
+                <a:spcPts val="283"/>
+              </a:spcAft>
+              <a:tabLst>
+                <a:tab algn="l" pos="0"/>
+              </a:tabLst>
+            </a:pPr>
+            <a:r>
+              <a:rPr b="0" lang="it-IT" sz="1500" strike="noStrike" u="none">
+                <a:solidFill>
+                  <a:srgbClr val="000000"/>
+                </a:solidFill>
+                <a:uFillTx/>
+                <a:latin typeface="Verdana"/>
+                <a:ea typeface="Microsoft YaHei"/>
+              </a:rPr>
+              <a:t>│   ├── 📄 </a:t>
+            </a:r>
+            <a:r>
+              <a:rPr b="0" lang="it-IT" sz="1500" strike="noStrike" u="none">
+                <a:solidFill>
+                  <a:srgbClr val="000000"/>
+                </a:solidFill>
+                <a:uFillTx/>
+                <a:latin typeface="Verdana"/>
+                <a:ea typeface="Microsoft YaHei"/>
+              </a:rPr>
+              <a:t>LoginPage.js  → </a:t>
+            </a:r>
+            <a:r>
+              <a:rPr b="1" lang="it-IT" sz="1500" strike="noStrike" u="none">
+                <a:solidFill>
+                  <a:srgbClr val="000000"/>
+                </a:solidFill>
+                <a:uFillTx/>
+                <a:latin typeface="Verdana"/>
+                <a:ea typeface="Microsoft YaHei"/>
+              </a:rPr>
+              <a:t>Gestione autenticazione</a:t>
+            </a:r>
+            <a:endParaRPr b="0" lang="it-IT" sz="1500" strike="noStrike" u="none">
+              <a:solidFill>
+                <a:srgbClr val="000000"/>
+              </a:solidFill>
+              <a:uFillTx/>
+              <a:latin typeface="Verdana"/>
+              <a:ea typeface="Microsoft YaHei"/>
+            </a:endParaRPr>
+          </a:p>
+          <a:p>
+            <a:pPr>
+              <a:lnSpc>
+                <a:spcPct val="100000"/>
+              </a:lnSpc>
+              <a:spcBef>
+                <a:spcPts val="340"/>
+              </a:spcBef>
+              <a:spcAft>
+                <a:spcPts val="283"/>
+              </a:spcAft>
+              <a:tabLst>
+                <a:tab algn="l" pos="0"/>
+              </a:tabLst>
+            </a:pPr>
+            <a:r>
+              <a:rPr b="0" lang="it-IT" sz="1500" strike="noStrike" u="none">
+                <a:solidFill>
+                  <a:srgbClr val="000000"/>
+                </a:solidFill>
+                <a:uFillTx/>
+                <a:latin typeface="Verdana"/>
+                <a:ea typeface="Microsoft YaHei"/>
+              </a:rPr>
+              <a:t>│   ├── 📄 </a:t>
+            </a:r>
+            <a:r>
+              <a:rPr b="0" lang="it-IT" sz="1500" strike="noStrike" u="none">
+                <a:solidFill>
+                  <a:srgbClr val="000000"/>
+                </a:solidFill>
+                <a:uFillTx/>
+                <a:latin typeface="Verdana"/>
+                <a:ea typeface="Microsoft YaHei"/>
+              </a:rPr>
+              <a:t>RegisterPage.js  → </a:t>
+            </a:r>
+            <a:r>
+              <a:rPr b="1" lang="it-IT" sz="1500" strike="noStrike" u="none">
+                <a:solidFill>
+                  <a:srgbClr val="000000"/>
+                </a:solidFill>
+                <a:uFillTx/>
+                <a:latin typeface="Verdana"/>
+                <a:ea typeface="Microsoft YaHei"/>
+              </a:rPr>
+              <a:t>Registrazione nuovi utenti</a:t>
+            </a:r>
+            <a:endParaRPr b="0" lang="it-IT" sz="1500" strike="noStrike" u="none">
+              <a:solidFill>
+                <a:srgbClr val="000000"/>
+              </a:solidFill>
+              <a:uFillTx/>
+              <a:latin typeface="Verdana"/>
+              <a:ea typeface="Microsoft YaHei"/>
+            </a:endParaRPr>
+          </a:p>
+          <a:p>
+            <a:pPr>
+              <a:lnSpc>
+                <a:spcPct val="100000"/>
+              </a:lnSpc>
+              <a:spcBef>
+                <a:spcPts val="340"/>
+              </a:spcBef>
+              <a:spcAft>
+                <a:spcPts val="283"/>
+              </a:spcAft>
+              <a:tabLst>
+                <a:tab algn="l" pos="0"/>
+              </a:tabLst>
+            </a:pPr>
+            <a:r>
+              <a:rPr b="0" lang="it-IT" sz="1500" strike="noStrike" u="none">
+                <a:solidFill>
+                  <a:srgbClr val="000000"/>
+                </a:solidFill>
+                <a:uFillTx/>
+                <a:latin typeface="Verdana"/>
+                <a:ea typeface="Microsoft YaHei"/>
+              </a:rPr>
+              <a:t>│   ├── 📄 </a:t>
+            </a:r>
+            <a:r>
+              <a:rPr b="0" lang="it-IT" sz="1500" strike="noStrike" u="none">
+                <a:solidFill>
+                  <a:srgbClr val="000000"/>
+                </a:solidFill>
+                <a:uFillTx/>
+                <a:latin typeface="Verdana"/>
+                <a:ea typeface="Microsoft YaHei"/>
+              </a:rPr>
+              <a:t>FlightsPage.js  → </a:t>
+            </a:r>
+            <a:r>
+              <a:rPr b="1" lang="it-IT" sz="1500" strike="noStrike" u="none">
+                <a:solidFill>
+                  <a:srgbClr val="000000"/>
+                </a:solidFill>
+                <a:uFillTx/>
+                <a:latin typeface="Verdana"/>
+                <a:ea typeface="Microsoft YaHei"/>
+              </a:rPr>
+              <a:t>Visualizzazione voli disponibili</a:t>
+            </a:r>
+            <a:endParaRPr b="0" lang="it-IT" sz="1500" strike="noStrike" u="none">
+              <a:solidFill>
+                <a:srgbClr val="000000"/>
+              </a:solidFill>
+              <a:uFillTx/>
+              <a:latin typeface="Verdana"/>
+              <a:ea typeface="Microsoft YaHei"/>
+            </a:endParaRPr>
+          </a:p>
+          <a:p>
+            <a:pPr>
+              <a:lnSpc>
+                <a:spcPct val="100000"/>
+              </a:lnSpc>
+              <a:spcBef>
+                <a:spcPts val="340"/>
+              </a:spcBef>
+              <a:spcAft>
+                <a:spcPts val="283"/>
+              </a:spcAft>
+              <a:tabLst>
+                <a:tab algn="l" pos="0"/>
+              </a:tabLst>
+            </a:pPr>
+            <a:r>
+              <a:rPr b="0" lang="it-IT" sz="1500" strike="noStrike" u="none">
+                <a:solidFill>
+                  <a:srgbClr val="000000"/>
+                </a:solidFill>
+                <a:uFillTx/>
+                <a:latin typeface="Verdana"/>
+                <a:ea typeface="Microsoft YaHei"/>
+              </a:rPr>
+              <a:t>│   ├── 📄 </a:t>
+            </a:r>
+            <a:r>
+              <a:rPr b="0" lang="it-IT" sz="1500" strike="noStrike" u="none">
+                <a:solidFill>
+                  <a:srgbClr val="000000"/>
+                </a:solidFill>
+                <a:uFillTx/>
+                <a:latin typeface="Verdana"/>
+                <a:ea typeface="Microsoft YaHei"/>
+              </a:rPr>
+              <a:t>AddFlightPage.js  → </a:t>
+            </a:r>
+            <a:r>
+              <a:rPr b="1" lang="it-IT" sz="1500" strike="noStrike" u="none">
+                <a:solidFill>
+                  <a:srgbClr val="000000"/>
+                </a:solidFill>
+                <a:uFillTx/>
+                <a:latin typeface="Verdana"/>
+                <a:ea typeface="Microsoft YaHei"/>
+              </a:rPr>
+              <a:t>Creazione voli (admin)</a:t>
+            </a:r>
+            <a:endParaRPr b="0" lang="it-IT" sz="1500" strike="noStrike" u="none">
+              <a:solidFill>
+                <a:srgbClr val="000000"/>
+              </a:solidFill>
+              <a:uFillTx/>
+              <a:latin typeface="Verdana"/>
+              <a:ea typeface="Microsoft YaHei"/>
+            </a:endParaRPr>
+          </a:p>
+          <a:p>
+            <a:pPr>
+              <a:lnSpc>
+                <a:spcPct val="100000"/>
+              </a:lnSpc>
+              <a:spcBef>
+                <a:spcPts val="340"/>
+              </a:spcBef>
+              <a:spcAft>
+                <a:spcPts val="283"/>
+              </a:spcAft>
+              <a:tabLst>
+                <a:tab algn="l" pos="0"/>
+              </a:tabLst>
+            </a:pPr>
+            <a:r>
+              <a:rPr b="0" lang="it-IT" sz="1500" strike="noStrike" u="none">
+                <a:solidFill>
+                  <a:srgbClr val="000000"/>
+                </a:solidFill>
+                <a:uFillTx/>
+                <a:latin typeface="Verdana"/>
+                <a:ea typeface="Microsoft YaHei"/>
+              </a:rPr>
+              <a:t>│   ├── 📄 </a:t>
+            </a:r>
+            <a:r>
+              <a:rPr b="0" lang="it-IT" sz="1500" strike="noStrike" u="none">
+                <a:solidFill>
+                  <a:srgbClr val="000000"/>
+                </a:solidFill>
+                <a:uFillTx/>
+                <a:latin typeface="Verdana"/>
+                <a:ea typeface="Microsoft YaHei"/>
+              </a:rPr>
+              <a:t>ManagementFlightPage.js  → </a:t>
+            </a:r>
+            <a:r>
+              <a:rPr b="1" lang="it-IT" sz="1500" strike="noStrike" u="none">
+                <a:solidFill>
+                  <a:srgbClr val="000000"/>
+                </a:solidFill>
+                <a:uFillTx/>
+                <a:latin typeface="Verdana"/>
+                <a:ea typeface="Microsoft YaHei"/>
+              </a:rPr>
+              <a:t>Gestione voli (admin)</a:t>
+            </a:r>
+            <a:endParaRPr b="0" lang="it-IT" sz="1500" strike="noStrike" u="none">
+              <a:solidFill>
+                <a:srgbClr val="000000"/>
+              </a:solidFill>
+              <a:uFillTx/>
+              <a:latin typeface="Verdana"/>
+              <a:ea typeface="Microsoft YaHei"/>
+            </a:endParaRPr>
+          </a:p>
+          <a:p>
+            <a:pPr>
+              <a:lnSpc>
+                <a:spcPct val="100000"/>
+              </a:lnSpc>
+              <a:spcBef>
+                <a:spcPts val="340"/>
+              </a:spcBef>
+              <a:spcAft>
+                <a:spcPts val="283"/>
+              </a:spcAft>
+              <a:tabLst>
+                <a:tab algn="l" pos="0"/>
+              </a:tabLst>
+            </a:pPr>
+            <a:r>
+              <a:rPr b="0" lang="it-IT" sz="1500" strike="noStrike" u="none">
+                <a:solidFill>
+                  <a:srgbClr val="000000"/>
+                </a:solidFill>
+                <a:uFillTx/>
+                <a:latin typeface="Verdana"/>
+                <a:ea typeface="Microsoft YaHei"/>
+              </a:rPr>
+              <a:t>│   ├── 📄 </a:t>
+            </a:r>
+            <a:r>
+              <a:rPr b="0" lang="it-IT" sz="1500" strike="noStrike" u="none">
+                <a:solidFill>
+                  <a:srgbClr val="000000"/>
+                </a:solidFill>
+                <a:uFillTx/>
+                <a:latin typeface="Verdana"/>
+                <a:ea typeface="Microsoft YaHei"/>
+              </a:rPr>
+              <a:t>HistoryPage.js  → </a:t>
+            </a:r>
+            <a:r>
+              <a:rPr b="1" lang="it-IT" sz="1500" strike="noStrike" u="none">
+                <a:solidFill>
+                  <a:srgbClr val="000000"/>
+                </a:solidFill>
+                <a:uFillTx/>
+                <a:latin typeface="Verdana"/>
+                <a:ea typeface="Microsoft YaHei"/>
+              </a:rPr>
+              <a:t>Storico delle prenotazioni</a:t>
+            </a:r>
+            <a:endParaRPr b="0" lang="it-IT" sz="1500" strike="noStrike" u="none">
+              <a:solidFill>
+                <a:srgbClr val="000000"/>
+              </a:solidFill>
+              <a:uFillTx/>
+              <a:latin typeface="Verdana"/>
+              <a:ea typeface="Microsoft YaHei"/>
+            </a:endParaRPr>
+          </a:p>
+          <a:p>
+            <a:pPr>
+              <a:lnSpc>
+                <a:spcPct val="100000"/>
+              </a:lnSpc>
+              <a:spcBef>
+                <a:spcPts val="340"/>
+              </a:spcBef>
+              <a:spcAft>
+                <a:spcPts val="283"/>
+              </a:spcAft>
+              <a:tabLst>
+                <a:tab algn="l" pos="0"/>
+              </a:tabLst>
+            </a:pPr>
+            <a:r>
+              <a:rPr b="0" lang="it-IT" sz="1500" strike="noStrike" u="none">
+                <a:solidFill>
+                  <a:srgbClr val="000000"/>
+                </a:solidFill>
+                <a:uFillTx/>
+                <a:latin typeface="Verdana"/>
+                <a:ea typeface="Microsoft YaHei"/>
+              </a:rPr>
+              <a:t>│   ├── 📄 </a:t>
+            </a:r>
+            <a:r>
+              <a:rPr b="0" lang="it-IT" sz="1500" strike="noStrike" u="none">
+                <a:solidFill>
+                  <a:srgbClr val="000000"/>
+                </a:solidFill>
+                <a:uFillTx/>
+                <a:latin typeface="Verdana"/>
+                <a:ea typeface="Microsoft YaHei"/>
+              </a:rPr>
+              <a:t>ProfilePage.js  → </a:t>
+            </a:r>
+            <a:r>
+              <a:rPr b="1" lang="it-IT" sz="1500" strike="noStrike" u="none">
+                <a:solidFill>
+                  <a:srgbClr val="000000"/>
+                </a:solidFill>
+                <a:uFillTx/>
+                <a:latin typeface="Verdana"/>
+                <a:ea typeface="Microsoft YaHei"/>
+              </a:rPr>
+              <a:t>Profilo utente</a:t>
+            </a:r>
+            <a:endParaRPr b="0" lang="it-IT" sz="1500" strike="noStrike" u="none">
+              <a:solidFill>
+                <a:srgbClr val="000000"/>
+              </a:solidFill>
+              <a:uFillTx/>
+              <a:latin typeface="Verdana"/>
+              <a:ea typeface="Microsoft YaHei"/>
+            </a:endParaRPr>
+          </a:p>
+          <a:p>
+            <a:pPr>
+              <a:lnSpc>
+                <a:spcPct val="100000"/>
+              </a:lnSpc>
+              <a:spcBef>
+                <a:spcPts val="340"/>
+              </a:spcBef>
+              <a:spcAft>
+                <a:spcPts val="283"/>
+              </a:spcAft>
+              <a:tabLst>
+                <a:tab algn="l" pos="0"/>
+              </a:tabLst>
+            </a:pPr>
+            <a:r>
+              <a:rPr b="0" lang="it-IT" sz="1500" strike="noStrike" u="none">
+                <a:solidFill>
+                  <a:srgbClr val="000000"/>
+                </a:solidFill>
+                <a:uFillTx/>
+                <a:latin typeface="Verdana"/>
+                <a:ea typeface="Microsoft YaHei"/>
+              </a:rPr>
+              <a:t>│   ├── 📄 </a:t>
+            </a:r>
+            <a:r>
+              <a:rPr b="0" lang="it-IT" sz="1500" strike="noStrike" u="none">
+                <a:solidFill>
+                  <a:srgbClr val="000000"/>
+                </a:solidFill>
+                <a:uFillTx/>
+                <a:latin typeface="Verdana"/>
+                <a:ea typeface="Microsoft YaHei"/>
+              </a:rPr>
+              <a:t>UserManagementPage.js  → </a:t>
+            </a:r>
+            <a:r>
+              <a:rPr b="1" lang="it-IT" sz="1500" strike="noStrike" u="none">
+                <a:solidFill>
+                  <a:srgbClr val="000000"/>
+                </a:solidFill>
+                <a:uFillTx/>
+                <a:latin typeface="Verdana"/>
+                <a:ea typeface="Microsoft YaHei"/>
+              </a:rPr>
+              <a:t>Gestione ruoli (admin)</a:t>
+            </a:r>
+            <a:endParaRPr b="0" lang="it-IT" sz="1500" strike="noStrike" u="none">
+              <a:solidFill>
+                <a:srgbClr val="000000"/>
+              </a:solidFill>
+              <a:uFillTx/>
+              <a:latin typeface="Verdana"/>
+              <a:ea typeface="Microsoft YaHei"/>
+            </a:endParaRPr>
+          </a:p>
+          <a:p>
+            <a:pPr>
+              <a:lnSpc>
+                <a:spcPct val="100000"/>
+              </a:lnSpc>
+              <a:spcBef>
+                <a:spcPts val="340"/>
+              </a:spcBef>
+              <a:spcAft>
+                <a:spcPts val="283"/>
+              </a:spcAft>
+              <a:tabLst>
+                <a:tab algn="l" pos="0"/>
+              </a:tabLst>
+            </a:pPr>
+            <a:r>
+              <a:rPr b="0" lang="it-IT" sz="1500" strike="noStrike" u="none">
+                <a:solidFill>
+                  <a:srgbClr val="000000"/>
+                </a:solidFill>
+                <a:uFillTx/>
+                <a:latin typeface="Verdana"/>
+                <a:ea typeface="Microsoft YaHei"/>
+              </a:rPr>
+              <a:t>├── 📂 </a:t>
+            </a:r>
+            <a:r>
+              <a:rPr b="0" lang="it-IT" sz="1500" strike="noStrike" u="none">
+                <a:solidFill>
+                  <a:srgbClr val="000000"/>
+                </a:solidFill>
+                <a:uFillTx/>
+                <a:latin typeface="Verdana"/>
+                <a:ea typeface="Microsoft YaHei"/>
+              </a:rPr>
+              <a:t>services  → </a:t>
+            </a:r>
+            <a:r>
+              <a:rPr b="1" lang="it-IT" sz="1500" strike="noStrike" u="none">
+                <a:solidFill>
+                  <a:srgbClr val="000000"/>
+                </a:solidFill>
+                <a:uFillTx/>
+                <a:latin typeface="Verdana"/>
+                <a:ea typeface="Microsoft YaHei"/>
+              </a:rPr>
+              <a:t>Comunicazione con API REST del Backend</a:t>
+            </a:r>
+            <a:endParaRPr b="0" lang="it-IT" sz="1500" strike="noStrike" u="none">
+              <a:solidFill>
+                <a:srgbClr val="000000"/>
+              </a:solidFill>
+              <a:uFillTx/>
+              <a:latin typeface="Verdana"/>
+              <a:ea typeface="Microsoft YaHei"/>
+            </a:endParaRPr>
+          </a:p>
+          <a:p>
+            <a:pPr>
+              <a:lnSpc>
+                <a:spcPct val="100000"/>
+              </a:lnSpc>
+              <a:spcBef>
+                <a:spcPts val="340"/>
+              </a:spcBef>
+              <a:spcAft>
+                <a:spcPts val="283"/>
+              </a:spcAft>
+              <a:tabLst>
+                <a:tab algn="l" pos="0"/>
+              </a:tabLst>
+            </a:pPr>
+            <a:r>
+              <a:rPr b="0" lang="it-IT" sz="1500" strike="noStrike" u="none">
+                <a:solidFill>
+                  <a:srgbClr val="000000"/>
+                </a:solidFill>
+                <a:uFillTx/>
+                <a:latin typeface="Verdana"/>
+                <a:ea typeface="Microsoft YaHei"/>
+              </a:rPr>
+              <a:t>│   ├── 📄 </a:t>
+            </a:r>
+            <a:r>
+              <a:rPr b="0" lang="it-IT" sz="1500" strike="noStrike" u="none">
+                <a:solidFill>
+                  <a:srgbClr val="000000"/>
+                </a:solidFill>
+                <a:uFillTx/>
+                <a:latin typeface="Verdana"/>
+                <a:ea typeface="Microsoft YaHei"/>
+              </a:rPr>
+              <a:t>authService.js  → </a:t>
+            </a:r>
+            <a:r>
+              <a:rPr b="1" lang="it-IT" sz="1500" strike="noStrike" u="none">
+                <a:solidFill>
+                  <a:srgbClr val="000000"/>
+                </a:solidFill>
+                <a:uFillTx/>
+                <a:latin typeface="Verdana"/>
+                <a:ea typeface="Microsoft YaHei"/>
+              </a:rPr>
+              <a:t>API Gestione utenti</a:t>
+            </a:r>
+            <a:endParaRPr b="0" lang="it-IT" sz="1500" strike="noStrike" u="none">
+              <a:solidFill>
+                <a:srgbClr val="000000"/>
+              </a:solidFill>
+              <a:uFillTx/>
+              <a:latin typeface="Verdana"/>
+              <a:ea typeface="Microsoft YaHei"/>
+            </a:endParaRPr>
+          </a:p>
+          <a:p>
+            <a:pPr>
+              <a:lnSpc>
+                <a:spcPct val="100000"/>
+              </a:lnSpc>
+              <a:spcBef>
+                <a:spcPts val="340"/>
+              </a:spcBef>
+              <a:spcAft>
+                <a:spcPts val="283"/>
+              </a:spcAft>
+              <a:tabLst>
+                <a:tab algn="l" pos="0"/>
+              </a:tabLst>
+            </a:pPr>
+            <a:r>
+              <a:rPr b="0" lang="it-IT" sz="1500" strike="noStrike" u="none">
+                <a:solidFill>
+                  <a:srgbClr val="000000"/>
+                </a:solidFill>
+                <a:uFillTx/>
+                <a:latin typeface="Verdana"/>
+                <a:ea typeface="Microsoft YaHei"/>
+              </a:rPr>
+              <a:t>│   ├── 📄 </a:t>
+            </a:r>
+            <a:r>
+              <a:rPr b="0" lang="it-IT" sz="1500" strike="noStrike" u="none">
+                <a:solidFill>
+                  <a:srgbClr val="000000"/>
+                </a:solidFill>
+                <a:uFillTx/>
+                <a:latin typeface="Verdana"/>
+                <a:ea typeface="Microsoft YaHei"/>
+              </a:rPr>
+              <a:t>flightService.js  → </a:t>
+            </a:r>
+            <a:r>
+              <a:rPr b="1" lang="it-IT" sz="1500" strike="noStrike" u="none">
+                <a:solidFill>
+                  <a:srgbClr val="000000"/>
+                </a:solidFill>
+                <a:uFillTx/>
+                <a:latin typeface="Verdana"/>
+                <a:ea typeface="Microsoft YaHei"/>
+              </a:rPr>
+              <a:t>API Visualizzazioni voli</a:t>
+            </a:r>
+            <a:endParaRPr b="0" lang="it-IT" sz="1500" strike="noStrike" u="none">
+              <a:solidFill>
+                <a:srgbClr val="000000"/>
+              </a:solidFill>
+              <a:uFillTx/>
+              <a:latin typeface="Verdana"/>
+              <a:ea typeface="Microsoft YaHei"/>
+            </a:endParaRPr>
+          </a:p>
+          <a:p>
+            <a:pPr>
+              <a:lnSpc>
+                <a:spcPct val="100000"/>
+              </a:lnSpc>
+              <a:spcBef>
+                <a:spcPts val="340"/>
+              </a:spcBef>
+              <a:spcAft>
+                <a:spcPts val="283"/>
+              </a:spcAft>
+              <a:tabLst>
+                <a:tab algn="l" pos="0"/>
+              </a:tabLst>
+            </a:pPr>
+            <a:r>
+              <a:rPr b="0" lang="it-IT" sz="1500" strike="noStrike" u="none">
+                <a:solidFill>
+                  <a:srgbClr val="000000"/>
+                </a:solidFill>
+                <a:uFillTx/>
+                <a:latin typeface="Verdana"/>
+                <a:ea typeface="Microsoft YaHei"/>
+              </a:rPr>
+              <a:t>│   ├── 📄 </a:t>
+            </a:r>
+            <a:r>
+              <a:rPr b="0" lang="it-IT" sz="1500" strike="noStrike" u="none">
+                <a:solidFill>
+                  <a:srgbClr val="000000"/>
+                </a:solidFill>
+                <a:uFillTx/>
+                <a:latin typeface="Verdana"/>
+                <a:ea typeface="Microsoft YaHei"/>
+              </a:rPr>
+              <a:t>flightAdminService.js  → </a:t>
+            </a:r>
+            <a:r>
+              <a:rPr b="1" lang="it-IT" sz="1500" strike="noStrike" u="none">
+                <a:solidFill>
+                  <a:srgbClr val="000000"/>
+                </a:solidFill>
+                <a:uFillTx/>
+                <a:latin typeface="Verdana"/>
+                <a:ea typeface="Microsoft YaHei"/>
+              </a:rPr>
+              <a:t>API per amministratori</a:t>
+            </a:r>
+            <a:endParaRPr b="0" lang="it-IT" sz="1500" strike="noStrike" u="none">
+              <a:solidFill>
+                <a:srgbClr val="000000"/>
+              </a:solidFill>
+              <a:uFillTx/>
+              <a:latin typeface="Verdana"/>
+              <a:ea typeface="Microsoft YaHei"/>
+            </a:endParaRPr>
+          </a:p>
+          <a:p>
+            <a:pPr>
+              <a:lnSpc>
+                <a:spcPct val="100000"/>
+              </a:lnSpc>
+              <a:spcBef>
+                <a:spcPts val="340"/>
+              </a:spcBef>
+              <a:spcAft>
+                <a:spcPts val="283"/>
+              </a:spcAft>
+              <a:tabLst>
+                <a:tab algn="l" pos="0"/>
+              </a:tabLst>
+            </a:pPr>
+            <a:r>
+              <a:rPr b="0" lang="it-IT" sz="1500" strike="noStrike" u="none">
+                <a:solidFill>
+                  <a:srgbClr val="000000"/>
+                </a:solidFill>
+                <a:uFillTx/>
+                <a:latin typeface="Verdana"/>
+                <a:ea typeface="Microsoft YaHei"/>
+              </a:rPr>
+              <a:t>│   ├── 📄 </a:t>
+            </a:r>
+            <a:r>
+              <a:rPr b="0" lang="it-IT" sz="1500" strike="noStrike" u="none">
+                <a:solidFill>
+                  <a:srgbClr val="000000"/>
+                </a:solidFill>
+                <a:uFillTx/>
+                <a:latin typeface="Verdana"/>
+                <a:ea typeface="Microsoft YaHei"/>
+              </a:rPr>
+              <a:t>ticketService.js  → </a:t>
+            </a:r>
+            <a:r>
+              <a:rPr b="1" lang="it-IT" sz="1500" strike="noStrike" u="none">
+                <a:solidFill>
+                  <a:srgbClr val="000000"/>
+                </a:solidFill>
+                <a:uFillTx/>
+                <a:latin typeface="Verdana"/>
+                <a:ea typeface="Microsoft YaHei"/>
+              </a:rPr>
+              <a:t>API Acquisto e gestione biglietti</a:t>
+            </a:r>
+            <a:endParaRPr b="0" lang="it-IT" sz="1500" strike="noStrike" u="none">
+              <a:solidFill>
+                <a:srgbClr val="000000"/>
+              </a:solidFill>
+              <a:uFillTx/>
+              <a:latin typeface="Verdana"/>
+              <a:ea typeface="Microsoft YaHei"/>
+            </a:endParaRPr>
+          </a:p>
+          <a:p>
+            <a:pPr>
+              <a:lnSpc>
+                <a:spcPct val="100000"/>
+              </a:lnSpc>
+              <a:spcBef>
+                <a:spcPts val="340"/>
+              </a:spcBef>
+              <a:spcAft>
+                <a:spcPts val="283"/>
+              </a:spcAft>
+              <a:tabLst>
+                <a:tab algn="l" pos="0"/>
+              </a:tabLst>
+            </a:pPr>
+            <a:r>
+              <a:rPr b="0" lang="it-IT" sz="1500" strike="noStrike" u="none">
+                <a:solidFill>
+                  <a:srgbClr val="000000"/>
+                </a:solidFill>
+                <a:uFillTx/>
+                <a:latin typeface="Verdana"/>
+                <a:ea typeface="Microsoft YaHei"/>
+              </a:rPr>
+              <a:t>│   ├── 📄 </a:t>
+            </a:r>
+            <a:r>
+              <a:rPr b="0" lang="it-IT" sz="1500" strike="noStrike" u="none">
+                <a:solidFill>
+                  <a:srgbClr val="000000"/>
+                </a:solidFill>
+                <a:uFillTx/>
+                <a:latin typeface="Verdana"/>
+                <a:ea typeface="Microsoft YaHei"/>
+              </a:rPr>
+              <a:t>historyService.js  → </a:t>
+            </a:r>
+            <a:r>
+              <a:rPr b="1" lang="it-IT" sz="1500" strike="noStrike" u="none">
+                <a:solidFill>
+                  <a:srgbClr val="000000"/>
+                </a:solidFill>
+                <a:uFillTx/>
+                <a:latin typeface="Verdana"/>
+                <a:ea typeface="Microsoft YaHei"/>
+              </a:rPr>
+              <a:t>API Storico operazioni utente</a:t>
+            </a:r>
+            <a:endParaRPr b="0" lang="it-IT" sz="1500" strike="noStrike" u="none">
+              <a:solidFill>
+                <a:srgbClr val="000000"/>
+              </a:solidFill>
+              <a:uFillTx/>
+              <a:latin typeface="Verdana"/>
+              <a:ea typeface="Microsoft YaHei"/>
+            </a:endParaRPr>
+          </a:p>
+          <a:p>
+            <a:pPr>
+              <a:lnSpc>
+                <a:spcPct val="100000"/>
+              </a:lnSpc>
+              <a:spcBef>
+                <a:spcPts val="340"/>
+              </a:spcBef>
+              <a:spcAft>
+                <a:spcPts val="283"/>
+              </a:spcAft>
+              <a:tabLst>
+                <a:tab algn="l" pos="0"/>
+              </a:tabLst>
+            </a:pPr>
+            <a:r>
+              <a:rPr b="0" lang="it-IT" sz="1500" strike="noStrike" u="none">
+                <a:solidFill>
+                  <a:srgbClr val="000000"/>
+                </a:solidFill>
+                <a:uFillTx/>
+                <a:latin typeface="Verdana"/>
+                <a:ea typeface="Microsoft YaHei"/>
+              </a:rPr>
+              <a:t>├── 📄 </a:t>
+            </a:r>
+            <a:r>
+              <a:rPr b="0" lang="it-IT" sz="1500" strike="noStrike" u="none">
+                <a:solidFill>
+                  <a:srgbClr val="000000"/>
+                </a:solidFill>
+                <a:uFillTx/>
+                <a:latin typeface="Verdana"/>
+                <a:ea typeface="Microsoft YaHei"/>
+              </a:rPr>
+              <a:t>App.js  → </a:t>
+            </a:r>
+            <a:r>
+              <a:rPr b="1" lang="it-IT" sz="1500" strike="noStrike" u="none">
+                <a:solidFill>
+                  <a:srgbClr val="000000"/>
+                </a:solidFill>
+                <a:uFillTx/>
+                <a:latin typeface="Verdana"/>
+                <a:ea typeface="Microsoft YaHei"/>
+              </a:rPr>
+              <a:t>Punto di ingresso principale dell’applicazione</a:t>
+            </a:r>
+            <a:endParaRPr b="0" lang="it-IT" sz="1500" strike="noStrike" u="none">
+              <a:solidFill>
+                <a:srgbClr val="000000"/>
+              </a:solidFill>
+              <a:uFillTx/>
+              <a:latin typeface="Verdana"/>
+              <a:ea typeface="Microsoft YaHei"/>
+            </a:endParaRPr>
+          </a:p>
+          <a:p>
+            <a:pPr>
+              <a:lnSpc>
+                <a:spcPct val="100000"/>
+              </a:lnSpc>
+              <a:spcBef>
+                <a:spcPts val="340"/>
+              </a:spcBef>
+              <a:spcAft>
+                <a:spcPts val="283"/>
+              </a:spcAft>
+              <a:tabLst>
+                <a:tab algn="l" pos="0"/>
+              </a:tabLst>
+            </a:pPr>
+            <a:endParaRPr b="0" lang="it-IT" sz="1500" strike="noStrike" u="none">
+              <a:solidFill>
+                <a:srgbClr val="000000"/>
+              </a:solidFill>
+              <a:uFillTx/>
+              <a:latin typeface="Verdana"/>
+              <a:ea typeface="Microsoft YaHei"/>
+            </a:endParaRPr>
+          </a:p>
+        </p:txBody>
+      </p:sp>
     </p:spTree>
   </p:cSld>
   <mc:AlternateContent>
@@ -2156,7 +4455,7 @@
       </p:grpSpPr>
       <p:sp>
         <p:nvSpPr>
-          <p:cNvPr id="15" name="PlaceHolder 1"/>
+          <p:cNvPr id="17" name="PlaceHolder 1"/>
           <p:cNvSpPr>
             <a:spLocks noGrp="1"/>
           </p:cNvSpPr>
@@ -2167,7 +4466,7 @@
         <p:spPr>
           <a:xfrm>
             <a:off x="1193400" y="1620000"/>
-            <a:ext cx="7085520" cy="791280"/>
+            <a:ext cx="7085160" cy="790920"/>
           </a:xfrm>
           <a:prstGeom prst="rect">
             <a:avLst/>
@@ -2213,7 +4512,7 @@
       </p:sp>
       <p:sp>
         <p:nvSpPr>
-          <p:cNvPr id="16" name="PlaceHolder 2"/>
+          <p:cNvPr id="18" name="PlaceHolder 2"/>
           <p:cNvSpPr>
             <a:spLocks noGrp="1"/>
           </p:cNvSpPr>
@@ -2224,7 +4523,7 @@
         <p:spPr>
           <a:xfrm>
             <a:off x="1142640" y="2520000"/>
-            <a:ext cx="7316280" cy="4138920"/>
+            <a:ext cx="7315920" cy="4138560"/>
           </a:xfrm>
           <a:prstGeom prst="rect">
             <a:avLst/>
@@ -2285,6 +4584,7 @@
               </a:solidFill>
               <a:uFillTx/>
               <a:latin typeface="Arial"/>
+              <a:ea typeface="Microsoft YaHei"/>
             </a:endParaRPr>
           </a:p>
           <a:p>
@@ -2334,6 +4634,7 @@
               </a:solidFill>
               <a:uFillTx/>
               <a:latin typeface="Arial"/>
+              <a:ea typeface="Microsoft YaHei"/>
             </a:endParaRPr>
           </a:p>
           <a:p>
@@ -2383,6 +4684,7 @@
               </a:solidFill>
               <a:uFillTx/>
               <a:latin typeface="Arial"/>
+              <a:ea typeface="Microsoft YaHei"/>
             </a:endParaRPr>
           </a:p>
           <a:p>
@@ -2432,6 +4734,257 @@
               </a:solidFill>
               <a:uFillTx/>
               <a:latin typeface="Arial"/>
+              <a:ea typeface="Microsoft YaHei"/>
+            </a:endParaRPr>
+          </a:p>
+          <a:p>
+            <a:pPr marL="343080" indent="-343080">
+              <a:lnSpc>
+                <a:spcPct val="100000"/>
+              </a:lnSpc>
+              <a:spcBef>
+                <a:spcPts val="567"/>
+              </a:spcBef>
+              <a:spcAft>
+                <a:spcPts val="567"/>
+              </a:spcAft>
+              <a:buClr>
+                <a:srgbClr val="4d4d4d"/>
+              </a:buClr>
+              <a:buFont typeface="Verdana"/>
+              <a:buChar char="•"/>
+              <a:tabLst>
+                <a:tab algn="l" pos="914400"/>
+                <a:tab algn="l" pos="1828800"/>
+                <a:tab algn="l" pos="2743200"/>
+                <a:tab algn="l" pos="3657600"/>
+                <a:tab algn="l" pos="4572000"/>
+                <a:tab algn="l" pos="5486400"/>
+                <a:tab algn="l" pos="6400800"/>
+                <a:tab algn="l" pos="7315200"/>
+                <a:tab algn="l" pos="8229600"/>
+                <a:tab algn="l" pos="9144000"/>
+                <a:tab algn="l" pos="10058400"/>
+              </a:tabLst>
+            </a:pPr>
+            <a:r>
+              <a:rPr b="0" lang="en-US" sz="1600" strike="noStrike" u="none">
+                <a:solidFill>
+                  <a:srgbClr val="4d4d4d"/>
+                </a:solidFill>
+                <a:uFillTx/>
+                <a:latin typeface="Verdana"/>
+                <a:ea typeface="굴림"/>
+              </a:rPr>
+              <a:t>5. Struttura delle Directory Backend (Node.js)</a:t>
+            </a:r>
+            <a:endParaRPr b="0" lang="it-IT" sz="1600" strike="noStrike" u="none">
+              <a:solidFill>
+                <a:srgbClr val="000000"/>
+              </a:solidFill>
+              <a:uFillTx/>
+              <a:latin typeface="Arial"/>
+              <a:ea typeface="Microsoft YaHei"/>
+            </a:endParaRPr>
+          </a:p>
+          <a:p>
+            <a:pPr marL="343080" indent="-343080">
+              <a:lnSpc>
+                <a:spcPct val="100000"/>
+              </a:lnSpc>
+              <a:spcBef>
+                <a:spcPts val="567"/>
+              </a:spcBef>
+              <a:spcAft>
+                <a:spcPts val="567"/>
+              </a:spcAft>
+              <a:buClr>
+                <a:srgbClr val="4d4d4d"/>
+              </a:buClr>
+              <a:buFont typeface="Verdana"/>
+              <a:buChar char="•"/>
+              <a:tabLst>
+                <a:tab algn="l" pos="914400"/>
+                <a:tab algn="l" pos="1828800"/>
+                <a:tab algn="l" pos="2743200"/>
+                <a:tab algn="l" pos="3657600"/>
+                <a:tab algn="l" pos="4572000"/>
+                <a:tab algn="l" pos="5486400"/>
+                <a:tab algn="l" pos="6400800"/>
+                <a:tab algn="l" pos="7315200"/>
+                <a:tab algn="l" pos="8229600"/>
+                <a:tab algn="l" pos="9144000"/>
+                <a:tab algn="l" pos="10058400"/>
+              </a:tabLst>
+            </a:pPr>
+            <a:r>
+              <a:rPr b="0" lang="en-US" sz="1600" strike="noStrike" u="none">
+                <a:solidFill>
+                  <a:srgbClr val="4d4d4d"/>
+                </a:solidFill>
+                <a:uFillTx/>
+                <a:latin typeface="Verdana"/>
+                <a:ea typeface="굴림"/>
+              </a:rPr>
+              <a:t>6. Struttura delle Directory Frontend (React.js)</a:t>
+            </a:r>
+            <a:endParaRPr b="0" lang="it-IT" sz="1600" strike="noStrike" u="none">
+              <a:solidFill>
+                <a:srgbClr val="000000"/>
+              </a:solidFill>
+              <a:uFillTx/>
+              <a:latin typeface="Arial"/>
+              <a:ea typeface="Microsoft YaHei"/>
+            </a:endParaRPr>
+          </a:p>
+          <a:p>
+            <a:pPr marL="343080" indent="-343080">
+              <a:lnSpc>
+                <a:spcPct val="100000"/>
+              </a:lnSpc>
+              <a:spcBef>
+                <a:spcPts val="567"/>
+              </a:spcBef>
+              <a:spcAft>
+                <a:spcPts val="567"/>
+              </a:spcAft>
+              <a:buClr>
+                <a:srgbClr val="4d4d4d"/>
+              </a:buClr>
+              <a:buFont typeface="Verdana"/>
+              <a:buChar char="•"/>
+              <a:tabLst>
+                <a:tab algn="l" pos="914400"/>
+                <a:tab algn="l" pos="1828800"/>
+                <a:tab algn="l" pos="2743200"/>
+                <a:tab algn="l" pos="3657600"/>
+                <a:tab algn="l" pos="4572000"/>
+                <a:tab algn="l" pos="5486400"/>
+                <a:tab algn="l" pos="6400800"/>
+                <a:tab algn="l" pos="7315200"/>
+                <a:tab algn="l" pos="8229600"/>
+                <a:tab algn="l" pos="9144000"/>
+                <a:tab algn="l" pos="10058400"/>
+              </a:tabLst>
+            </a:pPr>
+            <a:r>
+              <a:rPr b="0" lang="en-US" sz="1600" strike="noStrike" u="none">
+                <a:solidFill>
+                  <a:srgbClr val="4d4d4d"/>
+                </a:solidFill>
+                <a:uFillTx/>
+                <a:latin typeface="Verdana"/>
+                <a:ea typeface="굴림"/>
+              </a:rPr>
+              <a:t>7. Comunicazione tra Frontend e Backend</a:t>
+            </a:r>
+            <a:endParaRPr b="0" lang="it-IT" sz="1600" strike="noStrike" u="none">
+              <a:solidFill>
+                <a:srgbClr val="000000"/>
+              </a:solidFill>
+              <a:uFillTx/>
+              <a:latin typeface="Arial"/>
+              <a:ea typeface="Microsoft YaHei"/>
+            </a:endParaRPr>
+          </a:p>
+          <a:p>
+            <a:pPr marL="343080" indent="-343080">
+              <a:lnSpc>
+                <a:spcPct val="100000"/>
+              </a:lnSpc>
+              <a:spcBef>
+                <a:spcPts val="567"/>
+              </a:spcBef>
+              <a:spcAft>
+                <a:spcPts val="567"/>
+              </a:spcAft>
+              <a:buClr>
+                <a:srgbClr val="4d4d4d"/>
+              </a:buClr>
+              <a:buFont typeface="Verdana"/>
+              <a:buChar char="•"/>
+              <a:tabLst>
+                <a:tab algn="l" pos="914400"/>
+                <a:tab algn="l" pos="1828800"/>
+                <a:tab algn="l" pos="2743200"/>
+                <a:tab algn="l" pos="3657600"/>
+                <a:tab algn="l" pos="4572000"/>
+                <a:tab algn="l" pos="5486400"/>
+                <a:tab algn="l" pos="6400800"/>
+                <a:tab algn="l" pos="7315200"/>
+                <a:tab algn="l" pos="8229600"/>
+                <a:tab algn="l" pos="9144000"/>
+                <a:tab algn="l" pos="10058400"/>
+              </a:tabLst>
+            </a:pPr>
+            <a:r>
+              <a:rPr b="0" lang="en-US" sz="1600" strike="noStrike" u="none">
+                <a:solidFill>
+                  <a:srgbClr val="4d4d4d"/>
+                </a:solidFill>
+                <a:uFillTx/>
+                <a:latin typeface="Verdana"/>
+                <a:ea typeface="굴림"/>
+              </a:rPr>
+              <a:t>8. Come si utilizza Air Connect</a:t>
+            </a:r>
+            <a:endParaRPr b="0" lang="it-IT" sz="1600" strike="noStrike" u="none">
+              <a:solidFill>
+                <a:srgbClr val="000000"/>
+              </a:solidFill>
+              <a:uFillTx/>
+              <a:latin typeface="Arial"/>
+              <a:ea typeface="Microsoft YaHei"/>
+            </a:endParaRPr>
+          </a:p>
+          <a:p>
+            <a:pPr marL="343080" indent="-343080">
+              <a:lnSpc>
+                <a:spcPct val="100000"/>
+              </a:lnSpc>
+              <a:spcBef>
+                <a:spcPts val="567"/>
+              </a:spcBef>
+              <a:spcAft>
+                <a:spcPts val="567"/>
+              </a:spcAft>
+              <a:buClr>
+                <a:srgbClr val="4d4d4d"/>
+              </a:buClr>
+              <a:buFont typeface="Verdana"/>
+              <a:buChar char="•"/>
+              <a:tabLst>
+                <a:tab algn="l" pos="914400"/>
+                <a:tab algn="l" pos="1828800"/>
+                <a:tab algn="l" pos="2743200"/>
+                <a:tab algn="l" pos="3657600"/>
+                <a:tab algn="l" pos="4572000"/>
+                <a:tab algn="l" pos="5486400"/>
+                <a:tab algn="l" pos="6400800"/>
+                <a:tab algn="l" pos="7315200"/>
+                <a:tab algn="l" pos="8229600"/>
+                <a:tab algn="l" pos="9144000"/>
+                <a:tab algn="l" pos="10058400"/>
+              </a:tabLst>
+            </a:pPr>
+            <a:r>
+              <a:rPr b="0" lang="en-US" sz="1600" strike="noStrike" u="none">
+                <a:solidFill>
+                  <a:srgbClr val="4d4d4d"/>
+                </a:solidFill>
+                <a:uFillTx/>
+                <a:latin typeface="Verdana"/>
+                <a:ea typeface="굴림"/>
+              </a:rPr>
+              <a:t>9. Conclusioni</a:t>
+            </a:r>
+            <a:endParaRPr b="0" lang="it-IT" sz="1600" strike="noStrike" u="none">
+              <a:solidFill>
+                <a:srgbClr val="000000"/>
+              </a:solidFill>
+              <a:uFillTx/>
+              <a:latin typeface="Arial"/>
+              <a:ea typeface="Microsoft YaHei"/>
             </a:endParaRPr>
           </a:p>
           <a:p>
@@ -2530,7 +5083,7 @@
       </p:grpSpPr>
       <p:sp>
         <p:nvSpPr>
-          <p:cNvPr id="17" name="PlaceHolder 1"/>
+          <p:cNvPr id="19" name="PlaceHolder 1"/>
           <p:cNvSpPr>
             <a:spLocks noGrp="1"/>
           </p:cNvSpPr>
@@ -2541,7 +5094,7 @@
         <p:spPr>
           <a:xfrm>
             <a:off x="1981080" y="228240"/>
-            <a:ext cx="6933240" cy="714960"/>
+            <a:ext cx="6932880" cy="714600"/>
           </a:xfrm>
           <a:prstGeom prst="rect">
             <a:avLst/>
@@ -2587,7 +5140,7 @@
       </p:sp>
       <p:sp>
         <p:nvSpPr>
-          <p:cNvPr id="18" name="PlaceHolder 2"/>
+          <p:cNvPr id="20" name="PlaceHolder 2"/>
           <p:cNvSpPr>
             <a:spLocks noGrp="1"/>
           </p:cNvSpPr>
@@ -2598,7 +5151,7 @@
         <p:spPr>
           <a:xfrm>
             <a:off x="1981080" y="1080000"/>
-            <a:ext cx="6933240" cy="5218920"/>
+            <a:ext cx="6932880" cy="5218560"/>
           </a:xfrm>
           <a:prstGeom prst="rect">
             <a:avLst/>
@@ -3275,7 +5828,7 @@
       </p:grpSpPr>
       <p:sp>
         <p:nvSpPr>
-          <p:cNvPr id="19" name="PlaceHolder 1"/>
+          <p:cNvPr id="21" name="PlaceHolder 1"/>
           <p:cNvSpPr>
             <a:spLocks noGrp="1"/>
           </p:cNvSpPr>
@@ -3286,7 +5839,7 @@
         <p:spPr>
           <a:xfrm>
             <a:off x="1981080" y="228240"/>
-            <a:ext cx="6933240" cy="714960"/>
+            <a:ext cx="6932880" cy="714600"/>
           </a:xfrm>
           <a:prstGeom prst="rect">
             <a:avLst/>
@@ -3332,7 +5885,7 @@
       </p:sp>
       <p:sp>
         <p:nvSpPr>
-          <p:cNvPr id="20" name="PlaceHolder 2"/>
+          <p:cNvPr id="22" name="PlaceHolder 2"/>
           <p:cNvSpPr>
             <a:spLocks noGrp="1"/>
           </p:cNvSpPr>
@@ -3343,7 +5896,7 @@
         <p:spPr>
           <a:xfrm>
             <a:off x="1980000" y="1080000"/>
-            <a:ext cx="6933240" cy="5578920"/>
+            <a:ext cx="6932880" cy="5578560"/>
           </a:xfrm>
           <a:prstGeom prst="rect">
             <a:avLst/>
@@ -3843,7 +6396,7 @@
       </p:grpSpPr>
       <p:sp>
         <p:nvSpPr>
-          <p:cNvPr id="21" name="PlaceHolder 1"/>
+          <p:cNvPr id="23" name="PlaceHolder 1"/>
           <p:cNvSpPr>
             <a:spLocks noGrp="1"/>
           </p:cNvSpPr>
@@ -3854,7 +6407,7 @@
         <p:spPr>
           <a:xfrm>
             <a:off x="1973160" y="225000"/>
-            <a:ext cx="6933240" cy="714960"/>
+            <a:ext cx="6932880" cy="714600"/>
           </a:xfrm>
           <a:prstGeom prst="rect">
             <a:avLst/>
@@ -3900,7 +6453,7 @@
       </p:sp>
       <p:sp>
         <p:nvSpPr>
-          <p:cNvPr id="22" name="PlaceHolder 2"/>
+          <p:cNvPr id="24" name="PlaceHolder 2"/>
           <p:cNvSpPr>
             <a:spLocks noGrp="1"/>
           </p:cNvSpPr>
@@ -3911,7 +6464,7 @@
         <p:spPr>
           <a:xfrm>
             <a:off x="1998360" y="1097280"/>
-            <a:ext cx="6933240" cy="3238920"/>
+            <a:ext cx="6932880" cy="3238560"/>
           </a:xfrm>
           <a:prstGeom prst="rect">
             <a:avLst/>
@@ -4319,7 +6872,7 @@
       </p:sp>
       <p:pic>
         <p:nvPicPr>
-          <p:cNvPr id="23" name="" descr=""/>
+          <p:cNvPr id="25" name="" descr=""/>
           <p:cNvPicPr/>
           <p:nvPr/>
         </p:nvPicPr>
@@ -4330,7 +6883,7 @@
         <p:spPr>
           <a:xfrm>
             <a:off x="2332080" y="4008960"/>
-            <a:ext cx="6478920" cy="1850760"/>
+            <a:ext cx="6478560" cy="1850400"/>
           </a:xfrm>
           <a:prstGeom prst="rect">
             <a:avLst/>
@@ -4381,7 +6934,7 @@
       </p:grpSpPr>
       <p:sp>
         <p:nvSpPr>
-          <p:cNvPr id="24" name="PlaceHolder 1"/>
+          <p:cNvPr id="26" name="PlaceHolder 1"/>
           <p:cNvSpPr>
             <a:spLocks noGrp="1"/>
           </p:cNvSpPr>
@@ -4392,7 +6945,7 @@
         <p:spPr>
           <a:xfrm>
             <a:off x="1973160" y="225000"/>
-            <a:ext cx="6933240" cy="714960"/>
+            <a:ext cx="6932880" cy="714600"/>
           </a:xfrm>
           <a:prstGeom prst="rect">
             <a:avLst/>
@@ -4438,7 +6991,7 @@
       </p:sp>
       <p:sp>
         <p:nvSpPr>
-          <p:cNvPr id="25" name="PlaceHolder 2"/>
+          <p:cNvPr id="27" name="PlaceHolder 2"/>
           <p:cNvSpPr>
             <a:spLocks noGrp="1"/>
           </p:cNvSpPr>
@@ -4449,7 +7002,7 @@
         <p:spPr>
           <a:xfrm>
             <a:off x="1980000" y="1440000"/>
-            <a:ext cx="6933240" cy="5039280"/>
+            <a:ext cx="6932880" cy="5038920"/>
           </a:xfrm>
           <a:prstGeom prst="rect">
             <a:avLst/>
@@ -4845,15 +7398,26 @@
               <a:buChar char=""/>
             </a:pPr>
             <a:r>
-              <a:rPr b="0" lang="it-IT" sz="1500" strike="noStrike" u="none">
-                <a:solidFill>
-                  <a:srgbClr val="000000"/>
-                </a:solidFill>
-                <a:uFillTx/>
-                <a:latin typeface="Verdana"/>
-                <a:ea typeface="Microsoft YaHei"/>
-              </a:rPr>
-              <a:t>Integrazione diretta con Node.js </a:t>
+              <a:rPr b="1" lang="it-IT" sz="1500" strike="noStrike" u="none">
+                <a:solidFill>
+                  <a:srgbClr val="000000"/>
+                </a:solidFill>
+                <a:uFillTx/>
+                <a:latin typeface="Verdana"/>
+                <a:ea typeface="Microsoft YaHei"/>
+              </a:rPr>
+              <a:t>Integrazione diretta</a:t>
+            </a:r>
+            <a:r>
+              <a:rPr b="0" lang="it-IT" sz="1500" strike="noStrike" u="none">
+                <a:solidFill>
+                  <a:srgbClr val="000000"/>
+                </a:solidFill>
+                <a:uFillTx/>
+                <a:latin typeface="Verdana"/>
+                <a:ea typeface="Microsoft YaHei"/>
+              </a:rPr>
+              <a:t> con Node.js </a:t>
             </a:r>
             <a:endParaRPr b="0" lang="it-IT" sz="1500" strike="noStrike" u="none">
               <a:solidFill>
@@ -4881,15 +7445,15 @@
               <a:buChar char=""/>
             </a:pPr>
             <a:r>
-              <a:rPr b="0" lang="it-IT" sz="1500" strike="noStrike" u="none">
-                <a:solidFill>
-                  <a:srgbClr val="000000"/>
-                </a:solidFill>
-                <a:uFillTx/>
-                <a:latin typeface="Verdana"/>
-                <a:ea typeface="Microsoft YaHei"/>
-              </a:rPr>
-              <a:t>Struttura modulare e scalabile </a:t>
+              <a:rPr b="1" lang="it-IT" sz="1500" strike="noStrike" u="none">
+                <a:solidFill>
+                  <a:srgbClr val="000000"/>
+                </a:solidFill>
+                <a:uFillTx/>
+                <a:latin typeface="Verdana"/>
+                <a:ea typeface="Microsoft YaHei"/>
+              </a:rPr>
+              <a:t>Struttura modulare</a:t>
             </a:r>
             <a:endParaRPr b="0" lang="it-IT" sz="1500" strike="noStrike" u="none">
               <a:solidFill>
@@ -4917,15 +7481,26 @@
               <a:buChar char=""/>
             </a:pPr>
             <a:r>
-              <a:rPr b="0" lang="it-IT" sz="1500" strike="noStrike" u="none">
-                <a:solidFill>
-                  <a:srgbClr val="000000"/>
-                </a:solidFill>
-                <a:uFillTx/>
-                <a:latin typeface="Verdana"/>
-                <a:ea typeface="Microsoft YaHei"/>
-              </a:rPr>
-              <a:t>Facilità di migrazione ad altri DBMS in futuro</a:t>
+              <a:rPr b="1" lang="it-IT" sz="1500" strike="noStrike" u="none">
+                <a:solidFill>
+                  <a:srgbClr val="000000"/>
+                </a:solidFill>
+                <a:uFillTx/>
+                <a:latin typeface="Verdana"/>
+                <a:ea typeface="Microsoft YaHei"/>
+              </a:rPr>
+              <a:t>Facilità di migrazione</a:t>
+            </a:r>
+            <a:r>
+              <a:rPr b="0" lang="it-IT" sz="1500" strike="noStrike" u="none">
+                <a:solidFill>
+                  <a:srgbClr val="000000"/>
+                </a:solidFill>
+                <a:uFillTx/>
+                <a:latin typeface="Verdana"/>
+                <a:ea typeface="Microsoft YaHei"/>
+              </a:rPr>
+              <a:t> ad altri DBMS in futuro</a:t>
             </a:r>
             <a:endParaRPr b="0" lang="it-IT" sz="1500" strike="noStrike" u="none">
               <a:solidFill>
@@ -4939,14 +7514,14 @@
       </p:sp>
       <p:sp>
         <p:nvSpPr>
-          <p:cNvPr id="26" name="PlaceHolder 6"/>
+          <p:cNvPr id="28" name="PlaceHolder 6"/>
           <p:cNvSpPr/>
           <p:nvPr/>
         </p:nvSpPr>
         <p:spPr>
           <a:xfrm>
             <a:off x="1973160" y="900000"/>
-            <a:ext cx="6933240" cy="359280"/>
+            <a:ext cx="6932880" cy="358920"/>
           </a:xfrm>
           <a:prstGeom prst="rect">
             <a:avLst/>
@@ -5069,7 +7644,7 @@
       </p:grpSpPr>
       <p:sp>
         <p:nvSpPr>
-          <p:cNvPr id="27" name="PlaceHolder 1"/>
+          <p:cNvPr id="29" name="PlaceHolder 1"/>
           <p:cNvSpPr>
             <a:spLocks noGrp="1"/>
           </p:cNvSpPr>
@@ -5080,7 +7655,7 @@
         <p:spPr>
           <a:xfrm>
             <a:off x="1973160" y="225000"/>
-            <a:ext cx="6933240" cy="714960"/>
+            <a:ext cx="6932880" cy="714600"/>
           </a:xfrm>
           <a:prstGeom prst="rect">
             <a:avLst/>
@@ -5126,7 +7701,7 @@
       </p:sp>
       <p:sp>
         <p:nvSpPr>
-          <p:cNvPr id="28" name="PlaceHolder 2"/>
+          <p:cNvPr id="30" name="PlaceHolder 2"/>
           <p:cNvSpPr>
             <a:spLocks noGrp="1"/>
           </p:cNvSpPr>
@@ -5137,7 +7712,7 @@
         <p:spPr>
           <a:xfrm>
             <a:off x="1980000" y="1440000"/>
-            <a:ext cx="6933240" cy="5039280"/>
+            <a:ext cx="6932880" cy="5038920"/>
           </a:xfrm>
           <a:prstGeom prst="rect">
             <a:avLst/>
@@ -5695,14 +8270,14 @@
       </p:sp>
       <p:sp>
         <p:nvSpPr>
-          <p:cNvPr id="29" name="PlaceHolder 9"/>
+          <p:cNvPr id="31" name="PlaceHolder 9"/>
           <p:cNvSpPr/>
           <p:nvPr/>
         </p:nvSpPr>
         <p:spPr>
           <a:xfrm>
             <a:off x="1973160" y="900000"/>
-            <a:ext cx="6933240" cy="359280"/>
+            <a:ext cx="6932880" cy="358920"/>
           </a:xfrm>
           <a:prstGeom prst="rect">
             <a:avLst/>
@@ -5825,7 +8400,7 @@
       </p:grpSpPr>
       <p:sp>
         <p:nvSpPr>
-          <p:cNvPr id="30" name="PlaceHolder 1"/>
+          <p:cNvPr id="32" name="PlaceHolder 1"/>
           <p:cNvSpPr>
             <a:spLocks noGrp="1"/>
           </p:cNvSpPr>
@@ -5836,7 +8411,7 @@
         <p:spPr>
           <a:xfrm>
             <a:off x="1973160" y="225000"/>
-            <a:ext cx="6933240" cy="714960"/>
+            <a:ext cx="6932880" cy="714600"/>
           </a:xfrm>
           <a:prstGeom prst="rect">
             <a:avLst/>
@@ -5882,7 +8457,7 @@
       </p:sp>
       <p:sp>
         <p:nvSpPr>
-          <p:cNvPr id="31" name="PlaceHolder 2"/>
+          <p:cNvPr id="33" name="PlaceHolder 2"/>
           <p:cNvSpPr>
             <a:spLocks noGrp="1"/>
           </p:cNvSpPr>
@@ -5893,7 +8468,7 @@
         <p:spPr>
           <a:xfrm>
             <a:off x="1980000" y="1440000"/>
-            <a:ext cx="6933240" cy="5219280"/>
+            <a:ext cx="6932880" cy="5218920"/>
           </a:xfrm>
           <a:prstGeom prst="rect">
             <a:avLst/>
@@ -6313,14 +8888,14 @@
       </p:sp>
       <p:sp>
         <p:nvSpPr>
-          <p:cNvPr id="32" name="PlaceHolder 12"/>
+          <p:cNvPr id="34" name="PlaceHolder 12"/>
           <p:cNvSpPr/>
           <p:nvPr/>
         </p:nvSpPr>
         <p:spPr>
           <a:xfrm>
             <a:off x="1973160" y="900000"/>
-            <a:ext cx="6933240" cy="359280"/>
+            <a:ext cx="6932880" cy="358920"/>
           </a:xfrm>
           <a:prstGeom prst="rect">
             <a:avLst/>
@@ -6443,7 +9018,7 @@
       </p:grpSpPr>
       <p:sp>
         <p:nvSpPr>
-          <p:cNvPr id="33" name="PlaceHolder 1"/>
+          <p:cNvPr id="35" name="PlaceHolder 1"/>
           <p:cNvSpPr>
             <a:spLocks noGrp="1"/>
           </p:cNvSpPr>
@@ -6454,7 +9029,7 @@
         <p:spPr>
           <a:xfrm>
             <a:off x="1973160" y="225000"/>
-            <a:ext cx="6933240" cy="714960"/>
+            <a:ext cx="6932880" cy="714600"/>
           </a:xfrm>
           <a:prstGeom prst="rect">
             <a:avLst/>
@@ -6500,7 +9075,7 @@
       </p:sp>
       <p:sp>
         <p:nvSpPr>
-          <p:cNvPr id="34" name="PlaceHolder 2"/>
+          <p:cNvPr id="36" name="PlaceHolder 2"/>
           <p:cNvSpPr>
             <a:spLocks noGrp="1"/>
           </p:cNvSpPr>
@@ -6511,7 +9086,7 @@
         <p:spPr>
           <a:xfrm>
             <a:off x="1980000" y="1440000"/>
-            <a:ext cx="6933240" cy="5219280"/>
+            <a:ext cx="6932880" cy="5218920"/>
           </a:xfrm>
           <a:prstGeom prst="rect">
             <a:avLst/>
@@ -7030,14 +9605,14 @@
       </p:sp>
       <p:sp>
         <p:nvSpPr>
-          <p:cNvPr id="35" name="PlaceHolder 15"/>
+          <p:cNvPr id="37" name="PlaceHolder 15"/>
           <p:cNvSpPr/>
           <p:nvPr/>
         </p:nvSpPr>
         <p:spPr>
           <a:xfrm>
             <a:off x="1973160" y="900000"/>
-            <a:ext cx="6933240" cy="359280"/>
+            <a:ext cx="6932880" cy="358920"/>
           </a:xfrm>
           <a:prstGeom prst="rect">
             <a:avLst/>

</xml_diff>

<commit_message>
presentazione progetto parte 3
</commit_message>
<xml_diff>
--- a/Air Connect - Presentazione.pptx
+++ b/Air Connect - Presentazione.pptx
@@ -3,11 +3,11 @@
 <p:presentation xmlns:a="http://schemas.openxmlformats.org/drawingml/2006/main" xmlns:p="http://schemas.openxmlformats.org/presentationml/2006/main" xmlns:r="http://schemas.openxmlformats.org/officeDocument/2006/relationships" xmlns:p14="http://schemas.microsoft.com/office/powerpoint/2010/main" xmlns:p15="http://schemas.microsoft.com/office/powerpoint/2012/main" xmlns:mc="http://schemas.openxmlformats.org/markup-compatibility/2006">
   <p:sldMasterIdLst>
     <p:sldMasterId id="2147483648" r:id="rId2"/>
-    <p:sldMasterId id="2147483650" r:id="rId3"/>
-    <p:sldMasterId id="2147483652" r:id="rId4"/>
-    <p:sldMasterId id="2147483654" r:id="rId5"/>
-    <p:sldMasterId id="2147483656" r:id="rId6"/>
-    <p:sldMasterId id="2147483658" r:id="rId7"/>
+    <p:sldMasterId id="2147483651" r:id="rId3"/>
+    <p:sldMasterId id="2147483653" r:id="rId4"/>
+    <p:sldMasterId id="2147483655" r:id="rId5"/>
+    <p:sldMasterId id="2147483657" r:id="rId6"/>
+    <p:sldMasterId id="2147483659" r:id="rId7"/>
   </p:sldMasterIdLst>
   <p:sldIdLst>
     <p:sldId id="256" r:id="rId8"/>
@@ -22,6 +22,9 @@
     <p:sldId id="265" r:id="rId17"/>
     <p:sldId id="266" r:id="rId18"/>
     <p:sldId id="267" r:id="rId19"/>
+    <p:sldId id="268" r:id="rId20"/>
+    <p:sldId id="269" r:id="rId21"/>
+    <p:sldId id="270" r:id="rId22"/>
   </p:sldIdLst>
   <p:sldSz cx="9144000" cy="6858000"/>
   <p:notesSz cx="7559675" cy="10691813"/>
@@ -58,7 +61,7 @@
         <p:spPr>
           <a:xfrm>
             <a:off x="990720" y="1392840"/>
-            <a:ext cx="7312680" cy="1432080"/>
+            <a:ext cx="7312320" cy="1431720"/>
           </a:xfrm>
           <a:prstGeom prst="rect">
             <a:avLst/>
@@ -99,7 +102,7 @@
         <p:spPr>
           <a:xfrm>
             <a:off x="990720" y="2514240"/>
-            <a:ext cx="7312680" cy="4264560"/>
+            <a:ext cx="7312320" cy="4264200"/>
           </a:xfrm>
           <a:prstGeom prst="rect">
             <a:avLst/>
@@ -136,6 +139,110 @@
 </file>
 
 <file path=ppt/slideLayouts/slideLayout2.xml><?xml version="1.0" encoding="utf-8"?>
+<p:sldLayout xmlns:a="http://schemas.openxmlformats.org/drawingml/2006/main" xmlns:p="http://schemas.openxmlformats.org/presentationml/2006/main" xmlns:r="http://schemas.openxmlformats.org/officeDocument/2006/relationships" xmlns:p14="http://schemas.microsoft.com/office/powerpoint/2010/main" xmlns:p15="http://schemas.microsoft.com/office/powerpoint/2012/main" xmlns:mc="http://schemas.openxmlformats.org/markup-compatibility/2006" type="title" preserve="1">
+  <p:cSld name="Predefinito">
+    <p:spTree>
+      <p:nvGrpSpPr>
+        <p:cNvPr id="1" name=""/>
+        <p:cNvGrpSpPr/>
+        <p:nvPr/>
+      </p:nvGrpSpPr>
+      <p:grpSpPr>
+        <a:xfrm>
+          <a:off x="0" y="0"/>
+          <a:ext cx="0" cy="0"/>
+          <a:chOff x="0" y="0"/>
+          <a:chExt cx="0" cy="0"/>
+        </a:xfrm>
+      </p:grpSpPr>
+      <p:sp>
+        <p:nvSpPr>
+          <p:cNvPr id="4" name="PlaceHolder 1"/>
+          <p:cNvSpPr>
+            <a:spLocks noGrp="1"/>
+          </p:cNvSpPr>
+          <p:nvPr>
+            <p:ph type="title"/>
+          </p:nvPr>
+        </p:nvSpPr>
+        <p:spPr>
+          <a:xfrm>
+            <a:off x="990720" y="1392840"/>
+            <a:ext cx="7312320" cy="1431720"/>
+          </a:xfrm>
+          <a:prstGeom prst="rect">
+            <a:avLst/>
+          </a:prstGeom>
+          <a:noFill/>
+          <a:ln w="0">
+            <a:noFill/>
+          </a:ln>
+        </p:spPr>
+        <p:txBody>
+          <a:bodyPr lIns="0" rIns="0" tIns="0" bIns="0" anchor="ctr">
+            <a:noAutofit/>
+          </a:bodyPr>
+          <a:p>
+            <a:pPr indent="0" algn="ctr">
+              <a:buNone/>
+            </a:pPr>
+            <a:endParaRPr b="0" lang="it-IT" sz="4400" strike="noStrike" u="none">
+              <a:solidFill>
+                <a:srgbClr val="000000"/>
+              </a:solidFill>
+              <a:uFillTx/>
+              <a:latin typeface="Arial"/>
+            </a:endParaRPr>
+          </a:p>
+        </p:txBody>
+      </p:sp>
+      <p:sp>
+        <p:nvSpPr>
+          <p:cNvPr id="5" name="PlaceHolder 2"/>
+          <p:cNvSpPr>
+            <a:spLocks noGrp="1"/>
+          </p:cNvSpPr>
+          <p:nvPr>
+            <p:ph type="subTitle"/>
+          </p:nvPr>
+        </p:nvSpPr>
+        <p:spPr>
+          <a:xfrm>
+            <a:off x="990720" y="2514240"/>
+            <a:ext cx="7312320" cy="4264200"/>
+          </a:xfrm>
+          <a:prstGeom prst="rect">
+            <a:avLst/>
+          </a:prstGeom>
+          <a:noFill/>
+          <a:ln w="0">
+            <a:noFill/>
+          </a:ln>
+        </p:spPr>
+        <p:txBody>
+          <a:bodyPr lIns="0" rIns="0" tIns="0" bIns="0" anchor="ctr">
+            <a:noAutofit/>
+          </a:bodyPr>
+          <a:p>
+            <a:pPr indent="0" algn="ctr">
+              <a:buNone/>
+            </a:pPr>
+            <a:endParaRPr b="0" lang="it-IT" sz="3200" strike="noStrike" u="none">
+              <a:solidFill>
+                <a:srgbClr val="000000"/>
+              </a:solidFill>
+              <a:uFillTx/>
+              <a:latin typeface="Arial"/>
+            </a:endParaRPr>
+          </a:p>
+        </p:txBody>
+      </p:sp>
+    </p:spTree>
+  </p:cSld>
+</p:sldLayout>
+</file>
+
+<file path=ppt/slideLayouts/slideLayout3.xml><?xml version="1.0" encoding="utf-8"?>
 <p:sldLayout xmlns:a="http://schemas.openxmlformats.org/drawingml/2006/main" xmlns:p="http://schemas.openxmlformats.org/presentationml/2006/main" xmlns:r="http://schemas.openxmlformats.org/officeDocument/2006/relationships" xmlns:p14="http://schemas.microsoft.com/office/powerpoint/2010/main" xmlns:p15="http://schemas.microsoft.com/office/powerpoint/2012/main" xmlns:mc="http://schemas.openxmlformats.org/markup-compatibility/2006" type="title" preserve="1">
   <p:cSld name="Predefinito 1">
     <p:spTree>
@@ -154,7 +261,7 @@
       </p:grpSpPr>
       <p:sp>
         <p:nvSpPr>
-          <p:cNvPr id="5" name="PlaceHolder 1"/>
+          <p:cNvPr id="7" name="PlaceHolder 1"/>
           <p:cNvSpPr>
             <a:spLocks noGrp="1"/>
           </p:cNvSpPr>
@@ -165,7 +272,7 @@
         <p:spPr>
           <a:xfrm>
             <a:off x="990720" y="1392840"/>
-            <a:ext cx="7312680" cy="1432080"/>
+            <a:ext cx="7312320" cy="1431720"/>
           </a:xfrm>
           <a:prstGeom prst="rect">
             <a:avLst/>
@@ -195,7 +302,7 @@
       </p:sp>
       <p:sp>
         <p:nvSpPr>
-          <p:cNvPr id="6" name="PlaceHolder 2"/>
+          <p:cNvPr id="8" name="PlaceHolder 2"/>
           <p:cNvSpPr>
             <a:spLocks noGrp="1"/>
           </p:cNvSpPr>
@@ -206,7 +313,7 @@
         <p:spPr>
           <a:xfrm>
             <a:off x="990720" y="2514240"/>
-            <a:ext cx="7312680" cy="4264560"/>
+            <a:ext cx="7312320" cy="4264200"/>
           </a:xfrm>
           <a:prstGeom prst="rect">
             <a:avLst/>
@@ -239,7 +346,7 @@
 </p:sldLayout>
 </file>
 
-<file path=ppt/slideLayouts/slideLayout3.xml><?xml version="1.0" encoding="utf-8"?>
+<file path=ppt/slideLayouts/slideLayout4.xml><?xml version="1.0" encoding="utf-8"?>
 <p:sldLayout xmlns:a="http://schemas.openxmlformats.org/drawingml/2006/main" xmlns:p="http://schemas.openxmlformats.org/presentationml/2006/main" xmlns:r="http://schemas.openxmlformats.org/officeDocument/2006/relationships" xmlns:p14="http://schemas.microsoft.com/office/powerpoint/2010/main" xmlns:p15="http://schemas.microsoft.com/office/powerpoint/2012/main" xmlns:mc="http://schemas.openxmlformats.org/markup-compatibility/2006" type="title" preserve="1">
   <p:cSld name="Predefinito 2">
     <p:spTree>
@@ -258,7 +365,7 @@
       </p:grpSpPr>
       <p:sp>
         <p:nvSpPr>
-          <p:cNvPr id="8" name="PlaceHolder 1"/>
+          <p:cNvPr id="10" name="PlaceHolder 1"/>
           <p:cNvSpPr>
             <a:spLocks noGrp="1"/>
           </p:cNvSpPr>
@@ -269,7 +376,7 @@
         <p:spPr>
           <a:xfrm>
             <a:off x="990720" y="1392840"/>
-            <a:ext cx="7312680" cy="1432080"/>
+            <a:ext cx="7312320" cy="1431720"/>
           </a:xfrm>
           <a:prstGeom prst="rect">
             <a:avLst/>
@@ -299,7 +406,7 @@
       </p:sp>
       <p:sp>
         <p:nvSpPr>
-          <p:cNvPr id="9" name="PlaceHolder 2"/>
+          <p:cNvPr id="11" name="PlaceHolder 2"/>
           <p:cNvSpPr>
             <a:spLocks noGrp="1"/>
           </p:cNvSpPr>
@@ -310,7 +417,7 @@
         <p:spPr>
           <a:xfrm>
             <a:off x="990720" y="2514240"/>
-            <a:ext cx="7312680" cy="4264560"/>
+            <a:ext cx="7312320" cy="4264200"/>
           </a:xfrm>
           <a:prstGeom prst="rect">
             <a:avLst/>
@@ -343,7 +450,7 @@
 </p:sldLayout>
 </file>
 
-<file path=ppt/slideLayouts/slideLayout4.xml><?xml version="1.0" encoding="utf-8"?>
+<file path=ppt/slideLayouts/slideLayout5.xml><?xml version="1.0" encoding="utf-8"?>
 <p:sldLayout xmlns:a="http://schemas.openxmlformats.org/drawingml/2006/main" xmlns:p="http://schemas.openxmlformats.org/presentationml/2006/main" xmlns:r="http://schemas.openxmlformats.org/officeDocument/2006/relationships" xmlns:p14="http://schemas.microsoft.com/office/powerpoint/2010/main" xmlns:p15="http://schemas.microsoft.com/office/powerpoint/2012/main" xmlns:mc="http://schemas.openxmlformats.org/markup-compatibility/2006" type="title" preserve="1">
   <p:cSld name="Predefinito 3">
     <p:spTree>
@@ -362,7 +469,7 @@
       </p:grpSpPr>
       <p:sp>
         <p:nvSpPr>
-          <p:cNvPr id="11" name="PlaceHolder 1"/>
+          <p:cNvPr id="13" name="PlaceHolder 1"/>
           <p:cNvSpPr>
             <a:spLocks noGrp="1"/>
           </p:cNvSpPr>
@@ -373,7 +480,7 @@
         <p:spPr>
           <a:xfrm>
             <a:off x="990720" y="1392840"/>
-            <a:ext cx="7312680" cy="1432080"/>
+            <a:ext cx="7312320" cy="1431720"/>
           </a:xfrm>
           <a:prstGeom prst="rect">
             <a:avLst/>
@@ -403,7 +510,7 @@
       </p:sp>
       <p:sp>
         <p:nvSpPr>
-          <p:cNvPr id="12" name="PlaceHolder 2"/>
+          <p:cNvPr id="14" name="PlaceHolder 2"/>
           <p:cNvSpPr>
             <a:spLocks noGrp="1"/>
           </p:cNvSpPr>
@@ -414,7 +521,7 @@
         <p:spPr>
           <a:xfrm>
             <a:off x="990720" y="2514240"/>
-            <a:ext cx="7312680" cy="4264560"/>
+            <a:ext cx="7312320" cy="4264200"/>
           </a:xfrm>
           <a:prstGeom prst="rect">
             <a:avLst/>
@@ -447,7 +554,7 @@
 </p:sldLayout>
 </file>
 
-<file path=ppt/slideLayouts/slideLayout5.xml><?xml version="1.0" encoding="utf-8"?>
+<file path=ppt/slideLayouts/slideLayout6.xml><?xml version="1.0" encoding="utf-8"?>
 <p:sldLayout xmlns:a="http://schemas.openxmlformats.org/drawingml/2006/main" xmlns:p="http://schemas.openxmlformats.org/presentationml/2006/main" xmlns:r="http://schemas.openxmlformats.org/officeDocument/2006/relationships" xmlns:p14="http://schemas.microsoft.com/office/powerpoint/2010/main" xmlns:p15="http://schemas.microsoft.com/office/powerpoint/2012/main" xmlns:mc="http://schemas.openxmlformats.org/markup-compatibility/2006" type="title" preserve="1">
   <p:cSld name="Predefinito 4">
     <p:spTree>
@@ -466,7 +573,7 @@
       </p:grpSpPr>
       <p:sp>
         <p:nvSpPr>
-          <p:cNvPr id="14" name="PlaceHolder 1"/>
+          <p:cNvPr id="16" name="PlaceHolder 1"/>
           <p:cNvSpPr>
             <a:spLocks noGrp="1"/>
           </p:cNvSpPr>
@@ -477,7 +584,7 @@
         <p:spPr>
           <a:xfrm>
             <a:off x="990720" y="1392840"/>
-            <a:ext cx="7312680" cy="1432080"/>
+            <a:ext cx="7312320" cy="1431720"/>
           </a:xfrm>
           <a:prstGeom prst="rect">
             <a:avLst/>
@@ -507,7 +614,7 @@
       </p:sp>
       <p:sp>
         <p:nvSpPr>
-          <p:cNvPr id="15" name="PlaceHolder 2"/>
+          <p:cNvPr id="17" name="PlaceHolder 2"/>
           <p:cNvSpPr>
             <a:spLocks noGrp="1"/>
           </p:cNvSpPr>
@@ -518,7 +625,7 @@
         <p:spPr>
           <a:xfrm>
             <a:off x="990720" y="2514240"/>
-            <a:ext cx="7312680" cy="4264560"/>
+            <a:ext cx="7312320" cy="4264200"/>
           </a:xfrm>
           <a:prstGeom prst="rect">
             <a:avLst/>
@@ -551,7 +658,7 @@
 </p:sldLayout>
 </file>
 
-<file path=ppt/slideLayouts/slideLayout6.xml><?xml version="1.0" encoding="utf-8"?>
+<file path=ppt/slideLayouts/slideLayout7.xml><?xml version="1.0" encoding="utf-8"?>
 <p:sldLayout xmlns:a="http://schemas.openxmlformats.org/drawingml/2006/main" xmlns:p="http://schemas.openxmlformats.org/presentationml/2006/main" xmlns:r="http://schemas.openxmlformats.org/officeDocument/2006/relationships" xmlns:p14="http://schemas.microsoft.com/office/powerpoint/2010/main" xmlns:p15="http://schemas.microsoft.com/office/powerpoint/2012/main" xmlns:mc="http://schemas.openxmlformats.org/markup-compatibility/2006" type="title" preserve="1">
   <p:cSld name="Titolo1">
     <p:spTree>
@@ -570,7 +677,7 @@
       </p:grpSpPr>
       <p:sp>
         <p:nvSpPr>
-          <p:cNvPr id="18" name="PlaceHolder 1"/>
+          <p:cNvPr id="20" name="PlaceHolder 1"/>
           <p:cNvSpPr>
             <a:spLocks noGrp="1"/>
           </p:cNvSpPr>
@@ -581,7 +688,7 @@
         <p:spPr>
           <a:xfrm>
             <a:off x="990720" y="1392840"/>
-            <a:ext cx="7312680" cy="1432080"/>
+            <a:ext cx="7312320" cy="1431720"/>
           </a:xfrm>
           <a:prstGeom prst="rect">
             <a:avLst/>
@@ -611,7 +718,7 @@
       </p:sp>
       <p:sp>
         <p:nvSpPr>
-          <p:cNvPr id="19" name="PlaceHolder 2"/>
+          <p:cNvPr id="21" name="PlaceHolder 2"/>
           <p:cNvSpPr>
             <a:spLocks noGrp="1"/>
           </p:cNvSpPr>
@@ -622,7 +729,7 @@
         <p:spPr>
           <a:xfrm>
             <a:off x="990720" y="2514240"/>
-            <a:ext cx="7312680" cy="4264560"/>
+            <a:ext cx="7312320" cy="4264200"/>
           </a:xfrm>
           <a:prstGeom prst="rect">
             <a:avLst/>
@@ -693,7 +800,7 @@
         <p:spPr>
           <a:xfrm>
             <a:off x="990720" y="1392840"/>
-            <a:ext cx="7312680" cy="1432080"/>
+            <a:ext cx="7312320" cy="1431720"/>
           </a:xfrm>
           <a:prstGeom prst="rect">
             <a:avLst/>
@@ -744,7 +851,7 @@
         <p:spPr>
           <a:xfrm>
             <a:off x="990720" y="2514240"/>
-            <a:ext cx="7312680" cy="4264560"/>
+            <a:ext cx="7312320" cy="4264200"/>
           </a:xfrm>
           <a:prstGeom prst="rect">
             <a:avLst/>
@@ -975,6 +1082,7 @@
   <p:clrMap bg1="lt1" tx1="dk1" bg2="lt2" tx2="dk2" accent1="accent1" accent2="accent2" accent3="accent3" accent4="accent4" accent5="accent5" accent6="accent6" hlink="hlink" folHlink="folHlink"/>
   <p:sldLayoutIdLst>
     <p:sldLayoutId id="2147483649" r:id="rId3"/>
+    <p:sldLayoutId id="2147483650" r:id="rId4"/>
   </p:sldLayoutIdLst>
 </p:sldMaster>
 </file>
@@ -1006,7 +1114,7 @@
       </p:grpSpPr>
       <p:sp>
         <p:nvSpPr>
-          <p:cNvPr id="4" name="PlaceHolder 1"/>
+          <p:cNvPr id="6" name="PlaceHolder 1"/>
           <p:cNvSpPr>
             <a:spLocks noGrp="1"/>
           </p:cNvSpPr>
@@ -1017,7 +1125,7 @@
         <p:spPr>
           <a:xfrm>
             <a:off x="990720" y="1392840"/>
-            <a:ext cx="7312680" cy="1432080"/>
+            <a:ext cx="7312320" cy="1431720"/>
           </a:xfrm>
           <a:prstGeom prst="rect">
             <a:avLst/>
@@ -1059,7 +1167,7 @@
   </p:cSld>
   <p:clrMap bg1="lt1" tx1="dk1" bg2="lt2" tx2="dk2" accent1="accent1" accent2="accent2" accent3="accent3" accent4="accent4" accent5="accent5" accent6="accent6" hlink="hlink" folHlink="folHlink"/>
   <p:sldLayoutIdLst>
-    <p:sldLayoutId id="2147483651" r:id="rId3"/>
+    <p:sldLayoutId id="2147483652" r:id="rId3"/>
   </p:sldLayoutIdLst>
 </p:sldMaster>
 </file>
@@ -1091,7 +1199,7 @@
       </p:grpSpPr>
       <p:sp>
         <p:nvSpPr>
-          <p:cNvPr id="7" name="PlaceHolder 1"/>
+          <p:cNvPr id="9" name="PlaceHolder 1"/>
           <p:cNvSpPr>
             <a:spLocks noGrp="1"/>
           </p:cNvSpPr>
@@ -1102,7 +1210,7 @@
         <p:spPr>
           <a:xfrm>
             <a:off x="990720" y="1392840"/>
-            <a:ext cx="7312680" cy="1432080"/>
+            <a:ext cx="7312320" cy="1431720"/>
           </a:xfrm>
           <a:prstGeom prst="rect">
             <a:avLst/>
@@ -1144,7 +1252,7 @@
   </p:cSld>
   <p:clrMap bg1="lt1" tx1="dk1" bg2="lt2" tx2="dk2" accent1="accent1" accent2="accent2" accent3="accent3" accent4="accent4" accent5="accent5" accent6="accent6" hlink="hlink" folHlink="folHlink"/>
   <p:sldLayoutIdLst>
-    <p:sldLayoutId id="2147483653" r:id="rId3"/>
+    <p:sldLayoutId id="2147483654" r:id="rId3"/>
   </p:sldLayoutIdLst>
 </p:sldMaster>
 </file>
@@ -1176,7 +1284,7 @@
       </p:grpSpPr>
       <p:sp>
         <p:nvSpPr>
-          <p:cNvPr id="10" name="PlaceHolder 1"/>
+          <p:cNvPr id="12" name="PlaceHolder 1"/>
           <p:cNvSpPr>
             <a:spLocks noGrp="1"/>
           </p:cNvSpPr>
@@ -1187,7 +1295,7 @@
         <p:spPr>
           <a:xfrm>
             <a:off x="990720" y="1392840"/>
-            <a:ext cx="7312680" cy="1432080"/>
+            <a:ext cx="7312320" cy="1431720"/>
           </a:xfrm>
           <a:prstGeom prst="rect">
             <a:avLst/>
@@ -1229,7 +1337,7 @@
   </p:cSld>
   <p:clrMap bg1="lt1" tx1="dk1" bg2="lt2" tx2="dk2" accent1="accent1" accent2="accent2" accent3="accent3" accent4="accent4" accent5="accent5" accent6="accent6" hlink="hlink" folHlink="folHlink"/>
   <p:sldLayoutIdLst>
-    <p:sldLayoutId id="2147483655" r:id="rId3"/>
+    <p:sldLayoutId id="2147483656" r:id="rId3"/>
   </p:sldLayoutIdLst>
 </p:sldMaster>
 </file>
@@ -1261,7 +1369,7 @@
       </p:grpSpPr>
       <p:sp>
         <p:nvSpPr>
-          <p:cNvPr id="13" name="PlaceHolder 1"/>
+          <p:cNvPr id="15" name="PlaceHolder 1"/>
           <p:cNvSpPr>
             <a:spLocks noGrp="1"/>
           </p:cNvSpPr>
@@ -1272,7 +1380,7 @@
         <p:spPr>
           <a:xfrm>
             <a:off x="990720" y="1392840"/>
-            <a:ext cx="7312680" cy="1432080"/>
+            <a:ext cx="7312320" cy="1431720"/>
           </a:xfrm>
           <a:prstGeom prst="rect">
             <a:avLst/>
@@ -1314,7 +1422,7 @@
   </p:cSld>
   <p:clrMap bg1="lt1" tx1="dk1" bg2="lt2" tx2="dk2" accent1="accent1" accent2="accent2" accent3="accent3" accent4="accent4" accent5="accent5" accent6="accent6" hlink="hlink" folHlink="folHlink"/>
   <p:sldLayoutIdLst>
-    <p:sldLayoutId id="2147483657" r:id="rId3"/>
+    <p:sldLayoutId id="2147483658" r:id="rId3"/>
   </p:sldLayoutIdLst>
 </p:sldMaster>
 </file>
@@ -1346,7 +1454,7 @@
       </p:grpSpPr>
       <p:sp>
         <p:nvSpPr>
-          <p:cNvPr id="16" name="PlaceHolder 1"/>
+          <p:cNvPr id="18" name="PlaceHolder 1"/>
           <p:cNvSpPr>
             <a:spLocks noGrp="1"/>
           </p:cNvSpPr>
@@ -1357,7 +1465,7 @@
         <p:spPr>
           <a:xfrm>
             <a:off x="990720" y="1392840"/>
-            <a:ext cx="7312680" cy="1432080"/>
+            <a:ext cx="7312320" cy="1431720"/>
           </a:xfrm>
           <a:prstGeom prst="rect">
             <a:avLst/>
@@ -1397,7 +1505,7 @@
       </p:sp>
       <p:sp>
         <p:nvSpPr>
-          <p:cNvPr id="17" name="PlaceHolder 2"/>
+          <p:cNvPr id="19" name="PlaceHolder 2"/>
           <p:cNvSpPr>
             <a:spLocks noGrp="1"/>
           </p:cNvSpPr>
@@ -1638,7 +1746,7 @@
   </p:cSld>
   <p:clrMap bg1="lt1" tx1="dk1" bg2="lt2" tx2="dk2" accent1="accent1" accent2="accent2" accent3="accent3" accent4="accent4" accent5="accent5" accent6="accent6" hlink="hlink" folHlink="folHlink"/>
   <p:sldLayoutIdLst>
-    <p:sldLayoutId id="2147483659" r:id="rId3"/>
+    <p:sldLayoutId id="2147483660" r:id="rId3"/>
   </p:sldLayoutIdLst>
 </p:sldMaster>
 </file>
@@ -1670,7 +1778,7 @@
       </p:grpSpPr>
       <p:sp>
         <p:nvSpPr>
-          <p:cNvPr id="20" name="PlaceHolder 1"/>
+          <p:cNvPr id="22" name="PlaceHolder 1"/>
           <p:cNvSpPr>
             <a:spLocks noGrp="1"/>
           </p:cNvSpPr>
@@ -1681,7 +1789,7 @@
         <p:spPr>
           <a:xfrm>
             <a:off x="1980000" y="180000"/>
-            <a:ext cx="4857480" cy="683280"/>
+            <a:ext cx="4857120" cy="682920"/>
           </a:xfrm>
           <a:prstGeom prst="rect">
             <a:avLst/>
@@ -1727,7 +1835,7 @@
       </p:sp>
       <p:sp>
         <p:nvSpPr>
-          <p:cNvPr id="21" name="PlaceHolder 2"/>
+          <p:cNvPr id="23" name="PlaceHolder 2"/>
           <p:cNvSpPr>
             <a:spLocks noGrp="1"/>
           </p:cNvSpPr>
@@ -1738,7 +1846,7 @@
         <p:spPr>
           <a:xfrm>
             <a:off x="180000" y="4860000"/>
-            <a:ext cx="7165440" cy="537480"/>
+            <a:ext cx="7165080" cy="537120"/>
           </a:xfrm>
           <a:prstGeom prst="rect">
             <a:avLst/>
@@ -1870,7 +1978,7 @@
       </p:sp>
       <p:sp>
         <p:nvSpPr>
-          <p:cNvPr id="22" name="PlaceHolder 3"/>
+          <p:cNvPr id="24" name="PlaceHolder 3"/>
           <p:cNvSpPr>
             <a:spLocks noGrp="1"/>
           </p:cNvSpPr>
@@ -1881,7 +1989,7 @@
         <p:spPr>
           <a:xfrm>
             <a:off x="1980000" y="754200"/>
-            <a:ext cx="8097480" cy="683280"/>
+            <a:ext cx="8097120" cy="682920"/>
           </a:xfrm>
           <a:prstGeom prst="rect">
             <a:avLst/>
@@ -1927,7 +2035,7 @@
       </p:sp>
       <p:pic>
         <p:nvPicPr>
-          <p:cNvPr id="23" name="" descr=""/>
+          <p:cNvPr id="25" name="" descr=""/>
           <p:cNvPicPr/>
           <p:nvPr/>
         </p:nvPicPr>
@@ -1938,7 +2046,7 @@
         <p:spPr>
           <a:xfrm>
             <a:off x="180000" y="3705480"/>
-            <a:ext cx="4824360" cy="1512000"/>
+            <a:ext cx="4824000" cy="1511640"/>
           </a:xfrm>
           <a:prstGeom prst="rect">
             <a:avLst/>
@@ -1989,7 +2097,7 @@
       </p:grpSpPr>
       <p:sp>
         <p:nvSpPr>
-          <p:cNvPr id="45" name="PlaceHolder 1"/>
+          <p:cNvPr id="47" name="PlaceHolder 1"/>
           <p:cNvSpPr>
             <a:spLocks noGrp="1"/>
           </p:cNvSpPr>
@@ -2000,7 +2108,7 @@
         <p:spPr>
           <a:xfrm>
             <a:off x="1973160" y="225000"/>
-            <a:ext cx="6931800" cy="713520"/>
+            <a:ext cx="6931440" cy="713160"/>
           </a:xfrm>
           <a:prstGeom prst="rect">
             <a:avLst/>
@@ -2046,7 +2154,7 @@
       </p:sp>
       <p:sp>
         <p:nvSpPr>
-          <p:cNvPr id="46" name="PlaceHolder 2"/>
+          <p:cNvPr id="48" name="PlaceHolder 2"/>
           <p:cNvSpPr>
             <a:spLocks noGrp="1"/>
           </p:cNvSpPr>
@@ -2057,7 +2165,7 @@
         <p:spPr>
           <a:xfrm>
             <a:off x="1980000" y="1440000"/>
-            <a:ext cx="6931800" cy="4497840"/>
+            <a:ext cx="6931440" cy="4497480"/>
           </a:xfrm>
           <a:prstGeom prst="rect">
             <a:avLst/>
@@ -2568,14 +2676,14 @@
       </p:sp>
       <p:sp>
         <p:nvSpPr>
-          <p:cNvPr id="47" name="PlaceHolder 18"/>
+          <p:cNvPr id="49" name="PlaceHolder 18"/>
           <p:cNvSpPr/>
           <p:nvPr/>
         </p:nvSpPr>
         <p:spPr>
           <a:xfrm>
             <a:off x="1973160" y="900000"/>
-            <a:ext cx="6931800" cy="357840"/>
+            <a:ext cx="6931440" cy="357480"/>
           </a:xfrm>
           <a:prstGeom prst="rect">
             <a:avLst/>
@@ -2666,7 +2774,7 @@
       </p:sp>
       <p:pic>
         <p:nvPicPr>
-          <p:cNvPr id="48" name="" descr=""/>
+          <p:cNvPr id="50" name="" descr=""/>
           <p:cNvPicPr/>
           <p:nvPr/>
         </p:nvPicPr>
@@ -2677,7 +2785,7 @@
         <p:spPr>
           <a:xfrm>
             <a:off x="1980360" y="5711760"/>
-            <a:ext cx="7017840" cy="766440"/>
+            <a:ext cx="7017480" cy="766080"/>
           </a:xfrm>
           <a:prstGeom prst="rect">
             <a:avLst/>
@@ -2728,7 +2836,7 @@
       </p:grpSpPr>
       <p:sp>
         <p:nvSpPr>
-          <p:cNvPr id="49" name="PlaceHolder 1"/>
+          <p:cNvPr id="51" name="PlaceHolder 1"/>
           <p:cNvSpPr>
             <a:spLocks noGrp="1"/>
           </p:cNvSpPr>
@@ -2739,7 +2847,7 @@
         <p:spPr>
           <a:xfrm>
             <a:off x="1973160" y="225000"/>
-            <a:ext cx="6931800" cy="713520"/>
+            <a:ext cx="6931440" cy="713160"/>
           </a:xfrm>
           <a:prstGeom prst="rect">
             <a:avLst/>
@@ -2791,14 +2899,14 @@
       </p:sp>
       <p:sp>
         <p:nvSpPr>
-          <p:cNvPr id="50" name="PlaceHolder 5"/>
+          <p:cNvPr id="52" name="PlaceHolder 5"/>
           <p:cNvSpPr/>
           <p:nvPr/>
         </p:nvSpPr>
         <p:spPr>
           <a:xfrm>
             <a:off x="1973160" y="939960"/>
-            <a:ext cx="6931800" cy="5358960"/>
+            <a:ext cx="6931440" cy="5358600"/>
           </a:xfrm>
           <a:prstGeom prst="rect">
             <a:avLst/>
@@ -3614,7 +3722,7 @@
       </p:grpSpPr>
       <p:sp>
         <p:nvSpPr>
-          <p:cNvPr id="51" name="PlaceHolder 1"/>
+          <p:cNvPr id="53" name="PlaceHolder 1"/>
           <p:cNvSpPr>
             <a:spLocks noGrp="1"/>
           </p:cNvSpPr>
@@ -3625,7 +3733,7 @@
         <p:spPr>
           <a:xfrm>
             <a:off x="1973160" y="225000"/>
-            <a:ext cx="6931800" cy="713520"/>
+            <a:ext cx="6931440" cy="713160"/>
           </a:xfrm>
           <a:prstGeom prst="rect">
             <a:avLst/>
@@ -3677,14 +3785,14 @@
       </p:sp>
       <p:sp>
         <p:nvSpPr>
-          <p:cNvPr id="52" name="PlaceHolder 8"/>
+          <p:cNvPr id="54" name="PlaceHolder 8"/>
           <p:cNvSpPr/>
           <p:nvPr/>
         </p:nvSpPr>
         <p:spPr>
           <a:xfrm>
             <a:off x="1973160" y="939960"/>
-            <a:ext cx="6931800" cy="5718960"/>
+            <a:ext cx="6931440" cy="5718600"/>
           </a:xfrm>
           <a:prstGeom prst="rect">
             <a:avLst/>
@@ -4529,6 +4637,1880 @@
                 <a:tab algn="l" pos="0"/>
               </a:tabLst>
             </a:pPr>
+            <a:endParaRPr b="0" lang="it-IT" sz="1500" strike="noStrike" u="none">
+              <a:solidFill>
+                <a:srgbClr val="000000"/>
+              </a:solidFill>
+              <a:uFillTx/>
+              <a:latin typeface="Arial"/>
+            </a:endParaRPr>
+          </a:p>
+        </p:txBody>
+      </p:sp>
+    </p:spTree>
+  </p:cSld>
+  <mc:AlternateContent>
+    <mc:Choice Requires="p14">
+      <p:transition spd="slow" p14:dur="2000"/>
+    </mc:Choice>
+    <mc:Fallback>
+      <p:transition spd="slow"/>
+    </mc:Fallback>
+  </mc:AlternateContent>
+</p:sld>
+</file>
+
+<file path=ppt/slides/slide13.xml><?xml version="1.0" encoding="utf-8"?>
+<p:sld xmlns:a="http://schemas.openxmlformats.org/drawingml/2006/main" xmlns:p="http://schemas.openxmlformats.org/presentationml/2006/main" xmlns:r="http://schemas.openxmlformats.org/officeDocument/2006/relationships" xmlns:p14="http://schemas.microsoft.com/office/powerpoint/2010/main" xmlns:p15="http://schemas.microsoft.com/office/powerpoint/2012/main" xmlns:mc="http://schemas.openxmlformats.org/markup-compatibility/2006">
+  <p:cSld>
+    <p:bg>
+      <p:bgPr>
+        <a:blipFill rotWithShape="0">
+          <a:blip r:embed="rId1"/>
+          <a:stretch/>
+        </a:blipFill>
+      </p:bgPr>
+    </p:bg>
+    <p:spTree>
+      <p:nvGrpSpPr>
+        <p:cNvPr id="1" name=""/>
+        <p:cNvGrpSpPr/>
+        <p:nvPr/>
+      </p:nvGrpSpPr>
+      <p:grpSpPr>
+        <a:xfrm>
+          <a:off x="0" y="0"/>
+          <a:ext cx="0" cy="0"/>
+          <a:chOff x="0" y="0"/>
+          <a:chExt cx="0" cy="0"/>
+        </a:xfrm>
+      </p:grpSpPr>
+      <p:sp>
+        <p:nvSpPr>
+          <p:cNvPr id="55" name="PlaceHolder 1"/>
+          <p:cNvSpPr>
+            <a:spLocks noGrp="1"/>
+          </p:cNvSpPr>
+          <p:nvPr>
+            <p:ph type="title"/>
+          </p:nvPr>
+        </p:nvSpPr>
+        <p:spPr>
+          <a:xfrm>
+            <a:off x="1973160" y="225000"/>
+            <a:ext cx="6931440" cy="713160"/>
+          </a:xfrm>
+          <a:prstGeom prst="rect">
+            <a:avLst/>
+          </a:prstGeom>
+          <a:noFill/>
+          <a:ln w="0">
+            <a:noFill/>
+          </a:ln>
+        </p:spPr>
+        <p:txBody>
+          <a:bodyPr lIns="90000" rIns="90000" tIns="46800" bIns="46800" anchor="ctr">
+            <a:noAutofit/>
+          </a:bodyPr>
+          <a:p>
+            <a:pPr indent="0">
+              <a:lnSpc>
+                <a:spcPct val="100000"/>
+              </a:lnSpc>
+              <a:buNone/>
+              <a:tabLst>
+                <a:tab algn="l" pos="0"/>
+              </a:tabLst>
+            </a:pPr>
+            <a:r>
+              <a:rPr b="0" lang="it-IT" sz="2800" strike="noStrike" u="none">
+                <a:solidFill>
+                  <a:srgbClr val="4d4d4d"/>
+                </a:solidFill>
+                <a:uFillTx/>
+                <a:latin typeface="Microsoft Sans Serif"/>
+              </a:rPr>
+              <a:t>7. Comunicazione tra Frontend e Backend</a:t>
+            </a:r>
+            <a:endParaRPr b="0" lang="it-IT" sz="2800" strike="noStrike" u="none">
+              <a:solidFill>
+                <a:srgbClr val="000000"/>
+              </a:solidFill>
+              <a:uFillTx/>
+              <a:latin typeface="Arial"/>
+            </a:endParaRPr>
+          </a:p>
+        </p:txBody>
+      </p:sp>
+      <p:sp>
+        <p:nvSpPr>
+          <p:cNvPr id="56" name="PlaceHolder 2"/>
+          <p:cNvSpPr>
+            <a:spLocks noGrp="1"/>
+          </p:cNvSpPr>
+          <p:nvPr>
+            <p:ph/>
+          </p:nvPr>
+        </p:nvSpPr>
+        <p:spPr>
+          <a:xfrm>
+            <a:off x="1973160" y="938160"/>
+            <a:ext cx="6931440" cy="5919840"/>
+          </a:xfrm>
+          <a:prstGeom prst="rect">
+            <a:avLst/>
+          </a:prstGeom>
+          <a:noFill/>
+          <a:ln w="0">
+            <a:noFill/>
+          </a:ln>
+        </p:spPr>
+        <p:txBody>
+          <a:bodyPr lIns="90000" rIns="90000" tIns="46800" bIns="46800" anchor="t">
+            <a:normAutofit/>
+          </a:bodyPr>
+          <a:p>
+            <a:pPr marL="432000" indent="-324000">
+              <a:lnSpc>
+                <a:spcPct val="100000"/>
+              </a:lnSpc>
+              <a:spcBef>
+                <a:spcPts val="283"/>
+              </a:spcBef>
+              <a:spcAft>
+                <a:spcPts val="283"/>
+              </a:spcAft>
+              <a:buClr>
+                <a:srgbClr val="000000"/>
+              </a:buClr>
+              <a:buSzPct val="135000"/>
+              <a:buFont typeface="Symbol" charset="2"/>
+              <a:buChar char=""/>
+            </a:pPr>
+            <a:r>
+              <a:rPr b="0" lang="it-IT" sz="1500" strike="noStrike" u="none">
+                <a:solidFill>
+                  <a:srgbClr val="000000"/>
+                </a:solidFill>
+                <a:uFillTx/>
+                <a:latin typeface="Verdana"/>
+                <a:ea typeface="Microsoft YaHei"/>
+              </a:rPr>
+              <a:t>Tecnologie utilizzate: </a:t>
+            </a:r>
+            <a:endParaRPr b="0" lang="it-IT" sz="1500" strike="noStrike" u="none">
+              <a:solidFill>
+                <a:srgbClr val="000000"/>
+              </a:solidFill>
+              <a:uFillTx/>
+              <a:latin typeface="Arial"/>
+              <a:ea typeface="Microsoft YaHei"/>
+            </a:endParaRPr>
+          </a:p>
+          <a:p>
+            <a:pPr lvl="1" marL="864000" indent="-324000">
+              <a:lnSpc>
+                <a:spcPct val="100000"/>
+              </a:lnSpc>
+              <a:spcBef>
+                <a:spcPts val="283"/>
+              </a:spcBef>
+              <a:spcAft>
+                <a:spcPts val="283"/>
+              </a:spcAft>
+              <a:buClr>
+                <a:srgbClr val="000000"/>
+              </a:buClr>
+              <a:buFont typeface="Wingdings" charset="2"/>
+              <a:buChar char=""/>
+            </a:pPr>
+            <a:r>
+              <a:rPr b="1" lang="it-IT" sz="1500" strike="noStrike" u="none">
+                <a:solidFill>
+                  <a:srgbClr val="000000"/>
+                </a:solidFill>
+                <a:uFillTx/>
+                <a:latin typeface="Verdana"/>
+                <a:ea typeface="Microsoft YaHei"/>
+              </a:rPr>
+              <a:t>Axios </a:t>
+            </a:r>
+            <a:r>
+              <a:rPr b="0" lang="it-IT" sz="1500" strike="noStrike" u="none">
+                <a:solidFill>
+                  <a:srgbClr val="000000"/>
+                </a:solidFill>
+                <a:uFillTx/>
+                <a:latin typeface="Verdana"/>
+                <a:ea typeface="Microsoft YaHei"/>
+              </a:rPr>
+              <a:t>per l’invio di richieste HTTPS dal frontend</a:t>
+            </a:r>
+            <a:endParaRPr b="0" lang="it-IT" sz="1500" strike="noStrike" u="none">
+              <a:solidFill>
+                <a:srgbClr val="000000"/>
+              </a:solidFill>
+              <a:uFillTx/>
+              <a:latin typeface="Arial"/>
+              <a:ea typeface="Microsoft YaHei"/>
+            </a:endParaRPr>
+          </a:p>
+          <a:p>
+            <a:pPr lvl="1" marL="864000" indent="-324000">
+              <a:lnSpc>
+                <a:spcPct val="100000"/>
+              </a:lnSpc>
+              <a:spcBef>
+                <a:spcPts val="283"/>
+              </a:spcBef>
+              <a:spcAft>
+                <a:spcPts val="283"/>
+              </a:spcAft>
+              <a:buClr>
+                <a:srgbClr val="000000"/>
+              </a:buClr>
+              <a:buFont typeface="Wingdings" charset="2"/>
+              <a:buChar char=""/>
+            </a:pPr>
+            <a:r>
+              <a:rPr b="1" lang="it-IT" sz="1500" strike="noStrike" u="none">
+                <a:solidFill>
+                  <a:srgbClr val="000000"/>
+                </a:solidFill>
+                <a:uFillTx/>
+                <a:latin typeface="Verdana"/>
+                <a:ea typeface="Microsoft YaHei"/>
+              </a:rPr>
+              <a:t>Express.js</a:t>
+            </a:r>
+            <a:r>
+              <a:rPr b="0" lang="it-IT" sz="1500" strike="noStrike" u="none">
+                <a:solidFill>
+                  <a:srgbClr val="000000"/>
+                </a:solidFill>
+                <a:uFillTx/>
+                <a:latin typeface="Verdana"/>
+                <a:ea typeface="Microsoft YaHei"/>
+              </a:rPr>
+              <a:t> per creare API REST nel backend</a:t>
+            </a:r>
+            <a:endParaRPr b="0" lang="it-IT" sz="1500" strike="noStrike" u="none">
+              <a:solidFill>
+                <a:srgbClr val="000000"/>
+              </a:solidFill>
+              <a:uFillTx/>
+              <a:latin typeface="Arial"/>
+              <a:ea typeface="Microsoft YaHei"/>
+            </a:endParaRPr>
+          </a:p>
+          <a:p>
+            <a:pPr lvl="1" marL="864000" indent="-324000">
+              <a:lnSpc>
+                <a:spcPct val="100000"/>
+              </a:lnSpc>
+              <a:spcBef>
+                <a:spcPts val="283"/>
+              </a:spcBef>
+              <a:spcAft>
+                <a:spcPts val="283"/>
+              </a:spcAft>
+              <a:buClr>
+                <a:srgbClr val="000000"/>
+              </a:buClr>
+              <a:buFont typeface="Wingdings" charset="2"/>
+              <a:buChar char=""/>
+            </a:pPr>
+            <a:r>
+              <a:rPr b="1" lang="it-IT" sz="1500" strike="noStrike" u="none">
+                <a:solidFill>
+                  <a:srgbClr val="000000"/>
+                </a:solidFill>
+                <a:uFillTx/>
+                <a:latin typeface="Verdana"/>
+                <a:ea typeface="Microsoft YaHei"/>
+              </a:rPr>
+              <a:t>Formato JSON</a:t>
+            </a:r>
+            <a:r>
+              <a:rPr b="0" lang="it-IT" sz="1500" strike="noStrike" u="none">
+                <a:solidFill>
+                  <a:srgbClr val="000000"/>
+                </a:solidFill>
+                <a:uFillTx/>
+                <a:latin typeface="Verdana"/>
+                <a:ea typeface="Microsoft YaHei"/>
+              </a:rPr>
+              <a:t> per lo scambio di dati tra client e server</a:t>
+            </a:r>
+            <a:endParaRPr b="0" lang="it-IT" sz="1500" strike="noStrike" u="none">
+              <a:solidFill>
+                <a:srgbClr val="000000"/>
+              </a:solidFill>
+              <a:uFillTx/>
+              <a:latin typeface="Arial"/>
+              <a:ea typeface="Microsoft YaHei"/>
+            </a:endParaRPr>
+          </a:p>
+          <a:p>
+            <a:pPr marL="432000" indent="-324000">
+              <a:lnSpc>
+                <a:spcPct val="100000"/>
+              </a:lnSpc>
+              <a:spcBef>
+                <a:spcPts val="283"/>
+              </a:spcBef>
+              <a:spcAft>
+                <a:spcPts val="283"/>
+              </a:spcAft>
+              <a:buClr>
+                <a:srgbClr val="000000"/>
+              </a:buClr>
+              <a:buSzPct val="135000"/>
+              <a:buFont typeface="Symbol" charset="2"/>
+              <a:buChar char=""/>
+            </a:pPr>
+            <a:r>
+              <a:rPr b="0" lang="it-IT" sz="1500" strike="noStrike" u="none">
+                <a:solidFill>
+                  <a:srgbClr val="000000"/>
+                </a:solidFill>
+                <a:uFillTx/>
+                <a:latin typeface="Verdana"/>
+                <a:ea typeface="Microsoft YaHei"/>
+              </a:rPr>
+              <a:t>Il </a:t>
+            </a:r>
+            <a:r>
+              <a:rPr b="1" lang="it-IT" sz="1500" strike="noStrike" u="none">
+                <a:solidFill>
+                  <a:srgbClr val="000000"/>
+                </a:solidFill>
+                <a:uFillTx/>
+                <a:latin typeface="Verdana"/>
+                <a:ea typeface="Microsoft YaHei"/>
+              </a:rPr>
+              <a:t>frontend </a:t>
+            </a:r>
+            <a:r>
+              <a:rPr b="0" lang="it-IT" sz="1500" strike="noStrike" u="none">
+                <a:solidFill>
+                  <a:srgbClr val="000000"/>
+                </a:solidFill>
+                <a:uFillTx/>
+                <a:latin typeface="Verdana"/>
+                <a:ea typeface="Microsoft YaHei"/>
+              </a:rPr>
+              <a:t>invia richieste HTTPS al backend utilizzando </a:t>
+            </a:r>
+            <a:r>
+              <a:rPr b="1" lang="it-IT" sz="1500" strike="noStrike" u="none">
+                <a:solidFill>
+                  <a:srgbClr val="000000"/>
+                </a:solidFill>
+                <a:uFillTx/>
+                <a:latin typeface="Verdana"/>
+                <a:ea typeface="Microsoft YaHei"/>
+              </a:rPr>
+              <a:t>Axios</a:t>
+            </a:r>
+            <a:r>
+              <a:rPr b="0" lang="it-IT" sz="1500" strike="noStrike" u="none">
+                <a:solidFill>
+                  <a:srgbClr val="000000"/>
+                </a:solidFill>
+                <a:uFillTx/>
+                <a:latin typeface="Verdana"/>
+                <a:ea typeface="Microsoft YaHei"/>
+              </a:rPr>
+              <a:t>.</a:t>
+            </a:r>
+            <a:r>
+              <a:rPr b="1" lang="it-IT" sz="1500" strike="noStrike" u="none">
+                <a:solidFill>
+                  <a:srgbClr val="000000"/>
+                </a:solidFill>
+                <a:uFillTx/>
+                <a:latin typeface="Verdana"/>
+                <a:ea typeface="Microsoft YaHei"/>
+              </a:rPr>
+              <a:t> </a:t>
+            </a:r>
+            <a:r>
+              <a:rPr b="0" lang="it-IT" sz="1500" strike="noStrike" u="none">
+                <a:solidFill>
+                  <a:srgbClr val="000000"/>
+                </a:solidFill>
+                <a:uFillTx/>
+                <a:latin typeface="Verdana"/>
+                <a:ea typeface="Microsoft YaHei"/>
+              </a:rPr>
+              <a:t>I Il </a:t>
+            </a:r>
+            <a:r>
+              <a:rPr b="1" lang="it-IT" sz="1500" strike="noStrike" u="none">
+                <a:solidFill>
+                  <a:srgbClr val="000000"/>
+                </a:solidFill>
+                <a:uFillTx/>
+                <a:latin typeface="Verdana"/>
+                <a:ea typeface="Microsoft YaHei"/>
+              </a:rPr>
+              <a:t>backend </a:t>
+            </a:r>
+            <a:r>
+              <a:rPr b="0" lang="it-IT" sz="1500" strike="noStrike" u="none">
+                <a:solidFill>
+                  <a:srgbClr val="000000"/>
+                </a:solidFill>
+                <a:uFillTx/>
+                <a:latin typeface="Verdana"/>
+                <a:ea typeface="Microsoft YaHei"/>
+              </a:rPr>
+              <a:t>(</a:t>
+            </a:r>
+            <a:r>
+              <a:rPr b="1" lang="it-IT" sz="1500" strike="noStrike" u="none">
+                <a:solidFill>
+                  <a:srgbClr val="000000"/>
+                </a:solidFill>
+                <a:uFillTx/>
+                <a:latin typeface="Verdana"/>
+                <a:ea typeface="Microsoft YaHei"/>
+              </a:rPr>
+              <a:t>Express.js</a:t>
+            </a:r>
+            <a:r>
+              <a:rPr b="0" lang="it-IT" sz="1500" strike="noStrike" u="none">
+                <a:solidFill>
+                  <a:srgbClr val="000000"/>
+                </a:solidFill>
+                <a:uFillTx/>
+                <a:latin typeface="Verdana"/>
+                <a:ea typeface="Microsoft YaHei"/>
+              </a:rPr>
+              <a:t>) elabora la richiesta e restituisce una risposta in </a:t>
+            </a:r>
+            <a:r>
+              <a:rPr b="1" lang="it-IT" sz="1500" strike="noStrike" u="none">
+                <a:solidFill>
+                  <a:srgbClr val="000000"/>
+                </a:solidFill>
+                <a:uFillTx/>
+                <a:latin typeface="Verdana"/>
+                <a:ea typeface="Microsoft YaHei"/>
+              </a:rPr>
+              <a:t>JSON</a:t>
+            </a:r>
+            <a:r>
+              <a:rPr b="0" lang="it-IT" sz="1500" strike="noStrike" u="none">
+                <a:solidFill>
+                  <a:srgbClr val="000000"/>
+                </a:solidFill>
+                <a:uFillTx/>
+                <a:latin typeface="Verdana"/>
+                <a:ea typeface="Microsoft YaHei"/>
+              </a:rPr>
+              <a:t>.</a:t>
+            </a:r>
+            <a:r>
+              <a:rPr b="1" lang="it-IT" sz="1500" strike="noStrike" u="none">
+                <a:solidFill>
+                  <a:srgbClr val="000000"/>
+                </a:solidFill>
+                <a:uFillTx/>
+                <a:latin typeface="Verdana"/>
+                <a:ea typeface="Microsoft YaHei"/>
+              </a:rPr>
+              <a:t> </a:t>
+            </a:r>
+            <a:r>
+              <a:rPr b="0" lang="it-IT" sz="1500" strike="noStrike" u="none">
+                <a:solidFill>
+                  <a:srgbClr val="000000"/>
+                </a:solidFill>
+                <a:uFillTx/>
+                <a:latin typeface="Verdana"/>
+                <a:ea typeface="Microsoft YaHei"/>
+              </a:rPr>
+              <a:t>Il frontend aggiorna l’interfaccia utente in base ai dati ricevuti.</a:t>
+            </a:r>
+            <a:endParaRPr b="0" lang="it-IT" sz="1500" strike="noStrike" u="none">
+              <a:solidFill>
+                <a:srgbClr val="000000"/>
+              </a:solidFill>
+              <a:uFillTx/>
+              <a:latin typeface="Arial"/>
+              <a:ea typeface="Microsoft YaHei"/>
+            </a:endParaRPr>
+          </a:p>
+          <a:p>
+            <a:pPr marL="432000" indent="-324000">
+              <a:lnSpc>
+                <a:spcPct val="100000"/>
+              </a:lnSpc>
+              <a:spcBef>
+                <a:spcPts val="283"/>
+              </a:spcBef>
+              <a:spcAft>
+                <a:spcPts val="283"/>
+              </a:spcAft>
+              <a:buClr>
+                <a:srgbClr val="000000"/>
+              </a:buClr>
+              <a:buSzPct val="135000"/>
+              <a:buFont typeface="Symbol" charset="2"/>
+              <a:buChar char=""/>
+            </a:pPr>
+            <a:r>
+              <a:rPr b="0" lang="it-IT" sz="1500" strike="noStrike" u="none">
+                <a:solidFill>
+                  <a:srgbClr val="000000"/>
+                </a:solidFill>
+                <a:uFillTx/>
+                <a:latin typeface="Verdana"/>
+                <a:ea typeface="Microsoft YaHei"/>
+              </a:rPr>
+              <a:t>Vantaggi di Axios:</a:t>
+            </a:r>
+            <a:endParaRPr b="0" lang="it-IT" sz="1500" strike="noStrike" u="none">
+              <a:solidFill>
+                <a:srgbClr val="000000"/>
+              </a:solidFill>
+              <a:uFillTx/>
+              <a:latin typeface="Arial"/>
+              <a:ea typeface="Microsoft YaHei"/>
+            </a:endParaRPr>
+          </a:p>
+          <a:p>
+            <a:pPr lvl="1" marL="864000" indent="-324000">
+              <a:lnSpc>
+                <a:spcPct val="100000"/>
+              </a:lnSpc>
+              <a:spcBef>
+                <a:spcPts val="283"/>
+              </a:spcBef>
+              <a:spcAft>
+                <a:spcPts val="283"/>
+              </a:spcAft>
+              <a:buClr>
+                <a:srgbClr val="000000"/>
+              </a:buClr>
+              <a:buFont typeface="Wingdings" charset="2"/>
+              <a:buChar char=""/>
+            </a:pPr>
+            <a:r>
+              <a:rPr b="1" lang="it-IT" sz="1500" strike="noStrike" u="none">
+                <a:solidFill>
+                  <a:srgbClr val="000000"/>
+                </a:solidFill>
+                <a:uFillTx/>
+                <a:latin typeface="Verdana"/>
+                <a:ea typeface="Microsoft YaHei"/>
+              </a:rPr>
+              <a:t>Semplicità d’uso</a:t>
+            </a:r>
+            <a:r>
+              <a:rPr b="0" lang="it-IT" sz="1500" strike="noStrike" u="none">
+                <a:solidFill>
+                  <a:srgbClr val="000000"/>
+                </a:solidFill>
+                <a:uFillTx/>
+                <a:latin typeface="Verdana"/>
+                <a:ea typeface="Microsoft YaHei"/>
+              </a:rPr>
+              <a:t> → API chiare per richieste GET, POST, PUT, DELETE</a:t>
+            </a:r>
+            <a:endParaRPr b="0" lang="it-IT" sz="1500" strike="noStrike" u="none">
+              <a:solidFill>
+                <a:srgbClr val="000000"/>
+              </a:solidFill>
+              <a:uFillTx/>
+              <a:latin typeface="Arial"/>
+              <a:ea typeface="Microsoft YaHei"/>
+            </a:endParaRPr>
+          </a:p>
+          <a:p>
+            <a:pPr lvl="1" marL="864000" indent="-324000">
+              <a:lnSpc>
+                <a:spcPct val="100000"/>
+              </a:lnSpc>
+              <a:spcBef>
+                <a:spcPts val="283"/>
+              </a:spcBef>
+              <a:spcAft>
+                <a:spcPts val="283"/>
+              </a:spcAft>
+              <a:buClr>
+                <a:srgbClr val="000000"/>
+              </a:buClr>
+              <a:buFont typeface="Wingdings" charset="2"/>
+              <a:buChar char=""/>
+            </a:pPr>
+            <a:r>
+              <a:rPr b="1" lang="it-IT" sz="1500" strike="noStrike" u="none">
+                <a:solidFill>
+                  <a:srgbClr val="000000"/>
+                </a:solidFill>
+                <a:uFillTx/>
+                <a:latin typeface="Verdana"/>
+                <a:ea typeface="Microsoft YaHei"/>
+              </a:rPr>
+              <a:t>Supporto alle credenziali </a:t>
+            </a:r>
+            <a:r>
+              <a:rPr b="0" lang="it-IT" sz="1500" strike="noStrike" u="none">
+                <a:solidFill>
+                  <a:srgbClr val="000000"/>
+                </a:solidFill>
+                <a:uFillTx/>
+                <a:latin typeface="Verdana"/>
+                <a:ea typeface="Microsoft YaHei"/>
+              </a:rPr>
+              <a:t>→ Opzione </a:t>
+            </a:r>
+            <a:r>
+              <a:rPr b="1" lang="it-IT" sz="1500" strike="noStrike" u="none">
+                <a:solidFill>
+                  <a:srgbClr val="000000"/>
+                </a:solidFill>
+                <a:uFillTx/>
+                <a:latin typeface="Verdana"/>
+                <a:ea typeface="Microsoft YaHei"/>
+              </a:rPr>
+              <a:t>withCredentials</a:t>
+            </a:r>
+            <a:r>
+              <a:rPr b="0" lang="it-IT" sz="1500" strike="noStrike" u="none">
+                <a:solidFill>
+                  <a:srgbClr val="000000"/>
+                </a:solidFill>
+                <a:uFillTx/>
+                <a:latin typeface="Verdana"/>
+                <a:ea typeface="Microsoft YaHei"/>
+              </a:rPr>
+              <a:t> per autenticazione sicura</a:t>
+            </a:r>
+            <a:endParaRPr b="0" lang="it-IT" sz="1500" strike="noStrike" u="none">
+              <a:solidFill>
+                <a:srgbClr val="000000"/>
+              </a:solidFill>
+              <a:uFillTx/>
+              <a:latin typeface="Arial"/>
+              <a:ea typeface="Microsoft YaHei"/>
+            </a:endParaRPr>
+          </a:p>
+          <a:p>
+            <a:pPr lvl="1" marL="864000" indent="-324000">
+              <a:lnSpc>
+                <a:spcPct val="100000"/>
+              </a:lnSpc>
+              <a:spcBef>
+                <a:spcPts val="283"/>
+              </a:spcBef>
+              <a:spcAft>
+                <a:spcPts val="283"/>
+              </a:spcAft>
+              <a:buClr>
+                <a:srgbClr val="000000"/>
+              </a:buClr>
+              <a:buFont typeface="Wingdings" charset="2"/>
+              <a:buChar char=""/>
+            </a:pPr>
+            <a:r>
+              <a:rPr b="1" lang="it-IT" sz="1500" strike="noStrike" u="none">
+                <a:solidFill>
+                  <a:srgbClr val="000000"/>
+                </a:solidFill>
+                <a:uFillTx/>
+                <a:latin typeface="Verdana"/>
+                <a:ea typeface="Microsoft YaHei"/>
+              </a:rPr>
+              <a:t>Gestione errori </a:t>
+            </a:r>
+            <a:r>
+              <a:rPr b="0" lang="it-IT" sz="1500" strike="noStrike" u="none">
+                <a:solidFill>
+                  <a:srgbClr val="000000"/>
+                </a:solidFill>
+                <a:uFillTx/>
+                <a:latin typeface="Verdana"/>
+                <a:ea typeface="Microsoft YaHei"/>
+              </a:rPr>
+              <a:t>→ Possibilità di intercettare errori</a:t>
+            </a:r>
+            <a:endParaRPr b="0" lang="it-IT" sz="1500" strike="noStrike" u="none">
+              <a:solidFill>
+                <a:srgbClr val="000000"/>
+              </a:solidFill>
+              <a:uFillTx/>
+              <a:latin typeface="Arial"/>
+              <a:ea typeface="Microsoft YaHei"/>
+            </a:endParaRPr>
+          </a:p>
+          <a:p>
+            <a:pPr marL="432000" indent="-324000">
+              <a:lnSpc>
+                <a:spcPct val="100000"/>
+              </a:lnSpc>
+              <a:spcBef>
+                <a:spcPts val="283"/>
+              </a:spcBef>
+              <a:spcAft>
+                <a:spcPts val="283"/>
+              </a:spcAft>
+              <a:buClr>
+                <a:srgbClr val="000000"/>
+              </a:buClr>
+              <a:buSzPct val="135000"/>
+              <a:buFont typeface="Symbol" charset="2"/>
+              <a:buChar char=""/>
+            </a:pPr>
+            <a:r>
+              <a:rPr b="0" lang="it-IT" sz="1500" strike="noStrike" u="none">
+                <a:solidFill>
+                  <a:srgbClr val="000000"/>
+                </a:solidFill>
+                <a:uFillTx/>
+                <a:latin typeface="Verdana"/>
+                <a:ea typeface="Microsoft YaHei"/>
+              </a:rPr>
+              <a:t>Endpoint principali:</a:t>
+            </a:r>
+            <a:endParaRPr b="0" lang="it-IT" sz="1500" strike="noStrike" u="none">
+              <a:solidFill>
+                <a:srgbClr val="000000"/>
+              </a:solidFill>
+              <a:uFillTx/>
+              <a:latin typeface="Arial"/>
+              <a:ea typeface="Microsoft YaHei"/>
+            </a:endParaRPr>
+          </a:p>
+          <a:p>
+            <a:pPr lvl="1" marL="864000" indent="-324000">
+              <a:lnSpc>
+                <a:spcPct val="100000"/>
+              </a:lnSpc>
+              <a:spcBef>
+                <a:spcPts val="283"/>
+              </a:spcBef>
+              <a:spcAft>
+                <a:spcPts val="283"/>
+              </a:spcAft>
+              <a:buClr>
+                <a:srgbClr val="000000"/>
+              </a:buClr>
+              <a:buFont typeface="Wingdings" charset="2"/>
+              <a:buChar char=""/>
+            </a:pPr>
+            <a:r>
+              <a:rPr b="1" lang="it-IT" sz="1500" strike="noStrike" u="none">
+                <a:solidFill>
+                  <a:srgbClr val="000000"/>
+                </a:solidFill>
+                <a:uFillTx/>
+                <a:latin typeface="Verdana"/>
+                <a:ea typeface="Microsoft YaHei"/>
+              </a:rPr>
+              <a:t>/api/auth</a:t>
+            </a:r>
+            <a:r>
+              <a:rPr b="0" lang="it-IT" sz="1500" strike="noStrike" u="none">
+                <a:solidFill>
+                  <a:srgbClr val="000000"/>
+                </a:solidFill>
+                <a:uFillTx/>
+                <a:latin typeface="Verdana"/>
+                <a:ea typeface="Microsoft YaHei"/>
+              </a:rPr>
+              <a:t> → Login, registrazione, gestione profilo </a:t>
+            </a:r>
+            <a:endParaRPr b="0" lang="it-IT" sz="1500" strike="noStrike" u="none">
+              <a:solidFill>
+                <a:srgbClr val="000000"/>
+              </a:solidFill>
+              <a:uFillTx/>
+              <a:latin typeface="Arial"/>
+              <a:ea typeface="Microsoft YaHei"/>
+            </a:endParaRPr>
+          </a:p>
+          <a:p>
+            <a:pPr lvl="1" marL="864000" indent="-324000">
+              <a:lnSpc>
+                <a:spcPct val="100000"/>
+              </a:lnSpc>
+              <a:spcBef>
+                <a:spcPts val="283"/>
+              </a:spcBef>
+              <a:spcAft>
+                <a:spcPts val="283"/>
+              </a:spcAft>
+              <a:buClr>
+                <a:srgbClr val="000000"/>
+              </a:buClr>
+              <a:buFont typeface="Wingdings" charset="2"/>
+              <a:buChar char=""/>
+            </a:pPr>
+            <a:r>
+              <a:rPr b="1" lang="it-IT" sz="1500" strike="noStrike" u="none">
+                <a:solidFill>
+                  <a:srgbClr val="000000"/>
+                </a:solidFill>
+                <a:uFillTx/>
+                <a:latin typeface="Verdana"/>
+                <a:ea typeface="Microsoft YaHei"/>
+              </a:rPr>
+              <a:t>/api/flight</a:t>
+            </a:r>
+            <a:r>
+              <a:rPr b="0" lang="it-IT" sz="1500" strike="noStrike" u="none">
+                <a:solidFill>
+                  <a:srgbClr val="000000"/>
+                </a:solidFill>
+                <a:uFillTx/>
+                <a:latin typeface="Verdana"/>
+                <a:ea typeface="Microsoft YaHei"/>
+              </a:rPr>
+              <a:t> → Ricerca e gestione voli </a:t>
+            </a:r>
+            <a:endParaRPr b="0" lang="it-IT" sz="1500" strike="noStrike" u="none">
+              <a:solidFill>
+                <a:srgbClr val="000000"/>
+              </a:solidFill>
+              <a:uFillTx/>
+              <a:latin typeface="Arial"/>
+              <a:ea typeface="Microsoft YaHei"/>
+            </a:endParaRPr>
+          </a:p>
+          <a:p>
+            <a:pPr lvl="1" marL="864000" indent="-324000">
+              <a:lnSpc>
+                <a:spcPct val="100000"/>
+              </a:lnSpc>
+              <a:spcBef>
+                <a:spcPts val="283"/>
+              </a:spcBef>
+              <a:spcAft>
+                <a:spcPts val="283"/>
+              </a:spcAft>
+              <a:buClr>
+                <a:srgbClr val="000000"/>
+              </a:buClr>
+              <a:buFont typeface="Wingdings" charset="2"/>
+              <a:buChar char=""/>
+            </a:pPr>
+            <a:r>
+              <a:rPr b="1" lang="it-IT" sz="1500" strike="noStrike" u="none">
+                <a:solidFill>
+                  <a:srgbClr val="000000"/>
+                </a:solidFill>
+                <a:uFillTx/>
+                <a:latin typeface="Verdana"/>
+                <a:ea typeface="Microsoft YaHei"/>
+              </a:rPr>
+              <a:t>/api/ticket</a:t>
+            </a:r>
+            <a:r>
+              <a:rPr b="0" lang="it-IT" sz="1500" strike="noStrike" u="none">
+                <a:solidFill>
+                  <a:srgbClr val="000000"/>
+                </a:solidFill>
+                <a:uFillTx/>
+                <a:latin typeface="Verdana"/>
+                <a:ea typeface="Microsoft YaHei"/>
+              </a:rPr>
+              <a:t> → Acquisto, cancellazione, check-in biglietti</a:t>
+            </a:r>
+            <a:endParaRPr b="0" lang="it-IT" sz="1500" strike="noStrike" u="none">
+              <a:solidFill>
+                <a:srgbClr val="000000"/>
+              </a:solidFill>
+              <a:uFillTx/>
+              <a:latin typeface="Arial"/>
+              <a:ea typeface="Microsoft YaHei"/>
+            </a:endParaRPr>
+          </a:p>
+          <a:p>
+            <a:pPr lvl="1" marL="864000" indent="-324000">
+              <a:lnSpc>
+                <a:spcPct val="100000"/>
+              </a:lnSpc>
+              <a:spcBef>
+                <a:spcPts val="283"/>
+              </a:spcBef>
+              <a:spcAft>
+                <a:spcPts val="283"/>
+              </a:spcAft>
+              <a:buClr>
+                <a:srgbClr val="000000"/>
+              </a:buClr>
+              <a:buFont typeface="Wingdings" charset="2"/>
+              <a:buChar char=""/>
+            </a:pPr>
+            <a:r>
+              <a:rPr b="1" lang="it-IT" sz="1500" strike="noStrike" u="none">
+                <a:solidFill>
+                  <a:srgbClr val="000000"/>
+                </a:solidFill>
+                <a:uFillTx/>
+                <a:latin typeface="Verdana"/>
+                <a:ea typeface="Microsoft YaHei"/>
+              </a:rPr>
+              <a:t>/api/history</a:t>
+            </a:r>
+            <a:r>
+              <a:rPr b="0" lang="it-IT" sz="1500" strike="noStrike" u="none">
+                <a:solidFill>
+                  <a:srgbClr val="000000"/>
+                </a:solidFill>
+                <a:uFillTx/>
+                <a:latin typeface="Verdana"/>
+                <a:ea typeface="Microsoft YaHei"/>
+              </a:rPr>
+              <a:t> </a:t>
+            </a:r>
+            <a:r>
+              <a:rPr b="0" lang="it-IT" sz="1500" strike="noStrike" u="none">
+                <a:solidFill>
+                  <a:srgbClr val="000000"/>
+                </a:solidFill>
+                <a:uFillTx/>
+                <a:latin typeface="Verdana"/>
+                <a:ea typeface="Microsoft YaHei"/>
+              </a:rPr>
+              <a:t>→ Storico transazioni</a:t>
+            </a:r>
+            <a:endParaRPr b="0" lang="it-IT" sz="1500" strike="noStrike" u="none">
+              <a:solidFill>
+                <a:srgbClr val="000000"/>
+              </a:solidFill>
+              <a:uFillTx/>
+              <a:latin typeface="Arial"/>
+              <a:ea typeface="Microsoft YaHei"/>
+            </a:endParaRPr>
+          </a:p>
+          <a:p>
+            <a:pPr marL="432000" indent="0">
+              <a:lnSpc>
+                <a:spcPct val="100000"/>
+              </a:lnSpc>
+              <a:spcBef>
+                <a:spcPts val="283"/>
+              </a:spcBef>
+              <a:spcAft>
+                <a:spcPts val="283"/>
+              </a:spcAft>
+              <a:buNone/>
+            </a:pPr>
+            <a:endParaRPr b="0" lang="it-IT" sz="1500" strike="noStrike" u="none">
+              <a:solidFill>
+                <a:srgbClr val="000000"/>
+              </a:solidFill>
+              <a:uFillTx/>
+              <a:latin typeface="Arial"/>
+              <a:ea typeface="Microsoft YaHei"/>
+            </a:endParaRPr>
+          </a:p>
+          <a:p>
+            <a:pPr marL="432000" indent="0">
+              <a:lnSpc>
+                <a:spcPct val="100000"/>
+              </a:lnSpc>
+              <a:spcBef>
+                <a:spcPts val="1474"/>
+              </a:spcBef>
+              <a:spcAft>
+                <a:spcPts val="1276"/>
+              </a:spcAft>
+              <a:buNone/>
+              <a:tabLst>
+                <a:tab algn="l" pos="0"/>
+              </a:tabLst>
+            </a:pPr>
+            <a:endParaRPr b="0" lang="it-IT" sz="1500" strike="noStrike" u="none">
+              <a:solidFill>
+                <a:srgbClr val="000000"/>
+              </a:solidFill>
+              <a:uFillTx/>
+              <a:latin typeface="Arial"/>
+            </a:endParaRPr>
+          </a:p>
+          <a:p>
+            <a:pPr marL="432000" indent="0">
+              <a:lnSpc>
+                <a:spcPct val="100000"/>
+              </a:lnSpc>
+              <a:spcBef>
+                <a:spcPts val="907"/>
+              </a:spcBef>
+              <a:spcAft>
+                <a:spcPts val="709"/>
+              </a:spcAft>
+              <a:buNone/>
+              <a:tabLst>
+                <a:tab algn="l" pos="0"/>
+              </a:tabLst>
+            </a:pPr>
+            <a:endParaRPr b="0" lang="it-IT" sz="1500" strike="noStrike" u="none">
+              <a:solidFill>
+                <a:srgbClr val="000000"/>
+              </a:solidFill>
+              <a:uFillTx/>
+              <a:latin typeface="Arial"/>
+            </a:endParaRPr>
+          </a:p>
+        </p:txBody>
+      </p:sp>
+    </p:spTree>
+  </p:cSld>
+  <mc:AlternateContent>
+    <mc:Choice Requires="p14">
+      <p:transition spd="slow" p14:dur="2000"/>
+    </mc:Choice>
+    <mc:Fallback>
+      <p:transition spd="slow"/>
+    </mc:Fallback>
+  </mc:AlternateContent>
+</p:sld>
+</file>
+
+<file path=ppt/slides/slide14.xml><?xml version="1.0" encoding="utf-8"?>
+<p:sld xmlns:a="http://schemas.openxmlformats.org/drawingml/2006/main" xmlns:p="http://schemas.openxmlformats.org/presentationml/2006/main" xmlns:r="http://schemas.openxmlformats.org/officeDocument/2006/relationships" xmlns:p14="http://schemas.microsoft.com/office/powerpoint/2010/main" xmlns:p15="http://schemas.microsoft.com/office/powerpoint/2012/main" xmlns:mc="http://schemas.openxmlformats.org/markup-compatibility/2006">
+  <p:cSld>
+    <p:bg>
+      <p:bgPr>
+        <a:blipFill rotWithShape="0">
+          <a:blip r:embed="rId1"/>
+          <a:stretch/>
+        </a:blipFill>
+      </p:bgPr>
+    </p:bg>
+    <p:spTree>
+      <p:nvGrpSpPr>
+        <p:cNvPr id="1" name=""/>
+        <p:cNvGrpSpPr/>
+        <p:nvPr/>
+      </p:nvGrpSpPr>
+      <p:grpSpPr>
+        <a:xfrm>
+          <a:off x="0" y="0"/>
+          <a:ext cx="0" cy="0"/>
+          <a:chOff x="0" y="0"/>
+          <a:chExt cx="0" cy="0"/>
+        </a:xfrm>
+      </p:grpSpPr>
+      <p:sp>
+        <p:nvSpPr>
+          <p:cNvPr id="57" name="PlaceHolder 1"/>
+          <p:cNvSpPr>
+            <a:spLocks noGrp="1"/>
+          </p:cNvSpPr>
+          <p:nvPr>
+            <p:ph type="title"/>
+          </p:nvPr>
+        </p:nvSpPr>
+        <p:spPr>
+          <a:xfrm>
+            <a:off x="1973160" y="225000"/>
+            <a:ext cx="6931440" cy="713160"/>
+          </a:xfrm>
+          <a:prstGeom prst="rect">
+            <a:avLst/>
+          </a:prstGeom>
+          <a:noFill/>
+          <a:ln w="0">
+            <a:noFill/>
+          </a:ln>
+        </p:spPr>
+        <p:txBody>
+          <a:bodyPr lIns="90000" rIns="90000" tIns="46800" bIns="46800" anchor="ctr">
+            <a:noAutofit/>
+          </a:bodyPr>
+          <a:p>
+            <a:pPr indent="0">
+              <a:lnSpc>
+                <a:spcPct val="100000"/>
+              </a:lnSpc>
+              <a:spcBef>
+                <a:spcPts val="567"/>
+              </a:spcBef>
+              <a:spcAft>
+                <a:spcPts val="567"/>
+              </a:spcAft>
+              <a:buNone/>
+              <a:tabLst>
+                <a:tab algn="l" pos="914400"/>
+                <a:tab algn="l" pos="1828800"/>
+                <a:tab algn="l" pos="2743200"/>
+                <a:tab algn="l" pos="3657600"/>
+                <a:tab algn="l" pos="4572000"/>
+                <a:tab algn="l" pos="5486400"/>
+                <a:tab algn="l" pos="6400800"/>
+                <a:tab algn="l" pos="7315200"/>
+                <a:tab algn="l" pos="8229600"/>
+                <a:tab algn="l" pos="9144000"/>
+                <a:tab algn="l" pos="10058400"/>
+              </a:tabLst>
+            </a:pPr>
+            <a:r>
+              <a:rPr b="0" lang="it-IT" sz="2800" strike="noStrike" u="none">
+                <a:solidFill>
+                  <a:srgbClr val="4d4d4d"/>
+                </a:solidFill>
+                <a:uFillTx/>
+                <a:latin typeface="Microsoft Sans Serif"/>
+                <a:ea typeface="Microsoft YaHei"/>
+              </a:rPr>
+              <a:t>8. </a:t>
+            </a:r>
+            <a:r>
+              <a:rPr b="0" lang="en-US" sz="2800" strike="noStrike" u="none">
+                <a:solidFill>
+                  <a:srgbClr val="4d4d4d"/>
+                </a:solidFill>
+                <a:uFillTx/>
+                <a:latin typeface="Verdana"/>
+                <a:ea typeface="굴림"/>
+              </a:rPr>
+              <a:t>Come si utilizza Air Connect</a:t>
+            </a:r>
+            <a:endParaRPr b="0" lang="it-IT" sz="2800" strike="noStrike" u="none">
+              <a:solidFill>
+                <a:srgbClr val="000000"/>
+              </a:solidFill>
+              <a:uFillTx/>
+              <a:latin typeface="Arial"/>
+            </a:endParaRPr>
+          </a:p>
+        </p:txBody>
+      </p:sp>
+      <p:sp>
+        <p:nvSpPr>
+          <p:cNvPr id="58" name="PlaceHolder 2"/>
+          <p:cNvSpPr>
+            <a:spLocks noGrp="1"/>
+          </p:cNvSpPr>
+          <p:nvPr>
+            <p:ph/>
+          </p:nvPr>
+        </p:nvSpPr>
+        <p:spPr>
+          <a:xfrm>
+            <a:off x="1973160" y="938160"/>
+            <a:ext cx="6931440" cy="5721840"/>
+          </a:xfrm>
+          <a:prstGeom prst="rect">
+            <a:avLst/>
+          </a:prstGeom>
+          <a:noFill/>
+          <a:ln w="0">
+            <a:noFill/>
+          </a:ln>
+        </p:spPr>
+        <p:txBody>
+          <a:bodyPr lIns="90000" rIns="90000" tIns="46800" bIns="46800" anchor="t">
+            <a:normAutofit/>
+          </a:bodyPr>
+          <a:p>
+            <a:pPr indent="0">
+              <a:lnSpc>
+                <a:spcPct val="100000"/>
+              </a:lnSpc>
+              <a:spcBef>
+                <a:spcPts val="283"/>
+              </a:spcBef>
+              <a:spcAft>
+                <a:spcPts val="283"/>
+              </a:spcAft>
+              <a:buNone/>
+            </a:pPr>
+            <a:endParaRPr b="0" lang="it-IT" sz="1500" strike="noStrike" u="none">
+              <a:solidFill>
+                <a:srgbClr val="000000"/>
+              </a:solidFill>
+              <a:uFillTx/>
+              <a:latin typeface="Arial"/>
+              <a:ea typeface="Microsoft YaHei"/>
+            </a:endParaRPr>
+          </a:p>
+          <a:p>
+            <a:pPr indent="0">
+              <a:lnSpc>
+                <a:spcPct val="100000"/>
+              </a:lnSpc>
+              <a:spcBef>
+                <a:spcPts val="283"/>
+              </a:spcBef>
+              <a:spcAft>
+                <a:spcPts val="283"/>
+              </a:spcAft>
+              <a:buNone/>
+            </a:pPr>
+            <a:endParaRPr b="0" lang="it-IT" sz="1500" strike="noStrike" u="none">
+              <a:solidFill>
+                <a:srgbClr val="000000"/>
+              </a:solidFill>
+              <a:uFillTx/>
+              <a:latin typeface="Arial"/>
+              <a:ea typeface="Microsoft YaHei"/>
+            </a:endParaRPr>
+          </a:p>
+          <a:p>
+            <a:pPr indent="0" algn="ctr">
+              <a:lnSpc>
+                <a:spcPct val="100000"/>
+              </a:lnSpc>
+              <a:spcBef>
+                <a:spcPts val="283"/>
+              </a:spcBef>
+              <a:spcAft>
+                <a:spcPts val="283"/>
+              </a:spcAft>
+              <a:buNone/>
+            </a:pPr>
+            <a:r>
+              <a:rPr b="1" lang="it-IT" sz="3200" strike="noStrike" u="none">
+                <a:solidFill>
+                  <a:srgbClr val="000000"/>
+                </a:solidFill>
+                <a:uFillTx/>
+                <a:latin typeface="Arial"/>
+                <a:ea typeface="Microsoft YaHei"/>
+              </a:rPr>
+              <a:t>Avviamo l’applicazione e accediamo tramite il seguente link:</a:t>
+            </a:r>
+            <a:br>
+              <a:rPr sz="3200"/>
+            </a:br>
+            <a:br>
+              <a:rPr sz="3200"/>
+            </a:br>
+            <a:r>
+              <a:rPr b="0" lang="it-IT" sz="3200" strike="noStrike" u="none">
+                <a:solidFill>
+                  <a:srgbClr val="000000"/>
+                </a:solidFill>
+                <a:uFillTx/>
+                <a:latin typeface="Arial"/>
+                <a:ea typeface="Microsoft YaHei"/>
+              </a:rPr>
+              <a:t> </a:t>
+            </a:r>
+            <a:r>
+              <a:rPr b="0" lang="it-IT" sz="3200" strike="noStrike" u="none">
+                <a:solidFill>
+                  <a:srgbClr val="5983b0"/>
+                </a:solidFill>
+                <a:uFillTx/>
+                <a:latin typeface="Arial"/>
+                <a:ea typeface="Microsoft YaHei"/>
+              </a:rPr>
+              <a:t> </a:t>
+            </a:r>
+            <a:r>
+              <a:rPr b="0" i="1" lang="it-IT" sz="3200" strike="noStrike" u="none">
+                <a:solidFill>
+                  <a:srgbClr val="5983b0"/>
+                </a:solidFill>
+                <a:uFillTx/>
+                <a:latin typeface="Arial"/>
+                <a:ea typeface="Microsoft YaHei"/>
+              </a:rPr>
+              <a:t>https://localhost:8081</a:t>
+            </a:r>
+            <a:endParaRPr b="0" lang="it-IT" sz="3200" strike="noStrike" u="none">
+              <a:solidFill>
+                <a:srgbClr val="000000"/>
+              </a:solidFill>
+              <a:uFillTx/>
+              <a:latin typeface="Arial"/>
+              <a:ea typeface="Microsoft YaHei"/>
+            </a:endParaRPr>
+          </a:p>
+          <a:p>
+            <a:pPr indent="0">
+              <a:lnSpc>
+                <a:spcPct val="100000"/>
+              </a:lnSpc>
+              <a:spcBef>
+                <a:spcPts val="283"/>
+              </a:spcBef>
+              <a:spcAft>
+                <a:spcPts val="283"/>
+              </a:spcAft>
+              <a:buNone/>
+            </a:pPr>
+            <a:endParaRPr b="0" lang="it-IT" sz="3200" strike="noStrike" u="none">
+              <a:solidFill>
+                <a:srgbClr val="000000"/>
+              </a:solidFill>
+              <a:uFillTx/>
+              <a:latin typeface="Arial"/>
+              <a:ea typeface="Microsoft YaHei"/>
+            </a:endParaRPr>
+          </a:p>
+          <a:p>
+            <a:pPr marL="432000" indent="0">
+              <a:lnSpc>
+                <a:spcPct val="100000"/>
+              </a:lnSpc>
+              <a:spcBef>
+                <a:spcPts val="283"/>
+              </a:spcBef>
+              <a:spcAft>
+                <a:spcPts val="283"/>
+              </a:spcAft>
+              <a:buNone/>
+            </a:pPr>
+            <a:endParaRPr b="0" lang="it-IT" sz="1500" strike="noStrike" u="none">
+              <a:solidFill>
+                <a:srgbClr val="000000"/>
+              </a:solidFill>
+              <a:uFillTx/>
+              <a:latin typeface="Arial"/>
+              <a:ea typeface="Microsoft YaHei"/>
+            </a:endParaRPr>
+          </a:p>
+          <a:p>
+            <a:pPr marL="432000" indent="0">
+              <a:lnSpc>
+                <a:spcPct val="100000"/>
+              </a:lnSpc>
+              <a:spcBef>
+                <a:spcPts val="1474"/>
+              </a:spcBef>
+              <a:spcAft>
+                <a:spcPts val="1276"/>
+              </a:spcAft>
+              <a:buNone/>
+              <a:tabLst>
+                <a:tab algn="l" pos="0"/>
+              </a:tabLst>
+            </a:pPr>
+            <a:endParaRPr b="0" lang="it-IT" sz="1500" strike="noStrike" u="none">
+              <a:solidFill>
+                <a:srgbClr val="000000"/>
+              </a:solidFill>
+              <a:uFillTx/>
+              <a:latin typeface="Arial"/>
+            </a:endParaRPr>
+          </a:p>
+          <a:p>
+            <a:pPr marL="432000" indent="0">
+              <a:lnSpc>
+                <a:spcPct val="100000"/>
+              </a:lnSpc>
+              <a:spcBef>
+                <a:spcPts val="907"/>
+              </a:spcBef>
+              <a:spcAft>
+                <a:spcPts val="709"/>
+              </a:spcAft>
+              <a:buNone/>
+              <a:tabLst>
+                <a:tab algn="l" pos="0"/>
+              </a:tabLst>
+            </a:pPr>
+            <a:endParaRPr b="0" lang="it-IT" sz="1500" strike="noStrike" u="none">
+              <a:solidFill>
+                <a:srgbClr val="000000"/>
+              </a:solidFill>
+              <a:uFillTx/>
+              <a:latin typeface="Arial"/>
+            </a:endParaRPr>
+          </a:p>
+        </p:txBody>
+      </p:sp>
+    </p:spTree>
+  </p:cSld>
+  <mc:AlternateContent>
+    <mc:Choice Requires="p14">
+      <p:transition spd="slow" p14:dur="2000"/>
+    </mc:Choice>
+    <mc:Fallback>
+      <p:transition spd="slow"/>
+    </mc:Fallback>
+  </mc:AlternateContent>
+</p:sld>
+</file>
+
+<file path=ppt/slides/slide15.xml><?xml version="1.0" encoding="utf-8"?>
+<p:sld xmlns:a="http://schemas.openxmlformats.org/drawingml/2006/main" xmlns:p="http://schemas.openxmlformats.org/presentationml/2006/main" xmlns:r="http://schemas.openxmlformats.org/officeDocument/2006/relationships" xmlns:p14="http://schemas.microsoft.com/office/powerpoint/2010/main" xmlns:p15="http://schemas.microsoft.com/office/powerpoint/2012/main" xmlns:mc="http://schemas.openxmlformats.org/markup-compatibility/2006">
+  <p:cSld>
+    <p:bg>
+      <p:bgPr>
+        <a:blipFill rotWithShape="0">
+          <a:blip r:embed="rId1"/>
+          <a:stretch/>
+        </a:blipFill>
+      </p:bgPr>
+    </p:bg>
+    <p:spTree>
+      <p:nvGrpSpPr>
+        <p:cNvPr id="1" name=""/>
+        <p:cNvGrpSpPr/>
+        <p:nvPr/>
+      </p:nvGrpSpPr>
+      <p:grpSpPr>
+        <a:xfrm>
+          <a:off x="0" y="0"/>
+          <a:ext cx="0" cy="0"/>
+          <a:chOff x="0" y="0"/>
+          <a:chExt cx="0" cy="0"/>
+        </a:xfrm>
+      </p:grpSpPr>
+      <p:sp>
+        <p:nvSpPr>
+          <p:cNvPr id="59" name="PlaceHolder 1"/>
+          <p:cNvSpPr>
+            <a:spLocks noGrp="1"/>
+          </p:cNvSpPr>
+          <p:nvPr>
+            <p:ph type="title"/>
+          </p:nvPr>
+        </p:nvSpPr>
+        <p:spPr>
+          <a:xfrm>
+            <a:off x="1973160" y="225000"/>
+            <a:ext cx="6931440" cy="713160"/>
+          </a:xfrm>
+          <a:prstGeom prst="rect">
+            <a:avLst/>
+          </a:prstGeom>
+          <a:noFill/>
+          <a:ln w="0">
+            <a:noFill/>
+          </a:ln>
+        </p:spPr>
+        <p:txBody>
+          <a:bodyPr lIns="90000" rIns="90000" tIns="46800" bIns="46800" anchor="ctr">
+            <a:noAutofit/>
+          </a:bodyPr>
+          <a:p>
+            <a:pPr indent="0">
+              <a:lnSpc>
+                <a:spcPct val="100000"/>
+              </a:lnSpc>
+              <a:spcBef>
+                <a:spcPts val="567"/>
+              </a:spcBef>
+              <a:spcAft>
+                <a:spcPts val="567"/>
+              </a:spcAft>
+              <a:buNone/>
+              <a:tabLst>
+                <a:tab algn="l" pos="914400"/>
+                <a:tab algn="l" pos="1828800"/>
+                <a:tab algn="l" pos="2743200"/>
+                <a:tab algn="l" pos="3657600"/>
+                <a:tab algn="l" pos="4572000"/>
+                <a:tab algn="l" pos="5486400"/>
+                <a:tab algn="l" pos="6400800"/>
+                <a:tab algn="l" pos="7315200"/>
+                <a:tab algn="l" pos="8229600"/>
+                <a:tab algn="l" pos="9144000"/>
+                <a:tab algn="l" pos="10058400"/>
+              </a:tabLst>
+            </a:pPr>
+            <a:r>
+              <a:rPr b="0" lang="en-US" sz="3200" strike="noStrike" u="none">
+                <a:solidFill>
+                  <a:srgbClr val="4d4d4d"/>
+                </a:solidFill>
+                <a:uFillTx/>
+                <a:latin typeface="Verdana"/>
+                <a:ea typeface="굴림"/>
+              </a:rPr>
+              <a:t>9. Conclusioni</a:t>
+            </a:r>
+            <a:endParaRPr b="0" lang="it-IT" sz="3200" strike="noStrike" u="none">
+              <a:solidFill>
+                <a:srgbClr val="000000"/>
+              </a:solidFill>
+              <a:uFillTx/>
+              <a:latin typeface="Arial"/>
+            </a:endParaRPr>
+          </a:p>
+        </p:txBody>
+      </p:sp>
+      <p:sp>
+        <p:nvSpPr>
+          <p:cNvPr id="60" name="PlaceHolder 2"/>
+          <p:cNvSpPr>
+            <a:spLocks noGrp="1"/>
+          </p:cNvSpPr>
+          <p:nvPr>
+            <p:ph/>
+          </p:nvPr>
+        </p:nvSpPr>
+        <p:spPr>
+          <a:xfrm>
+            <a:off x="1973160" y="938160"/>
+            <a:ext cx="6931440" cy="5919840"/>
+          </a:xfrm>
+          <a:prstGeom prst="rect">
+            <a:avLst/>
+          </a:prstGeom>
+          <a:noFill/>
+          <a:ln w="0">
+            <a:noFill/>
+          </a:ln>
+        </p:spPr>
+        <p:txBody>
+          <a:bodyPr lIns="90000" rIns="90000" tIns="46800" bIns="46800" anchor="t">
+            <a:normAutofit/>
+          </a:bodyPr>
+          <a:p>
+            <a:pPr marL="432000" indent="-324000">
+              <a:lnSpc>
+                <a:spcPct val="100000"/>
+              </a:lnSpc>
+              <a:spcBef>
+                <a:spcPts val="1191"/>
+              </a:spcBef>
+              <a:spcAft>
+                <a:spcPts val="992"/>
+              </a:spcAft>
+              <a:buClr>
+                <a:srgbClr val="000000"/>
+              </a:buClr>
+              <a:buSzPct val="135000"/>
+              <a:buFont typeface="Symbol" charset="2"/>
+              <a:buChar char=""/>
+            </a:pPr>
+            <a:r>
+              <a:rPr b="0" lang="it-IT" sz="1500" strike="noStrike" u="none">
+                <a:solidFill>
+                  <a:srgbClr val="000000"/>
+                </a:solidFill>
+                <a:uFillTx/>
+                <a:latin typeface="Verdana"/>
+                <a:ea typeface="Microsoft YaHei"/>
+              </a:rPr>
+              <a:t>Air Connect vuole semplificare </a:t>
+            </a:r>
+            <a:r>
+              <a:rPr b="1" lang="it-IT" sz="1500" strike="noStrike" u="none">
+                <a:solidFill>
+                  <a:srgbClr val="000000"/>
+                </a:solidFill>
+                <a:uFillTx/>
+                <a:latin typeface="Verdana"/>
+                <a:ea typeface="Microsoft YaHei"/>
+              </a:rPr>
+              <a:t>l'intero processo</a:t>
+            </a:r>
+            <a:r>
+              <a:rPr b="0" lang="it-IT" sz="1500" strike="noStrike" u="none">
+                <a:solidFill>
+                  <a:srgbClr val="000000"/>
+                </a:solidFill>
+                <a:uFillTx/>
+                <a:latin typeface="Verdana"/>
+                <a:ea typeface="Microsoft YaHei"/>
+              </a:rPr>
+              <a:t> di gestione di voli aerei e biglietti sia per gli utenti, sia per gli amministratori. </a:t>
+            </a:r>
+            <a:endParaRPr b="0" lang="it-IT" sz="1500" strike="noStrike" u="none">
+              <a:solidFill>
+                <a:srgbClr val="000000"/>
+              </a:solidFill>
+              <a:uFillTx/>
+              <a:latin typeface="Verdana"/>
+            </a:endParaRPr>
+          </a:p>
+          <a:p>
+            <a:pPr marL="432000" indent="-324000">
+              <a:lnSpc>
+                <a:spcPct val="100000"/>
+              </a:lnSpc>
+              <a:spcBef>
+                <a:spcPts val="1191"/>
+              </a:spcBef>
+              <a:spcAft>
+                <a:spcPts val="992"/>
+              </a:spcAft>
+              <a:buClr>
+                <a:srgbClr val="000000"/>
+              </a:buClr>
+              <a:buSzPct val="135000"/>
+              <a:buFont typeface="Symbol" charset="2"/>
+              <a:buChar char=""/>
+            </a:pPr>
+            <a:r>
+              <a:rPr b="0" lang="it-IT" sz="1500" strike="noStrike" u="none">
+                <a:solidFill>
+                  <a:srgbClr val="000000"/>
+                </a:solidFill>
+                <a:uFillTx/>
+                <a:latin typeface="Verdana"/>
+                <a:ea typeface="Microsoft YaHei"/>
+              </a:rPr>
+              <a:t>L'uso di un'architettura a </a:t>
+            </a:r>
+            <a:r>
+              <a:rPr b="1" lang="it-IT" sz="1500" strike="noStrike" u="none">
+                <a:solidFill>
+                  <a:srgbClr val="000000"/>
+                </a:solidFill>
+                <a:uFillTx/>
+                <a:latin typeface="Verdana"/>
+                <a:ea typeface="Microsoft YaHei"/>
+              </a:rPr>
+              <a:t>microservizi</a:t>
+            </a:r>
+            <a:r>
+              <a:rPr b="0" lang="it-IT" sz="1500" strike="noStrike" u="none">
+                <a:solidFill>
+                  <a:srgbClr val="000000"/>
+                </a:solidFill>
+                <a:uFillTx/>
+                <a:latin typeface="Verdana"/>
+                <a:ea typeface="Microsoft YaHei"/>
+              </a:rPr>
+              <a:t> garantisce modularità e manutenibilità. </a:t>
+            </a:r>
+            <a:endParaRPr b="0" lang="it-IT" sz="1500" strike="noStrike" u="none">
+              <a:solidFill>
+                <a:srgbClr val="000000"/>
+              </a:solidFill>
+              <a:uFillTx/>
+              <a:latin typeface="Verdana"/>
+            </a:endParaRPr>
+          </a:p>
+          <a:p>
+            <a:pPr marL="432000" indent="-324000">
+              <a:lnSpc>
+                <a:spcPct val="100000"/>
+              </a:lnSpc>
+              <a:spcBef>
+                <a:spcPts val="1191"/>
+              </a:spcBef>
+              <a:spcAft>
+                <a:spcPts val="992"/>
+              </a:spcAft>
+              <a:buClr>
+                <a:srgbClr val="000000"/>
+              </a:buClr>
+              <a:buSzPct val="135000"/>
+              <a:buFont typeface="Symbol" charset="2"/>
+              <a:buChar char=""/>
+            </a:pPr>
+            <a:r>
+              <a:rPr b="0" lang="it-IT" sz="1500" strike="noStrike" u="none">
+                <a:solidFill>
+                  <a:srgbClr val="000000"/>
+                </a:solidFill>
+                <a:uFillTx/>
+                <a:latin typeface="Verdana"/>
+                <a:ea typeface="Microsoft YaHei"/>
+              </a:rPr>
+              <a:t>Le </a:t>
+            </a:r>
+            <a:r>
+              <a:rPr b="1" lang="it-IT" sz="1500" strike="noStrike" u="none">
+                <a:solidFill>
+                  <a:srgbClr val="000000"/>
+                </a:solidFill>
+                <a:uFillTx/>
+                <a:latin typeface="Verdana"/>
+                <a:ea typeface="Microsoft YaHei"/>
+              </a:rPr>
+              <a:t>misure di sicurezza avanzate</a:t>
+            </a:r>
+            <a:r>
+              <a:rPr b="0" lang="it-IT" sz="1500" strike="noStrike" u="none">
+                <a:solidFill>
+                  <a:srgbClr val="000000"/>
+                </a:solidFill>
+                <a:uFillTx/>
+                <a:latin typeface="Verdana"/>
+                <a:ea typeface="Microsoft YaHei"/>
+              </a:rPr>
+              <a:t> proteggono i dati degli utenti e garantiscono un accesso controllato. </a:t>
+            </a:r>
+            <a:endParaRPr b="0" lang="it-IT" sz="1500" strike="noStrike" u="none">
+              <a:solidFill>
+                <a:srgbClr val="000000"/>
+              </a:solidFill>
+              <a:uFillTx/>
+              <a:latin typeface="Verdana"/>
+            </a:endParaRPr>
+          </a:p>
+          <a:p>
+            <a:pPr marL="432000" indent="-324000">
+              <a:lnSpc>
+                <a:spcPct val="100000"/>
+              </a:lnSpc>
+              <a:spcBef>
+                <a:spcPts val="1191"/>
+              </a:spcBef>
+              <a:spcAft>
+                <a:spcPts val="992"/>
+              </a:spcAft>
+              <a:buClr>
+                <a:srgbClr val="000000"/>
+              </a:buClr>
+              <a:buSzPct val="135000"/>
+              <a:buFont typeface="Symbol" charset="2"/>
+              <a:buChar char=""/>
+            </a:pPr>
+            <a:r>
+              <a:rPr b="0" lang="it-IT" sz="1500" strike="noStrike" u="none">
+                <a:solidFill>
+                  <a:srgbClr val="000000"/>
+                </a:solidFill>
+                <a:uFillTx/>
+                <a:latin typeface="Verdana"/>
+                <a:ea typeface="Microsoft YaHei"/>
+              </a:rPr>
+              <a:t>Possibili sviluppi futuri: </a:t>
+            </a:r>
+            <a:endParaRPr b="0" lang="it-IT" sz="1500" strike="noStrike" u="none">
+              <a:solidFill>
+                <a:srgbClr val="000000"/>
+              </a:solidFill>
+              <a:uFillTx/>
+              <a:latin typeface="Verdana"/>
+            </a:endParaRPr>
+          </a:p>
+          <a:p>
+            <a:pPr lvl="1" marL="864000" indent="-324000">
+              <a:lnSpc>
+                <a:spcPct val="100000"/>
+              </a:lnSpc>
+              <a:spcBef>
+                <a:spcPts val="1134"/>
+              </a:spcBef>
+              <a:buClr>
+                <a:srgbClr val="000000"/>
+              </a:buClr>
+              <a:buSzPct val="75000"/>
+              <a:buFont typeface="Symbol" charset="2"/>
+              <a:buChar char=""/>
+            </a:pPr>
+            <a:r>
+              <a:rPr b="0" lang="it-IT" sz="1500" strike="noStrike" u="none">
+                <a:solidFill>
+                  <a:srgbClr val="000000"/>
+                </a:solidFill>
+                <a:uFillTx/>
+                <a:latin typeface="Verdana"/>
+                <a:ea typeface="Microsoft YaHei"/>
+              </a:rPr>
+              <a:t>Integrazione con </a:t>
+            </a:r>
+            <a:r>
+              <a:rPr b="1" lang="it-IT" sz="1500" strike="noStrike" u="none">
+                <a:solidFill>
+                  <a:srgbClr val="000000"/>
+                </a:solidFill>
+                <a:uFillTx/>
+                <a:latin typeface="Verdana"/>
+                <a:ea typeface="Microsoft YaHei"/>
+              </a:rPr>
+              <a:t>sistemi di pagamento online</a:t>
+            </a:r>
+            <a:r>
+              <a:rPr b="0" lang="it-IT" sz="1500" strike="noStrike" u="none">
+                <a:solidFill>
+                  <a:srgbClr val="000000"/>
+                </a:solidFill>
+                <a:uFillTx/>
+                <a:latin typeface="Verdana"/>
+                <a:ea typeface="Microsoft YaHei"/>
+              </a:rPr>
+              <a:t>. </a:t>
+            </a:r>
+            <a:endParaRPr b="0" lang="it-IT" sz="1500" strike="noStrike" u="none">
+              <a:solidFill>
+                <a:srgbClr val="000000"/>
+              </a:solidFill>
+              <a:uFillTx/>
+              <a:latin typeface="Arial"/>
+            </a:endParaRPr>
+          </a:p>
+          <a:p>
+            <a:pPr lvl="1" marL="864000" indent="-324000">
+              <a:lnSpc>
+                <a:spcPct val="100000"/>
+              </a:lnSpc>
+              <a:spcBef>
+                <a:spcPts val="1134"/>
+              </a:spcBef>
+              <a:buClr>
+                <a:srgbClr val="000000"/>
+              </a:buClr>
+              <a:buSzPct val="75000"/>
+              <a:buFont typeface="Symbol" charset="2"/>
+              <a:buChar char=""/>
+            </a:pPr>
+            <a:r>
+              <a:rPr b="1" lang="it-IT" sz="1500" strike="noStrike" u="none">
+                <a:solidFill>
+                  <a:srgbClr val="000000"/>
+                </a:solidFill>
+                <a:uFillTx/>
+                <a:latin typeface="Verdana"/>
+                <a:ea typeface="Microsoft YaHei"/>
+              </a:rPr>
+              <a:t>Notifiche push</a:t>
+            </a:r>
+            <a:r>
+              <a:rPr b="0" lang="it-IT" sz="1500" strike="noStrike" u="none">
+                <a:solidFill>
+                  <a:srgbClr val="000000"/>
+                </a:solidFill>
+                <a:uFillTx/>
+                <a:latin typeface="Verdana"/>
+                <a:ea typeface="Microsoft YaHei"/>
+              </a:rPr>
+              <a:t> per aggiornamenti sui voli. </a:t>
+            </a:r>
+            <a:endParaRPr b="0" lang="it-IT" sz="1500" strike="noStrike" u="none">
+              <a:solidFill>
+                <a:srgbClr val="000000"/>
+              </a:solidFill>
+              <a:uFillTx/>
+              <a:latin typeface="Arial"/>
+            </a:endParaRPr>
+          </a:p>
+          <a:p>
+            <a:pPr lvl="1" marL="864000" indent="-324000">
+              <a:lnSpc>
+                <a:spcPct val="100000"/>
+              </a:lnSpc>
+              <a:spcBef>
+                <a:spcPts val="1134"/>
+              </a:spcBef>
+              <a:buClr>
+                <a:srgbClr val="000000"/>
+              </a:buClr>
+              <a:buSzPct val="75000"/>
+              <a:buFont typeface="Symbol" charset="2"/>
+              <a:buChar char=""/>
+            </a:pPr>
+            <a:r>
+              <a:rPr b="1" lang="it-IT" sz="1500" strike="noStrike" u="none">
+                <a:solidFill>
+                  <a:srgbClr val="000000"/>
+                </a:solidFill>
+                <a:uFillTx/>
+                <a:latin typeface="Verdana"/>
+                <a:ea typeface="Microsoft YaHei"/>
+              </a:rPr>
+              <a:t>Espansione del sistema</a:t>
+            </a:r>
+            <a:r>
+              <a:rPr b="0" lang="it-IT" sz="1500" strike="noStrike" u="none">
+                <a:solidFill>
+                  <a:srgbClr val="000000"/>
+                </a:solidFill>
+                <a:uFillTx/>
+                <a:latin typeface="Verdana"/>
+                <a:ea typeface="Microsoft YaHei"/>
+              </a:rPr>
+              <a:t> per supportare più compagnie aeree.</a:t>
+            </a:r>
             <a:endParaRPr b="0" lang="it-IT" sz="1500" strike="noStrike" u="none">
               <a:solidFill>
                 <a:srgbClr val="000000"/>
@@ -4579,7 +6561,7 @@
       </p:grpSpPr>
       <p:sp>
         <p:nvSpPr>
-          <p:cNvPr id="24" name="PlaceHolder 1"/>
+          <p:cNvPr id="26" name="PlaceHolder 1"/>
           <p:cNvSpPr>
             <a:spLocks noGrp="1"/>
           </p:cNvSpPr>
@@ -4590,7 +6572,7 @@
         <p:spPr>
           <a:xfrm>
             <a:off x="1193400" y="1620000"/>
-            <a:ext cx="7084080" cy="789840"/>
+            <a:ext cx="7083720" cy="789480"/>
           </a:xfrm>
           <a:prstGeom prst="rect">
             <a:avLst/>
@@ -4636,7 +6618,7 @@
       </p:sp>
       <p:sp>
         <p:nvSpPr>
-          <p:cNvPr id="25" name="PlaceHolder 2"/>
+          <p:cNvPr id="27" name="PlaceHolder 2"/>
           <p:cNvSpPr>
             <a:spLocks noGrp="1"/>
           </p:cNvSpPr>
@@ -4647,7 +6629,7 @@
         <p:spPr>
           <a:xfrm>
             <a:off x="1142640" y="2520000"/>
-            <a:ext cx="7314840" cy="4137480"/>
+            <a:ext cx="7314480" cy="4137120"/>
           </a:xfrm>
           <a:prstGeom prst="rect">
             <a:avLst/>
@@ -5198,7 +7180,7 @@
       </p:grpSpPr>
       <p:sp>
         <p:nvSpPr>
-          <p:cNvPr id="26" name="PlaceHolder 1"/>
+          <p:cNvPr id="28" name="PlaceHolder 1"/>
           <p:cNvSpPr>
             <a:spLocks noGrp="1"/>
           </p:cNvSpPr>
@@ -5209,7 +7191,7 @@
         <p:spPr>
           <a:xfrm>
             <a:off x="1981080" y="228240"/>
-            <a:ext cx="6931800" cy="713520"/>
+            <a:ext cx="6931440" cy="713160"/>
           </a:xfrm>
           <a:prstGeom prst="rect">
             <a:avLst/>
@@ -5255,7 +7237,7 @@
       </p:sp>
       <p:sp>
         <p:nvSpPr>
-          <p:cNvPr id="27" name="PlaceHolder 2"/>
+          <p:cNvPr id="29" name="PlaceHolder 2"/>
           <p:cNvSpPr>
             <a:spLocks noGrp="1"/>
           </p:cNvSpPr>
@@ -5266,7 +7248,7 @@
         <p:spPr>
           <a:xfrm>
             <a:off x="1981080" y="1080000"/>
-            <a:ext cx="6931800" cy="5217480"/>
+            <a:ext cx="6931440" cy="5217120"/>
           </a:xfrm>
           <a:prstGeom prst="rect">
             <a:avLst/>
@@ -5943,7 +7925,7 @@
       </p:grpSpPr>
       <p:sp>
         <p:nvSpPr>
-          <p:cNvPr id="28" name="PlaceHolder 1"/>
+          <p:cNvPr id="30" name="PlaceHolder 1"/>
           <p:cNvSpPr>
             <a:spLocks noGrp="1"/>
           </p:cNvSpPr>
@@ -5954,7 +7936,7 @@
         <p:spPr>
           <a:xfrm>
             <a:off x="1981080" y="228240"/>
-            <a:ext cx="6931800" cy="713520"/>
+            <a:ext cx="6931440" cy="713160"/>
           </a:xfrm>
           <a:prstGeom prst="rect">
             <a:avLst/>
@@ -6000,7 +7982,7 @@
       </p:sp>
       <p:sp>
         <p:nvSpPr>
-          <p:cNvPr id="29" name="PlaceHolder 2"/>
+          <p:cNvPr id="31" name="PlaceHolder 2"/>
           <p:cNvSpPr>
             <a:spLocks noGrp="1"/>
           </p:cNvSpPr>
@@ -6011,7 +7993,7 @@
         <p:spPr>
           <a:xfrm>
             <a:off x="1980000" y="1080000"/>
-            <a:ext cx="6931800" cy="5577480"/>
+            <a:ext cx="6931440" cy="5577120"/>
           </a:xfrm>
           <a:prstGeom prst="rect">
             <a:avLst/>
@@ -6511,7 +8493,7 @@
       </p:grpSpPr>
       <p:sp>
         <p:nvSpPr>
-          <p:cNvPr id="30" name="PlaceHolder 1"/>
+          <p:cNvPr id="32" name="PlaceHolder 1"/>
           <p:cNvSpPr>
             <a:spLocks noGrp="1"/>
           </p:cNvSpPr>
@@ -6522,7 +8504,7 @@
         <p:spPr>
           <a:xfrm>
             <a:off x="1973160" y="225000"/>
-            <a:ext cx="6931800" cy="713520"/>
+            <a:ext cx="6931440" cy="713160"/>
           </a:xfrm>
           <a:prstGeom prst="rect">
             <a:avLst/>
@@ -6568,7 +8550,7 @@
       </p:sp>
       <p:sp>
         <p:nvSpPr>
-          <p:cNvPr id="31" name="PlaceHolder 2"/>
+          <p:cNvPr id="33" name="PlaceHolder 2"/>
           <p:cNvSpPr>
             <a:spLocks noGrp="1"/>
           </p:cNvSpPr>
@@ -6579,7 +8561,7 @@
         <p:spPr>
           <a:xfrm>
             <a:off x="1998360" y="1097280"/>
-            <a:ext cx="6931800" cy="3237480"/>
+            <a:ext cx="6931440" cy="3237120"/>
           </a:xfrm>
           <a:prstGeom prst="rect">
             <a:avLst/>
@@ -6987,7 +8969,7 @@
       </p:sp>
       <p:pic>
         <p:nvPicPr>
-          <p:cNvPr id="32" name="" descr=""/>
+          <p:cNvPr id="34" name="" descr=""/>
           <p:cNvPicPr/>
           <p:nvPr/>
         </p:nvPicPr>
@@ -6998,7 +8980,7 @@
         <p:spPr>
           <a:xfrm>
             <a:off x="2332080" y="4008960"/>
-            <a:ext cx="6477480" cy="1849320"/>
+            <a:ext cx="6477120" cy="1848960"/>
           </a:xfrm>
           <a:prstGeom prst="rect">
             <a:avLst/>
@@ -7049,7 +9031,7 @@
       </p:grpSpPr>
       <p:sp>
         <p:nvSpPr>
-          <p:cNvPr id="33" name="PlaceHolder 1"/>
+          <p:cNvPr id="35" name="PlaceHolder 1"/>
           <p:cNvSpPr>
             <a:spLocks noGrp="1"/>
           </p:cNvSpPr>
@@ -7060,7 +9042,7 @@
         <p:spPr>
           <a:xfrm>
             <a:off x="1973160" y="225000"/>
-            <a:ext cx="6931800" cy="713520"/>
+            <a:ext cx="6931440" cy="713160"/>
           </a:xfrm>
           <a:prstGeom prst="rect">
             <a:avLst/>
@@ -7106,7 +9088,7 @@
       </p:sp>
       <p:sp>
         <p:nvSpPr>
-          <p:cNvPr id="34" name="PlaceHolder 2"/>
+          <p:cNvPr id="36" name="PlaceHolder 2"/>
           <p:cNvSpPr>
             <a:spLocks noGrp="1"/>
           </p:cNvSpPr>
@@ -7117,7 +9099,7 @@
         <p:spPr>
           <a:xfrm>
             <a:off x="1980000" y="1440000"/>
-            <a:ext cx="6931800" cy="5037840"/>
+            <a:ext cx="6931440" cy="5037480"/>
           </a:xfrm>
           <a:prstGeom prst="rect">
             <a:avLst/>
@@ -7629,14 +9611,14 @@
       </p:sp>
       <p:sp>
         <p:nvSpPr>
-          <p:cNvPr id="35" name="PlaceHolder 6"/>
+          <p:cNvPr id="37" name="PlaceHolder 6"/>
           <p:cNvSpPr/>
           <p:nvPr/>
         </p:nvSpPr>
         <p:spPr>
           <a:xfrm>
             <a:off x="1973160" y="900000"/>
-            <a:ext cx="6931800" cy="357840"/>
+            <a:ext cx="6931440" cy="357480"/>
           </a:xfrm>
           <a:prstGeom prst="rect">
             <a:avLst/>
@@ -7759,7 +9741,7 @@
       </p:grpSpPr>
       <p:sp>
         <p:nvSpPr>
-          <p:cNvPr id="36" name="PlaceHolder 1"/>
+          <p:cNvPr id="38" name="PlaceHolder 1"/>
           <p:cNvSpPr>
             <a:spLocks noGrp="1"/>
           </p:cNvSpPr>
@@ -7770,7 +9752,7 @@
         <p:spPr>
           <a:xfrm>
             <a:off x="1973160" y="225000"/>
-            <a:ext cx="6931800" cy="713520"/>
+            <a:ext cx="6931440" cy="713160"/>
           </a:xfrm>
           <a:prstGeom prst="rect">
             <a:avLst/>
@@ -7816,7 +9798,7 @@
       </p:sp>
       <p:sp>
         <p:nvSpPr>
-          <p:cNvPr id="37" name="PlaceHolder 2"/>
+          <p:cNvPr id="39" name="PlaceHolder 2"/>
           <p:cNvSpPr>
             <a:spLocks noGrp="1"/>
           </p:cNvSpPr>
@@ -7827,7 +9809,7 @@
         <p:spPr>
           <a:xfrm>
             <a:off x="1980000" y="1440000"/>
-            <a:ext cx="6931800" cy="5037840"/>
+            <a:ext cx="6931440" cy="5037480"/>
           </a:xfrm>
           <a:prstGeom prst="rect">
             <a:avLst/>
@@ -8385,14 +10367,14 @@
       </p:sp>
       <p:sp>
         <p:nvSpPr>
-          <p:cNvPr id="38" name="PlaceHolder 9"/>
+          <p:cNvPr id="40" name="PlaceHolder 9"/>
           <p:cNvSpPr/>
           <p:nvPr/>
         </p:nvSpPr>
         <p:spPr>
           <a:xfrm>
             <a:off x="1973160" y="900000"/>
-            <a:ext cx="6931800" cy="357840"/>
+            <a:ext cx="6931440" cy="357480"/>
           </a:xfrm>
           <a:prstGeom prst="rect">
             <a:avLst/>
@@ -8515,7 +10497,7 @@
       </p:grpSpPr>
       <p:sp>
         <p:nvSpPr>
-          <p:cNvPr id="39" name="PlaceHolder 1"/>
+          <p:cNvPr id="41" name="PlaceHolder 1"/>
           <p:cNvSpPr>
             <a:spLocks noGrp="1"/>
           </p:cNvSpPr>
@@ -8526,7 +10508,7 @@
         <p:spPr>
           <a:xfrm>
             <a:off x="1973160" y="225000"/>
-            <a:ext cx="6931800" cy="713520"/>
+            <a:ext cx="6931440" cy="713160"/>
           </a:xfrm>
           <a:prstGeom prst="rect">
             <a:avLst/>
@@ -8572,7 +10554,7 @@
       </p:sp>
       <p:sp>
         <p:nvSpPr>
-          <p:cNvPr id="40" name="PlaceHolder 2"/>
+          <p:cNvPr id="42" name="PlaceHolder 2"/>
           <p:cNvSpPr>
             <a:spLocks noGrp="1"/>
           </p:cNvSpPr>
@@ -8583,7 +10565,7 @@
         <p:spPr>
           <a:xfrm>
             <a:off x="1980000" y="1440000"/>
-            <a:ext cx="6931800" cy="5217840"/>
+            <a:ext cx="6931440" cy="5217480"/>
           </a:xfrm>
           <a:prstGeom prst="rect">
             <a:avLst/>
@@ -9003,14 +10985,14 @@
       </p:sp>
       <p:sp>
         <p:nvSpPr>
-          <p:cNvPr id="41" name="PlaceHolder 12"/>
+          <p:cNvPr id="43" name="PlaceHolder 12"/>
           <p:cNvSpPr/>
           <p:nvPr/>
         </p:nvSpPr>
         <p:spPr>
           <a:xfrm>
             <a:off x="1973160" y="900000"/>
-            <a:ext cx="6931800" cy="357840"/>
+            <a:ext cx="6931440" cy="357480"/>
           </a:xfrm>
           <a:prstGeom prst="rect">
             <a:avLst/>
@@ -9133,7 +11115,7 @@
       </p:grpSpPr>
       <p:sp>
         <p:nvSpPr>
-          <p:cNvPr id="42" name="PlaceHolder 1"/>
+          <p:cNvPr id="44" name="PlaceHolder 1"/>
           <p:cNvSpPr>
             <a:spLocks noGrp="1"/>
           </p:cNvSpPr>
@@ -9144,7 +11126,7 @@
         <p:spPr>
           <a:xfrm>
             <a:off x="1973160" y="225000"/>
-            <a:ext cx="6931800" cy="713520"/>
+            <a:ext cx="6931440" cy="713160"/>
           </a:xfrm>
           <a:prstGeom prst="rect">
             <a:avLst/>
@@ -9190,7 +11172,7 @@
       </p:sp>
       <p:sp>
         <p:nvSpPr>
-          <p:cNvPr id="43" name="PlaceHolder 2"/>
+          <p:cNvPr id="45" name="PlaceHolder 2"/>
           <p:cNvSpPr>
             <a:spLocks noGrp="1"/>
           </p:cNvSpPr>
@@ -9201,7 +11183,7 @@
         <p:spPr>
           <a:xfrm>
             <a:off x="1980000" y="1440000"/>
-            <a:ext cx="6931800" cy="5217840"/>
+            <a:ext cx="6931440" cy="5217480"/>
           </a:xfrm>
           <a:prstGeom prst="rect">
             <a:avLst/>
@@ -9720,14 +11702,14 @@
       </p:sp>
       <p:sp>
         <p:nvSpPr>
-          <p:cNvPr id="44" name="PlaceHolder 15"/>
+          <p:cNvPr id="46" name="PlaceHolder 15"/>
           <p:cNvSpPr/>
           <p:nvPr/>
         </p:nvSpPr>
         <p:spPr>
           <a:xfrm>
             <a:off x="1973160" y="900000"/>
-            <a:ext cx="6931800" cy="357840"/>
+            <a:ext cx="6931440" cy="357480"/>
           </a:xfrm>
           <a:prstGeom prst="rect">
             <a:avLst/>

</xml_diff>